<commit_message>
Edited deployment guide & parameter descriptions
</commit_message>
<xml_diff>
--- a/docs/images/connectsense-spc-architecture-diagram.pptx
+++ b/docs/images/connectsense-spc-architecture-diagram.pptx
@@ -6,6 +6,7 @@
   </p:sldMasterIdLst>
   <p:sldIdLst>
     <p:sldId id="256" r:id="rId2"/>
+    <p:sldId id="257" r:id="rId3"/>
   </p:sldIdLst>
   <p:sldSz cx="12192000" cy="6858000"/>
   <p:notesSz cx="6858000" cy="9144000"/>
@@ -259,7 +260,7 @@
           <a:p>
             <a:fld id="{B254F3FA-2CD2-47E1-9871-C6CD92049798}" type="datetimeFigureOut">
               <a:rPr lang="en-US" smtClean="0"/>
-              <a:t>12/23/20</a:t>
+              <a:t>2/26/2021</a:t>
             </a:fld>
             <a:endParaRPr lang="en-US"/>
           </a:p>
@@ -457,7 +458,7 @@
           <a:p>
             <a:fld id="{B254F3FA-2CD2-47E1-9871-C6CD92049798}" type="datetimeFigureOut">
               <a:rPr lang="en-US" smtClean="0"/>
-              <a:t>12/23/20</a:t>
+              <a:t>2/26/2021</a:t>
             </a:fld>
             <a:endParaRPr lang="en-US"/>
           </a:p>
@@ -665,7 +666,7 @@
           <a:p>
             <a:fld id="{B254F3FA-2CD2-47E1-9871-C6CD92049798}" type="datetimeFigureOut">
               <a:rPr lang="en-US" smtClean="0"/>
-              <a:t>12/23/20</a:t>
+              <a:t>2/26/2021</a:t>
             </a:fld>
             <a:endParaRPr lang="en-US"/>
           </a:p>
@@ -863,7 +864,7 @@
           <a:p>
             <a:fld id="{B254F3FA-2CD2-47E1-9871-C6CD92049798}" type="datetimeFigureOut">
               <a:rPr lang="en-US" smtClean="0"/>
-              <a:t>12/23/20</a:t>
+              <a:t>2/26/2021</a:t>
             </a:fld>
             <a:endParaRPr lang="en-US"/>
           </a:p>
@@ -1138,7 +1139,7 @@
           <a:p>
             <a:fld id="{B254F3FA-2CD2-47E1-9871-C6CD92049798}" type="datetimeFigureOut">
               <a:rPr lang="en-US" smtClean="0"/>
-              <a:t>12/23/20</a:t>
+              <a:t>2/26/2021</a:t>
             </a:fld>
             <a:endParaRPr lang="en-US"/>
           </a:p>
@@ -1403,7 +1404,7 @@
           <a:p>
             <a:fld id="{B254F3FA-2CD2-47E1-9871-C6CD92049798}" type="datetimeFigureOut">
               <a:rPr lang="en-US" smtClean="0"/>
-              <a:t>12/23/20</a:t>
+              <a:t>2/26/2021</a:t>
             </a:fld>
             <a:endParaRPr lang="en-US"/>
           </a:p>
@@ -1815,7 +1816,7 @@
           <a:p>
             <a:fld id="{B254F3FA-2CD2-47E1-9871-C6CD92049798}" type="datetimeFigureOut">
               <a:rPr lang="en-US" smtClean="0"/>
-              <a:t>12/23/20</a:t>
+              <a:t>2/26/2021</a:t>
             </a:fld>
             <a:endParaRPr lang="en-US"/>
           </a:p>
@@ -1956,7 +1957,7 @@
           <a:p>
             <a:fld id="{B254F3FA-2CD2-47E1-9871-C6CD92049798}" type="datetimeFigureOut">
               <a:rPr lang="en-US" smtClean="0"/>
-              <a:t>12/23/20</a:t>
+              <a:t>2/26/2021</a:t>
             </a:fld>
             <a:endParaRPr lang="en-US"/>
           </a:p>
@@ -2069,7 +2070,7 @@
           <a:p>
             <a:fld id="{B254F3FA-2CD2-47E1-9871-C6CD92049798}" type="datetimeFigureOut">
               <a:rPr lang="en-US" smtClean="0"/>
-              <a:t>12/23/20</a:t>
+              <a:t>2/26/2021</a:t>
             </a:fld>
             <a:endParaRPr lang="en-US"/>
           </a:p>
@@ -2380,7 +2381,7 @@
           <a:p>
             <a:fld id="{B254F3FA-2CD2-47E1-9871-C6CD92049798}" type="datetimeFigureOut">
               <a:rPr lang="en-US" smtClean="0"/>
-              <a:t>12/23/20</a:t>
+              <a:t>2/26/2021</a:t>
             </a:fld>
             <a:endParaRPr lang="en-US"/>
           </a:p>
@@ -2668,7 +2669,7 @@
           <a:p>
             <a:fld id="{B254F3FA-2CD2-47E1-9871-C6CD92049798}" type="datetimeFigureOut">
               <a:rPr lang="en-US" smtClean="0"/>
-              <a:t>12/23/20</a:t>
+              <a:t>2/26/2021</a:t>
             </a:fld>
             <a:endParaRPr lang="en-US"/>
           </a:p>
@@ -2909,7 +2910,7 @@
           <a:p>
             <a:fld id="{B254F3FA-2CD2-47E1-9871-C6CD92049798}" type="datetimeFigureOut">
               <a:rPr lang="en-US" smtClean="0"/>
-              <a:t>12/23/20</a:t>
+              <a:t>2/26/2021</a:t>
             </a:fld>
             <a:endParaRPr lang="en-US"/>
           </a:p>
@@ -3340,6 +3341,4195 @@
         </p:nvSpPr>
         <p:spPr>
           <a:xfrm>
+            <a:off x="4292556" y="966142"/>
+            <a:ext cx="5651777" cy="4615108"/>
+          </a:xfrm>
+          <a:prstGeom prst="rect">
+            <a:avLst/>
+          </a:prstGeom>
+          <a:noFill/>
+          <a:ln w="12700">
+            <a:solidFill>
+              <a:schemeClr val="tx1"/>
+            </a:solidFill>
+          </a:ln>
+        </p:spPr>
+        <p:style>
+          <a:lnRef idx="2">
+            <a:schemeClr val="accent1">
+              <a:shade val="50000"/>
+            </a:schemeClr>
+          </a:lnRef>
+          <a:fillRef idx="1">
+            <a:schemeClr val="accent1"/>
+          </a:fillRef>
+          <a:effectRef idx="0">
+            <a:schemeClr val="accent1"/>
+          </a:effectRef>
+          <a:fontRef idx="minor">
+            <a:schemeClr val="lt1"/>
+          </a:fontRef>
+        </p:style>
+        <p:txBody>
+          <a:bodyPr lIns="457200" tIns="91440"/>
+          <a:lstStyle/>
+          <a:p>
+            <a:pPr eaLnBrk="1" fontAlgn="auto" hangingPunct="1">
+              <a:spcBef>
+                <a:spcPts val="0"/>
+              </a:spcBef>
+              <a:spcAft>
+                <a:spcPts val="0"/>
+              </a:spcAft>
+              <a:defRPr/>
+            </a:pPr>
+            <a:r>
+              <a:rPr lang="en-US" sz="1200" dirty="0">
+                <a:solidFill>
+                  <a:sysClr val="windowText" lastClr="000000"/>
+                </a:solidFill>
+                <a:latin typeface="Arial" panose="020B0604020202020204" pitchFamily="34" charset="0"/>
+                <a:cs typeface="Arial" panose="020B0604020202020204" pitchFamily="34" charset="0"/>
+              </a:rPr>
+              <a:t>AWS Cloud</a:t>
+            </a:r>
+          </a:p>
+        </p:txBody>
+      </p:sp>
+      <p:pic>
+        <p:nvPicPr>
+          <p:cNvPr id="5" name="Graphic 5">
+            <a:extLst>
+              <a:ext uri="{FF2B5EF4-FFF2-40B4-BE49-F238E27FC236}">
+                <a16:creationId xmlns:a16="http://schemas.microsoft.com/office/drawing/2014/main" id="{4E5B5B1E-F8CF-49A0-A14E-8A5B54B57736}"/>
+              </a:ext>
+            </a:extLst>
+          </p:cNvPr>
+          <p:cNvPicPr>
+            <a:picLocks noChangeAspect="1" noChangeArrowheads="1"/>
+          </p:cNvPicPr>
+          <p:nvPr/>
+        </p:nvPicPr>
+        <p:blipFill>
+          <a:blip r:embed="rId2">
+            <a:extLst>
+              <a:ext uri="{28A0092B-C50C-407E-A947-70E740481C1C}">
+                <a14:useLocalDpi xmlns:a14="http://schemas.microsoft.com/office/drawing/2010/main" val="0"/>
+              </a:ext>
+            </a:extLst>
+          </a:blip>
+          <a:srcRect/>
+          <a:stretch>
+            <a:fillRect/>
+          </a:stretch>
+        </p:blipFill>
+        <p:spPr bwMode="auto">
+          <a:xfrm>
+            <a:off x="4292556" y="966142"/>
+            <a:ext cx="433365" cy="483749"/>
+          </a:xfrm>
+          <a:prstGeom prst="rect">
+            <a:avLst/>
+          </a:prstGeom>
+          <a:noFill/>
+          <a:ln>
+            <a:noFill/>
+          </a:ln>
+          <a:extLst>
+            <a:ext uri="{909E8E84-426E-40DD-AFC4-6F175D3DCCD1}">
+              <a14:hiddenFill xmlns:a14="http://schemas.microsoft.com/office/drawing/2010/main">
+                <a:solidFill>
+                  <a:srgbClr val="FFFFFF"/>
+                </a:solidFill>
+              </a14:hiddenFill>
+            </a:ext>
+            <a:ext uri="{91240B29-F687-4F45-9708-019B960494DF}">
+              <a14:hiddenLine xmlns:a14="http://schemas.microsoft.com/office/drawing/2010/main" w="9525">
+                <a:solidFill>
+                  <a:srgbClr val="000000"/>
+                </a:solidFill>
+                <a:miter lim="800000"/>
+                <a:headEnd/>
+                <a:tailEnd/>
+              </a14:hiddenLine>
+            </a:ext>
+          </a:extLst>
+        </p:spPr>
+      </p:pic>
+      <p:cxnSp>
+        <p:nvCxnSpPr>
+          <p:cNvPr id="20" name="Straight Arrow Connector 19">
+            <a:extLst>
+              <a:ext uri="{FF2B5EF4-FFF2-40B4-BE49-F238E27FC236}">
+                <a16:creationId xmlns:a16="http://schemas.microsoft.com/office/drawing/2014/main" id="{D6D1E182-E887-46F9-9FB9-E503EC08AE69}"/>
+              </a:ext>
+            </a:extLst>
+          </p:cNvPr>
+          <p:cNvCxnSpPr>
+            <a:cxnSpLocks/>
+            <a:endCxn id="38" idx="1"/>
+          </p:cNvCxnSpPr>
+          <p:nvPr/>
+        </p:nvCxnSpPr>
+        <p:spPr>
+          <a:xfrm flipV="1">
+            <a:off x="3223993" y="1860460"/>
+            <a:ext cx="1756296" cy="0"/>
+          </a:xfrm>
+          <a:prstGeom prst="straightConnector1">
+            <a:avLst/>
+          </a:prstGeom>
+          <a:ln w="12700">
+            <a:solidFill>
+              <a:schemeClr val="tx2"/>
+            </a:solidFill>
+            <a:headEnd type="none" w="med" len="sm"/>
+            <a:tailEnd type="arrow" w="med" len="sm"/>
+          </a:ln>
+        </p:spPr>
+        <p:style>
+          <a:lnRef idx="1">
+            <a:schemeClr val="accent1"/>
+          </a:lnRef>
+          <a:fillRef idx="0">
+            <a:schemeClr val="accent1"/>
+          </a:fillRef>
+          <a:effectRef idx="0">
+            <a:schemeClr val="accent1"/>
+          </a:effectRef>
+          <a:fontRef idx="minor">
+            <a:schemeClr val="tx1"/>
+          </a:fontRef>
+        </p:style>
+      </p:cxnSp>
+      <p:sp>
+        <p:nvSpPr>
+          <p:cNvPr id="27" name="TextBox 27">
+            <a:extLst>
+              <a:ext uri="{FF2B5EF4-FFF2-40B4-BE49-F238E27FC236}">
+                <a16:creationId xmlns:a16="http://schemas.microsoft.com/office/drawing/2014/main" id="{D4BBE033-79BA-4F01-B5A1-7761D7721232}"/>
+              </a:ext>
+            </a:extLst>
+          </p:cNvPr>
+          <p:cNvSpPr txBox="1">
+            <a:spLocks noChangeArrowheads="1"/>
+          </p:cNvSpPr>
+          <p:nvPr/>
+        </p:nvSpPr>
+        <p:spPr bwMode="auto">
+          <a:xfrm>
+            <a:off x="3377350" y="1454370"/>
+            <a:ext cx="844114" cy="646331"/>
+          </a:xfrm>
+          <a:prstGeom prst="rect">
+            <a:avLst/>
+          </a:prstGeom>
+          <a:noFill/>
+          <a:ln>
+            <a:noFill/>
+          </a:ln>
+          <a:extLst>
+            <a:ext uri="{909E8E84-426E-40DD-AFC4-6F175D3DCCD1}">
+              <a14:hiddenFill xmlns:a14="http://schemas.microsoft.com/office/drawing/2010/main">
+                <a:solidFill>
+                  <a:srgbClr val="FFFFFF"/>
+                </a:solidFill>
+              </a14:hiddenFill>
+            </a:ext>
+            <a:ext uri="{91240B29-F687-4F45-9708-019B960494DF}">
+              <a14:hiddenLine xmlns:a14="http://schemas.microsoft.com/office/drawing/2010/main" w="9525">
+                <a:solidFill>
+                  <a:srgbClr val="000000"/>
+                </a:solidFill>
+                <a:miter lim="800000"/>
+                <a:headEnd/>
+                <a:tailEnd/>
+              </a14:hiddenLine>
+            </a:ext>
+          </a:extLst>
+        </p:spPr>
+        <p:txBody>
+          <a:bodyPr wrap="square">
+            <a:spAutoFit/>
+          </a:bodyPr>
+          <a:lstStyle>
+            <a:lvl1pPr>
+              <a:defRPr>
+                <a:solidFill>
+                  <a:schemeClr val="tx1"/>
+                </a:solidFill>
+                <a:latin typeface="Calibri" panose="020F0502020204030204" pitchFamily="34" charset="0"/>
+              </a:defRPr>
+            </a:lvl1pPr>
+            <a:lvl2pPr marL="742950" indent="-285750">
+              <a:defRPr>
+                <a:solidFill>
+                  <a:schemeClr val="tx1"/>
+                </a:solidFill>
+                <a:latin typeface="Calibri" panose="020F0502020204030204" pitchFamily="34" charset="0"/>
+              </a:defRPr>
+            </a:lvl2pPr>
+            <a:lvl3pPr marL="1143000" indent="-228600">
+              <a:defRPr>
+                <a:solidFill>
+                  <a:schemeClr val="tx1"/>
+                </a:solidFill>
+                <a:latin typeface="Calibri" panose="020F0502020204030204" pitchFamily="34" charset="0"/>
+              </a:defRPr>
+            </a:lvl3pPr>
+            <a:lvl4pPr marL="1600200" indent="-228600">
+              <a:defRPr>
+                <a:solidFill>
+                  <a:schemeClr val="tx1"/>
+                </a:solidFill>
+                <a:latin typeface="Calibri" panose="020F0502020204030204" pitchFamily="34" charset="0"/>
+              </a:defRPr>
+            </a:lvl4pPr>
+            <a:lvl5pPr marL="2057400" indent="-228600">
+              <a:defRPr>
+                <a:solidFill>
+                  <a:schemeClr val="tx1"/>
+                </a:solidFill>
+                <a:latin typeface="Calibri" panose="020F0502020204030204" pitchFamily="34" charset="0"/>
+              </a:defRPr>
+            </a:lvl5pPr>
+            <a:lvl6pPr marL="2514600" indent="-228600" eaLnBrk="0" fontAlgn="base" hangingPunct="0">
+              <a:spcBef>
+                <a:spcPct val="0"/>
+              </a:spcBef>
+              <a:spcAft>
+                <a:spcPct val="0"/>
+              </a:spcAft>
+              <a:defRPr>
+                <a:solidFill>
+                  <a:schemeClr val="tx1"/>
+                </a:solidFill>
+                <a:latin typeface="Calibri" panose="020F0502020204030204" pitchFamily="34" charset="0"/>
+              </a:defRPr>
+            </a:lvl6pPr>
+            <a:lvl7pPr marL="2971800" indent="-228600" eaLnBrk="0" fontAlgn="base" hangingPunct="0">
+              <a:spcBef>
+                <a:spcPct val="0"/>
+              </a:spcBef>
+              <a:spcAft>
+                <a:spcPct val="0"/>
+              </a:spcAft>
+              <a:defRPr>
+                <a:solidFill>
+                  <a:schemeClr val="tx1"/>
+                </a:solidFill>
+                <a:latin typeface="Calibri" panose="020F0502020204030204" pitchFamily="34" charset="0"/>
+              </a:defRPr>
+            </a:lvl7pPr>
+            <a:lvl8pPr marL="3429000" indent="-228600" eaLnBrk="0" fontAlgn="base" hangingPunct="0">
+              <a:spcBef>
+                <a:spcPct val="0"/>
+              </a:spcBef>
+              <a:spcAft>
+                <a:spcPct val="0"/>
+              </a:spcAft>
+              <a:defRPr>
+                <a:solidFill>
+                  <a:schemeClr val="tx1"/>
+                </a:solidFill>
+                <a:latin typeface="Calibri" panose="020F0502020204030204" pitchFamily="34" charset="0"/>
+              </a:defRPr>
+            </a:lvl8pPr>
+            <a:lvl9pPr marL="3886200" indent="-228600" eaLnBrk="0" fontAlgn="base" hangingPunct="0">
+              <a:spcBef>
+                <a:spcPct val="0"/>
+              </a:spcBef>
+              <a:spcAft>
+                <a:spcPct val="0"/>
+              </a:spcAft>
+              <a:defRPr>
+                <a:solidFill>
+                  <a:schemeClr val="tx1"/>
+                </a:solidFill>
+                <a:latin typeface="Calibri" panose="020F0502020204030204" pitchFamily="34" charset="0"/>
+              </a:defRPr>
+            </a:lvl9pPr>
+          </a:lstStyle>
+          <a:p>
+            <a:pPr algn="ctr" eaLnBrk="1" hangingPunct="1"/>
+            <a:r>
+              <a:rPr lang="en-US" altLang="en-US" sz="1200" i="1" dirty="0">
+                <a:latin typeface="Arial" panose="020B0604020202020204" pitchFamily="34" charset="0"/>
+                <a:cs typeface="Arial" panose="020B0604020202020204" pitchFamily="34" charset="0"/>
+              </a:rPr>
+              <a:t>Device </a:t>
+            </a:r>
+            <a:r>
+              <a:rPr lang="en-US" altLang="en-US" sz="1200" i="1" dirty="0" smtClean="0">
+                <a:latin typeface="Arial" panose="020B0604020202020204" pitchFamily="34" charset="0"/>
+                <a:cs typeface="Arial" panose="020B0604020202020204" pitchFamily="34" charset="0"/>
+              </a:rPr>
+              <a:t>metrics</a:t>
+            </a:r>
+          </a:p>
+          <a:p>
+            <a:pPr algn="ctr" eaLnBrk="1" hangingPunct="1"/>
+            <a:r>
+              <a:rPr lang="en-US" altLang="en-US" sz="1200" i="1" dirty="0" smtClean="0">
+                <a:solidFill>
+                  <a:srgbClr val="FF0000"/>
+                </a:solidFill>
+                <a:latin typeface="Arial" panose="020B0604020202020204" pitchFamily="34" charset="0"/>
+                <a:cs typeface="Arial" panose="020B0604020202020204" pitchFamily="34" charset="0"/>
+              </a:rPr>
+              <a:t>[or data?]</a:t>
+            </a:r>
+            <a:endParaRPr lang="en-US" altLang="en-US" sz="1200" i="1" dirty="0">
+              <a:solidFill>
+                <a:srgbClr val="FF0000"/>
+              </a:solidFill>
+              <a:latin typeface="Arial" panose="020B0604020202020204" pitchFamily="34" charset="0"/>
+              <a:cs typeface="Arial" panose="020B0604020202020204" pitchFamily="34" charset="0"/>
+            </a:endParaRPr>
+          </a:p>
+        </p:txBody>
+      </p:sp>
+      <p:pic>
+        <p:nvPicPr>
+          <p:cNvPr id="32" name="Graphic 7">
+            <a:extLst>
+              <a:ext uri="{FF2B5EF4-FFF2-40B4-BE49-F238E27FC236}">
+                <a16:creationId xmlns:a16="http://schemas.microsoft.com/office/drawing/2014/main" id="{AC44BFCB-860A-4E10-9A31-CE9540ED655B}"/>
+              </a:ext>
+            </a:extLst>
+          </p:cNvPr>
+          <p:cNvPicPr>
+            <a:picLocks noChangeAspect="1" noChangeArrowheads="1"/>
+          </p:cNvPicPr>
+          <p:nvPr/>
+        </p:nvPicPr>
+        <p:blipFill>
+          <a:blip r:embed="rId3" cstate="hqprint">
+            <a:extLst>
+              <a:ext uri="{28A0092B-C50C-407E-A947-70E740481C1C}">
+                <a14:useLocalDpi xmlns:a14="http://schemas.microsoft.com/office/drawing/2010/main" val="0"/>
+              </a:ext>
+            </a:extLst>
+          </a:blip>
+          <a:srcRect/>
+          <a:stretch>
+            <a:fillRect/>
+          </a:stretch>
+        </p:blipFill>
+        <p:spPr bwMode="auto">
+          <a:xfrm>
+            <a:off x="8681910" y="1476882"/>
+            <a:ext cx="762000" cy="762000"/>
+          </a:xfrm>
+          <a:prstGeom prst="rect">
+            <a:avLst/>
+          </a:prstGeom>
+          <a:noFill/>
+          <a:ln>
+            <a:noFill/>
+          </a:ln>
+          <a:extLst>
+            <a:ext uri="{909E8E84-426E-40DD-AFC4-6F175D3DCCD1}">
+              <a14:hiddenFill xmlns:a14="http://schemas.microsoft.com/office/drawing/2010/main">
+                <a:solidFill>
+                  <a:srgbClr val="FFFFFF"/>
+                </a:solidFill>
+              </a14:hiddenFill>
+            </a:ext>
+            <a:ext uri="{91240B29-F687-4F45-9708-019B960494DF}">
+              <a14:hiddenLine xmlns:a14="http://schemas.microsoft.com/office/drawing/2010/main" w="9525">
+                <a:solidFill>
+                  <a:srgbClr val="000000"/>
+                </a:solidFill>
+                <a:miter lim="800000"/>
+                <a:headEnd/>
+                <a:tailEnd/>
+              </a14:hiddenLine>
+            </a:ext>
+          </a:extLst>
+        </p:spPr>
+      </p:pic>
+      <p:sp>
+        <p:nvSpPr>
+          <p:cNvPr id="34" name="TextBox 10">
+            <a:extLst>
+              <a:ext uri="{FF2B5EF4-FFF2-40B4-BE49-F238E27FC236}">
+                <a16:creationId xmlns:a16="http://schemas.microsoft.com/office/drawing/2014/main" id="{B1CABB76-13BF-47B1-BA18-C0A34763F4CA}"/>
+              </a:ext>
+            </a:extLst>
+          </p:cNvPr>
+          <p:cNvSpPr txBox="1">
+            <a:spLocks noChangeArrowheads="1"/>
+          </p:cNvSpPr>
+          <p:nvPr/>
+        </p:nvSpPr>
+        <p:spPr bwMode="auto">
+          <a:xfrm>
+            <a:off x="7987191" y="2242630"/>
+            <a:ext cx="2268537" cy="276999"/>
+          </a:xfrm>
+          <a:prstGeom prst="rect">
+            <a:avLst/>
+          </a:prstGeom>
+          <a:noFill/>
+          <a:ln>
+            <a:noFill/>
+          </a:ln>
+          <a:extLst>
+            <a:ext uri="{909E8E84-426E-40DD-AFC4-6F175D3DCCD1}">
+              <a14:hiddenFill xmlns:a14="http://schemas.microsoft.com/office/drawing/2010/main">
+                <a:solidFill>
+                  <a:srgbClr val="FFFFFF"/>
+                </a:solidFill>
+              </a14:hiddenFill>
+            </a:ext>
+            <a:ext uri="{91240B29-F687-4F45-9708-019B960494DF}">
+              <a14:hiddenLine xmlns:a14="http://schemas.microsoft.com/office/drawing/2010/main" w="9525">
+                <a:solidFill>
+                  <a:srgbClr val="000000"/>
+                </a:solidFill>
+                <a:miter lim="800000"/>
+                <a:headEnd/>
+                <a:tailEnd/>
+              </a14:hiddenLine>
+            </a:ext>
+          </a:extLst>
+        </p:spPr>
+        <p:txBody>
+          <a:bodyPr>
+            <a:spAutoFit/>
+          </a:bodyPr>
+          <a:lstStyle>
+            <a:lvl1pPr>
+              <a:defRPr>
+                <a:solidFill>
+                  <a:schemeClr val="tx1"/>
+                </a:solidFill>
+                <a:latin typeface="Calibri" panose="020F0502020204030204" pitchFamily="34" charset="0"/>
+              </a:defRPr>
+            </a:lvl1pPr>
+            <a:lvl2pPr marL="742950" indent="-285750">
+              <a:defRPr>
+                <a:solidFill>
+                  <a:schemeClr val="tx1"/>
+                </a:solidFill>
+                <a:latin typeface="Calibri" panose="020F0502020204030204" pitchFamily="34" charset="0"/>
+              </a:defRPr>
+            </a:lvl2pPr>
+            <a:lvl3pPr marL="1143000" indent="-228600">
+              <a:defRPr>
+                <a:solidFill>
+                  <a:schemeClr val="tx1"/>
+                </a:solidFill>
+                <a:latin typeface="Calibri" panose="020F0502020204030204" pitchFamily="34" charset="0"/>
+              </a:defRPr>
+            </a:lvl3pPr>
+            <a:lvl4pPr marL="1600200" indent="-228600">
+              <a:defRPr>
+                <a:solidFill>
+                  <a:schemeClr val="tx1"/>
+                </a:solidFill>
+                <a:latin typeface="Calibri" panose="020F0502020204030204" pitchFamily="34" charset="0"/>
+              </a:defRPr>
+            </a:lvl4pPr>
+            <a:lvl5pPr marL="2057400" indent="-228600">
+              <a:defRPr>
+                <a:solidFill>
+                  <a:schemeClr val="tx1"/>
+                </a:solidFill>
+                <a:latin typeface="Calibri" panose="020F0502020204030204" pitchFamily="34" charset="0"/>
+              </a:defRPr>
+            </a:lvl5pPr>
+            <a:lvl6pPr marL="2514600" indent="-228600" eaLnBrk="0" fontAlgn="base" hangingPunct="0">
+              <a:spcBef>
+                <a:spcPct val="0"/>
+              </a:spcBef>
+              <a:spcAft>
+                <a:spcPct val="0"/>
+              </a:spcAft>
+              <a:defRPr>
+                <a:solidFill>
+                  <a:schemeClr val="tx1"/>
+                </a:solidFill>
+                <a:latin typeface="Calibri" panose="020F0502020204030204" pitchFamily="34" charset="0"/>
+              </a:defRPr>
+            </a:lvl6pPr>
+            <a:lvl7pPr marL="2971800" indent="-228600" eaLnBrk="0" fontAlgn="base" hangingPunct="0">
+              <a:spcBef>
+                <a:spcPct val="0"/>
+              </a:spcBef>
+              <a:spcAft>
+                <a:spcPct val="0"/>
+              </a:spcAft>
+              <a:defRPr>
+                <a:solidFill>
+                  <a:schemeClr val="tx1"/>
+                </a:solidFill>
+                <a:latin typeface="Calibri" panose="020F0502020204030204" pitchFamily="34" charset="0"/>
+              </a:defRPr>
+            </a:lvl7pPr>
+            <a:lvl8pPr marL="3429000" indent="-228600" eaLnBrk="0" fontAlgn="base" hangingPunct="0">
+              <a:spcBef>
+                <a:spcPct val="0"/>
+              </a:spcBef>
+              <a:spcAft>
+                <a:spcPct val="0"/>
+              </a:spcAft>
+              <a:defRPr>
+                <a:solidFill>
+                  <a:schemeClr val="tx1"/>
+                </a:solidFill>
+                <a:latin typeface="Calibri" panose="020F0502020204030204" pitchFamily="34" charset="0"/>
+              </a:defRPr>
+            </a:lvl8pPr>
+            <a:lvl9pPr marL="3886200" indent="-228600" eaLnBrk="0" fontAlgn="base" hangingPunct="0">
+              <a:spcBef>
+                <a:spcPct val="0"/>
+              </a:spcBef>
+              <a:spcAft>
+                <a:spcPct val="0"/>
+              </a:spcAft>
+              <a:defRPr>
+                <a:solidFill>
+                  <a:schemeClr val="tx1"/>
+                </a:solidFill>
+                <a:latin typeface="Calibri" panose="020F0502020204030204" pitchFamily="34" charset="0"/>
+              </a:defRPr>
+            </a:lvl9pPr>
+          </a:lstStyle>
+          <a:p>
+            <a:pPr algn="ctr" eaLnBrk="1" hangingPunct="1"/>
+            <a:r>
+              <a:rPr lang="en-US" altLang="en-US" sz="1200" dirty="0">
+                <a:latin typeface="Arial" panose="020B0604020202020204" pitchFamily="34" charset="0"/>
+                <a:ea typeface="Amazon Ember" panose="020B0603020204020204" pitchFamily="34" charset="0"/>
+                <a:cs typeface="Arial" panose="020B0604020202020204" pitchFamily="34" charset="0"/>
+              </a:rPr>
+              <a:t>Amazon QuickSight</a:t>
+            </a:r>
+          </a:p>
+        </p:txBody>
+      </p:sp>
+      <p:pic>
+        <p:nvPicPr>
+          <p:cNvPr id="36" name="Graphic 21">
+            <a:extLst>
+              <a:ext uri="{FF2B5EF4-FFF2-40B4-BE49-F238E27FC236}">
+                <a16:creationId xmlns:a16="http://schemas.microsoft.com/office/drawing/2014/main" id="{E7CA3222-F768-4208-8A95-A09CCE0CD40D}"/>
+              </a:ext>
+            </a:extLst>
+          </p:cNvPr>
+          <p:cNvPicPr>
+            <a:picLocks noChangeAspect="1" noChangeArrowheads="1"/>
+          </p:cNvPicPr>
+          <p:nvPr/>
+        </p:nvPicPr>
+        <p:blipFill>
+          <a:blip r:embed="rId4" cstate="hqprint">
+            <a:extLst>
+              <a:ext uri="{28A0092B-C50C-407E-A947-70E740481C1C}">
+                <a14:useLocalDpi xmlns:a14="http://schemas.microsoft.com/office/drawing/2010/main" val="0"/>
+              </a:ext>
+            </a:extLst>
+          </a:blip>
+          <a:srcRect/>
+          <a:stretch>
+            <a:fillRect/>
+          </a:stretch>
+        </p:blipFill>
+        <p:spPr bwMode="auto">
+          <a:xfrm>
+            <a:off x="6782011" y="1478216"/>
+            <a:ext cx="762000" cy="762000"/>
+          </a:xfrm>
+          <a:prstGeom prst="rect">
+            <a:avLst/>
+          </a:prstGeom>
+          <a:noFill/>
+          <a:ln>
+            <a:noFill/>
+          </a:ln>
+          <a:extLst>
+            <a:ext uri="{909E8E84-426E-40DD-AFC4-6F175D3DCCD1}">
+              <a14:hiddenFill xmlns:a14="http://schemas.microsoft.com/office/drawing/2010/main">
+                <a:solidFill>
+                  <a:srgbClr val="FFFFFF"/>
+                </a:solidFill>
+              </a14:hiddenFill>
+            </a:ext>
+            <a:ext uri="{91240B29-F687-4F45-9708-019B960494DF}">
+              <a14:hiddenLine xmlns:a14="http://schemas.microsoft.com/office/drawing/2010/main" w="9525">
+                <a:solidFill>
+                  <a:srgbClr val="000000"/>
+                </a:solidFill>
+                <a:miter lim="800000"/>
+                <a:headEnd/>
+                <a:tailEnd/>
+              </a14:hiddenLine>
+            </a:ext>
+          </a:extLst>
+        </p:spPr>
+      </p:pic>
+      <p:sp>
+        <p:nvSpPr>
+          <p:cNvPr id="37" name="TextBox 12">
+            <a:extLst>
+              <a:ext uri="{FF2B5EF4-FFF2-40B4-BE49-F238E27FC236}">
+                <a16:creationId xmlns:a16="http://schemas.microsoft.com/office/drawing/2014/main" id="{EC0A37F5-E39C-4371-80C5-1BF478F4F312}"/>
+              </a:ext>
+            </a:extLst>
+          </p:cNvPr>
+          <p:cNvSpPr txBox="1">
+            <a:spLocks noChangeArrowheads="1"/>
+          </p:cNvSpPr>
+          <p:nvPr/>
+        </p:nvSpPr>
+        <p:spPr bwMode="auto">
+          <a:xfrm>
+            <a:off x="6023186" y="2242630"/>
+            <a:ext cx="2279650" cy="276999"/>
+          </a:xfrm>
+          <a:prstGeom prst="rect">
+            <a:avLst/>
+          </a:prstGeom>
+          <a:noFill/>
+          <a:ln>
+            <a:noFill/>
+          </a:ln>
+          <a:extLst>
+            <a:ext uri="{909E8E84-426E-40DD-AFC4-6F175D3DCCD1}">
+              <a14:hiddenFill xmlns:a14="http://schemas.microsoft.com/office/drawing/2010/main">
+                <a:solidFill>
+                  <a:srgbClr val="FFFFFF"/>
+                </a:solidFill>
+              </a14:hiddenFill>
+            </a:ext>
+            <a:ext uri="{91240B29-F687-4F45-9708-019B960494DF}">
+              <a14:hiddenLine xmlns:a14="http://schemas.microsoft.com/office/drawing/2010/main" w="9525">
+                <a:solidFill>
+                  <a:srgbClr val="000000"/>
+                </a:solidFill>
+                <a:miter lim="800000"/>
+                <a:headEnd/>
+                <a:tailEnd/>
+              </a14:hiddenLine>
+            </a:ext>
+          </a:extLst>
+        </p:spPr>
+        <p:txBody>
+          <a:bodyPr>
+            <a:spAutoFit/>
+          </a:bodyPr>
+          <a:lstStyle>
+            <a:lvl1pPr>
+              <a:defRPr>
+                <a:solidFill>
+                  <a:schemeClr val="tx1"/>
+                </a:solidFill>
+                <a:latin typeface="Calibri" panose="020F0502020204030204" pitchFamily="34" charset="0"/>
+              </a:defRPr>
+            </a:lvl1pPr>
+            <a:lvl2pPr marL="742950" indent="-285750">
+              <a:defRPr>
+                <a:solidFill>
+                  <a:schemeClr val="tx1"/>
+                </a:solidFill>
+                <a:latin typeface="Calibri" panose="020F0502020204030204" pitchFamily="34" charset="0"/>
+              </a:defRPr>
+            </a:lvl2pPr>
+            <a:lvl3pPr marL="1143000" indent="-228600">
+              <a:defRPr>
+                <a:solidFill>
+                  <a:schemeClr val="tx1"/>
+                </a:solidFill>
+                <a:latin typeface="Calibri" panose="020F0502020204030204" pitchFamily="34" charset="0"/>
+              </a:defRPr>
+            </a:lvl3pPr>
+            <a:lvl4pPr marL="1600200" indent="-228600">
+              <a:defRPr>
+                <a:solidFill>
+                  <a:schemeClr val="tx1"/>
+                </a:solidFill>
+                <a:latin typeface="Calibri" panose="020F0502020204030204" pitchFamily="34" charset="0"/>
+              </a:defRPr>
+            </a:lvl4pPr>
+            <a:lvl5pPr marL="2057400" indent="-228600">
+              <a:defRPr>
+                <a:solidFill>
+                  <a:schemeClr val="tx1"/>
+                </a:solidFill>
+                <a:latin typeface="Calibri" panose="020F0502020204030204" pitchFamily="34" charset="0"/>
+              </a:defRPr>
+            </a:lvl5pPr>
+            <a:lvl6pPr marL="2514600" indent="-228600" eaLnBrk="0" fontAlgn="base" hangingPunct="0">
+              <a:spcBef>
+                <a:spcPct val="0"/>
+              </a:spcBef>
+              <a:spcAft>
+                <a:spcPct val="0"/>
+              </a:spcAft>
+              <a:defRPr>
+                <a:solidFill>
+                  <a:schemeClr val="tx1"/>
+                </a:solidFill>
+                <a:latin typeface="Calibri" panose="020F0502020204030204" pitchFamily="34" charset="0"/>
+              </a:defRPr>
+            </a:lvl6pPr>
+            <a:lvl7pPr marL="2971800" indent="-228600" eaLnBrk="0" fontAlgn="base" hangingPunct="0">
+              <a:spcBef>
+                <a:spcPct val="0"/>
+              </a:spcBef>
+              <a:spcAft>
+                <a:spcPct val="0"/>
+              </a:spcAft>
+              <a:defRPr>
+                <a:solidFill>
+                  <a:schemeClr val="tx1"/>
+                </a:solidFill>
+                <a:latin typeface="Calibri" panose="020F0502020204030204" pitchFamily="34" charset="0"/>
+              </a:defRPr>
+            </a:lvl7pPr>
+            <a:lvl8pPr marL="3429000" indent="-228600" eaLnBrk="0" fontAlgn="base" hangingPunct="0">
+              <a:spcBef>
+                <a:spcPct val="0"/>
+              </a:spcBef>
+              <a:spcAft>
+                <a:spcPct val="0"/>
+              </a:spcAft>
+              <a:defRPr>
+                <a:solidFill>
+                  <a:schemeClr val="tx1"/>
+                </a:solidFill>
+                <a:latin typeface="Calibri" panose="020F0502020204030204" pitchFamily="34" charset="0"/>
+              </a:defRPr>
+            </a:lvl8pPr>
+            <a:lvl9pPr marL="3886200" indent="-228600" eaLnBrk="0" fontAlgn="base" hangingPunct="0">
+              <a:spcBef>
+                <a:spcPct val="0"/>
+              </a:spcBef>
+              <a:spcAft>
+                <a:spcPct val="0"/>
+              </a:spcAft>
+              <a:defRPr>
+                <a:solidFill>
+                  <a:schemeClr val="tx1"/>
+                </a:solidFill>
+                <a:latin typeface="Calibri" panose="020F0502020204030204" pitchFamily="34" charset="0"/>
+              </a:defRPr>
+            </a:lvl9pPr>
+          </a:lstStyle>
+          <a:p>
+            <a:pPr algn="ctr" eaLnBrk="1" hangingPunct="1"/>
+            <a:r>
+              <a:rPr lang="en-US" altLang="en-US" sz="1200" dirty="0">
+                <a:latin typeface="Arial" panose="020B0604020202020204" pitchFamily="34" charset="0"/>
+                <a:ea typeface="Amazon Ember" panose="020B0603020204020204" pitchFamily="34" charset="0"/>
+                <a:cs typeface="Arial" panose="020B0604020202020204" pitchFamily="34" charset="0"/>
+              </a:rPr>
+              <a:t>AWS loT Analytics</a:t>
+            </a:r>
+          </a:p>
+        </p:txBody>
+      </p:sp>
+      <p:pic>
+        <p:nvPicPr>
+          <p:cNvPr id="38" name="Graphic 6">
+            <a:extLst>
+              <a:ext uri="{FF2B5EF4-FFF2-40B4-BE49-F238E27FC236}">
+                <a16:creationId xmlns:a16="http://schemas.microsoft.com/office/drawing/2014/main" id="{7B14F955-04A9-4246-8B5B-708670E78714}"/>
+              </a:ext>
+            </a:extLst>
+          </p:cNvPr>
+          <p:cNvPicPr>
+            <a:picLocks noChangeAspect="1" noChangeArrowheads="1"/>
+          </p:cNvPicPr>
+          <p:nvPr/>
+        </p:nvPicPr>
+        <p:blipFill>
+          <a:blip r:embed="rId5" cstate="hqprint">
+            <a:extLst>
+              <a:ext uri="{28A0092B-C50C-407E-A947-70E740481C1C}">
+                <a14:useLocalDpi xmlns:a14="http://schemas.microsoft.com/office/drawing/2010/main" val="0"/>
+              </a:ext>
+            </a:extLst>
+          </a:blip>
+          <a:srcRect/>
+          <a:stretch>
+            <a:fillRect/>
+          </a:stretch>
+        </p:blipFill>
+        <p:spPr bwMode="auto">
+          <a:xfrm>
+            <a:off x="4980289" y="1479460"/>
+            <a:ext cx="762000" cy="762000"/>
+          </a:xfrm>
+          <a:prstGeom prst="rect">
+            <a:avLst/>
+          </a:prstGeom>
+          <a:noFill/>
+          <a:ln>
+            <a:noFill/>
+          </a:ln>
+          <a:extLst>
+            <a:ext uri="{909E8E84-426E-40DD-AFC4-6F175D3DCCD1}">
+              <a14:hiddenFill xmlns:a14="http://schemas.microsoft.com/office/drawing/2010/main">
+                <a:solidFill>
+                  <a:srgbClr val="FFFFFF"/>
+                </a:solidFill>
+              </a14:hiddenFill>
+            </a:ext>
+            <a:ext uri="{91240B29-F687-4F45-9708-019B960494DF}">
+              <a14:hiddenLine xmlns:a14="http://schemas.microsoft.com/office/drawing/2010/main" w="9525">
+                <a:solidFill>
+                  <a:srgbClr val="000000"/>
+                </a:solidFill>
+                <a:miter lim="800000"/>
+                <a:headEnd/>
+                <a:tailEnd/>
+              </a14:hiddenLine>
+            </a:ext>
+          </a:extLst>
+        </p:spPr>
+      </p:pic>
+      <p:sp>
+        <p:nvSpPr>
+          <p:cNvPr id="39" name="TextBox 9">
+            <a:extLst>
+              <a:ext uri="{FF2B5EF4-FFF2-40B4-BE49-F238E27FC236}">
+                <a16:creationId xmlns:a16="http://schemas.microsoft.com/office/drawing/2014/main" id="{D74A4489-6EF9-4C42-8389-DEA841189CC2}"/>
+              </a:ext>
+            </a:extLst>
+          </p:cNvPr>
+          <p:cNvSpPr txBox="1">
+            <a:spLocks noChangeArrowheads="1"/>
+          </p:cNvSpPr>
+          <p:nvPr/>
+        </p:nvSpPr>
+        <p:spPr bwMode="auto">
+          <a:xfrm>
+            <a:off x="270848" y="2100701"/>
+            <a:ext cx="1740820" cy="830997"/>
+          </a:xfrm>
+          <a:prstGeom prst="rect">
+            <a:avLst/>
+          </a:prstGeom>
+          <a:noFill/>
+          <a:ln>
+            <a:noFill/>
+          </a:ln>
+          <a:extLst>
+            <a:ext uri="{909E8E84-426E-40DD-AFC4-6F175D3DCCD1}">
+              <a14:hiddenFill xmlns:a14="http://schemas.microsoft.com/office/drawing/2010/main">
+                <a:solidFill>
+                  <a:srgbClr val="FFFFFF"/>
+                </a:solidFill>
+              </a14:hiddenFill>
+            </a:ext>
+            <a:ext uri="{91240B29-F687-4F45-9708-019B960494DF}">
+              <a14:hiddenLine xmlns:a14="http://schemas.microsoft.com/office/drawing/2010/main" w="9525">
+                <a:solidFill>
+                  <a:srgbClr val="000000"/>
+                </a:solidFill>
+                <a:miter lim="800000"/>
+                <a:headEnd/>
+                <a:tailEnd/>
+              </a14:hiddenLine>
+            </a:ext>
+          </a:extLst>
+        </p:spPr>
+        <p:txBody>
+          <a:bodyPr wrap="square">
+            <a:spAutoFit/>
+          </a:bodyPr>
+          <a:lstStyle>
+            <a:lvl1pPr>
+              <a:defRPr>
+                <a:solidFill>
+                  <a:schemeClr val="tx1"/>
+                </a:solidFill>
+                <a:latin typeface="Calibri" panose="020F0502020204030204" pitchFamily="34" charset="0"/>
+              </a:defRPr>
+            </a:lvl1pPr>
+            <a:lvl2pPr marL="742950" indent="-285750">
+              <a:defRPr>
+                <a:solidFill>
+                  <a:schemeClr val="tx1"/>
+                </a:solidFill>
+                <a:latin typeface="Calibri" panose="020F0502020204030204" pitchFamily="34" charset="0"/>
+              </a:defRPr>
+            </a:lvl2pPr>
+            <a:lvl3pPr marL="1143000" indent="-228600">
+              <a:defRPr>
+                <a:solidFill>
+                  <a:schemeClr val="tx1"/>
+                </a:solidFill>
+                <a:latin typeface="Calibri" panose="020F0502020204030204" pitchFamily="34" charset="0"/>
+              </a:defRPr>
+            </a:lvl3pPr>
+            <a:lvl4pPr marL="1600200" indent="-228600">
+              <a:defRPr>
+                <a:solidFill>
+                  <a:schemeClr val="tx1"/>
+                </a:solidFill>
+                <a:latin typeface="Calibri" panose="020F0502020204030204" pitchFamily="34" charset="0"/>
+              </a:defRPr>
+            </a:lvl4pPr>
+            <a:lvl5pPr marL="2057400" indent="-228600">
+              <a:defRPr>
+                <a:solidFill>
+                  <a:schemeClr val="tx1"/>
+                </a:solidFill>
+                <a:latin typeface="Calibri" panose="020F0502020204030204" pitchFamily="34" charset="0"/>
+              </a:defRPr>
+            </a:lvl5pPr>
+            <a:lvl6pPr marL="2514600" indent="-228600" eaLnBrk="0" fontAlgn="base" hangingPunct="0">
+              <a:spcBef>
+                <a:spcPct val="0"/>
+              </a:spcBef>
+              <a:spcAft>
+                <a:spcPct val="0"/>
+              </a:spcAft>
+              <a:defRPr>
+                <a:solidFill>
+                  <a:schemeClr val="tx1"/>
+                </a:solidFill>
+                <a:latin typeface="Calibri" panose="020F0502020204030204" pitchFamily="34" charset="0"/>
+              </a:defRPr>
+            </a:lvl6pPr>
+            <a:lvl7pPr marL="2971800" indent="-228600" eaLnBrk="0" fontAlgn="base" hangingPunct="0">
+              <a:spcBef>
+                <a:spcPct val="0"/>
+              </a:spcBef>
+              <a:spcAft>
+                <a:spcPct val="0"/>
+              </a:spcAft>
+              <a:defRPr>
+                <a:solidFill>
+                  <a:schemeClr val="tx1"/>
+                </a:solidFill>
+                <a:latin typeface="Calibri" panose="020F0502020204030204" pitchFamily="34" charset="0"/>
+              </a:defRPr>
+            </a:lvl7pPr>
+            <a:lvl8pPr marL="3429000" indent="-228600" eaLnBrk="0" fontAlgn="base" hangingPunct="0">
+              <a:spcBef>
+                <a:spcPct val="0"/>
+              </a:spcBef>
+              <a:spcAft>
+                <a:spcPct val="0"/>
+              </a:spcAft>
+              <a:defRPr>
+                <a:solidFill>
+                  <a:schemeClr val="tx1"/>
+                </a:solidFill>
+                <a:latin typeface="Calibri" panose="020F0502020204030204" pitchFamily="34" charset="0"/>
+              </a:defRPr>
+            </a:lvl8pPr>
+            <a:lvl9pPr marL="3886200" indent="-228600" eaLnBrk="0" fontAlgn="base" hangingPunct="0">
+              <a:spcBef>
+                <a:spcPct val="0"/>
+              </a:spcBef>
+              <a:spcAft>
+                <a:spcPct val="0"/>
+              </a:spcAft>
+              <a:defRPr>
+                <a:solidFill>
+                  <a:schemeClr val="tx1"/>
+                </a:solidFill>
+                <a:latin typeface="Calibri" panose="020F0502020204030204" pitchFamily="34" charset="0"/>
+              </a:defRPr>
+            </a:lvl9pPr>
+          </a:lstStyle>
+          <a:p>
+            <a:pPr algn="ctr" eaLnBrk="1" hangingPunct="1"/>
+            <a:r>
+              <a:rPr lang="en-US" altLang="en-US" sz="1200" i="1" dirty="0" smtClean="0">
+                <a:latin typeface="Arial" panose="020B0604020202020204" pitchFamily="34" charset="0"/>
+                <a:ea typeface="Amazon Ember" panose="020B0603020204020204" pitchFamily="34" charset="0"/>
+                <a:cs typeface="Arial" panose="020B0604020202020204" pitchFamily="34" charset="0"/>
+              </a:rPr>
+              <a:t>Create a standalone label for this icon when we know exactly what it needs to say.</a:t>
+            </a:r>
+            <a:endParaRPr lang="en-US" altLang="en-US" sz="1200" i="1" dirty="0">
+              <a:solidFill>
+                <a:srgbClr val="FF0000"/>
+              </a:solidFill>
+              <a:latin typeface="Arial" panose="020B0604020202020204" pitchFamily="34" charset="0"/>
+              <a:ea typeface="Amazon Ember" panose="020B0603020204020204" pitchFamily="34" charset="0"/>
+              <a:cs typeface="Arial" panose="020B0604020202020204" pitchFamily="34" charset="0"/>
+            </a:endParaRPr>
+          </a:p>
+        </p:txBody>
+      </p:sp>
+      <p:pic>
+        <p:nvPicPr>
+          <p:cNvPr id="40" name="Graphic 17">
+            <a:extLst>
+              <a:ext uri="{FF2B5EF4-FFF2-40B4-BE49-F238E27FC236}">
+                <a16:creationId xmlns:a16="http://schemas.microsoft.com/office/drawing/2014/main" id="{A08B7917-0113-4121-AE23-7D907597515B}"/>
+              </a:ext>
+            </a:extLst>
+          </p:cNvPr>
+          <p:cNvPicPr>
+            <a:picLocks noChangeAspect="1" noChangeArrowheads="1"/>
+          </p:cNvPicPr>
+          <p:nvPr/>
+        </p:nvPicPr>
+        <p:blipFill>
+          <a:blip r:embed="rId6" cstate="hqprint">
+            <a:extLst>
+              <a:ext uri="{28A0092B-C50C-407E-A947-70E740481C1C}">
+                <a14:useLocalDpi xmlns:a14="http://schemas.microsoft.com/office/drawing/2010/main" val="0"/>
+              </a:ext>
+            </a:extLst>
+          </a:blip>
+          <a:srcRect/>
+          <a:stretch>
+            <a:fillRect/>
+          </a:stretch>
+        </p:blipFill>
+        <p:spPr bwMode="auto">
+          <a:xfrm>
+            <a:off x="4977010" y="4406713"/>
+            <a:ext cx="762000" cy="762000"/>
+          </a:xfrm>
+          <a:prstGeom prst="rect">
+            <a:avLst/>
+          </a:prstGeom>
+          <a:noFill/>
+          <a:ln>
+            <a:noFill/>
+          </a:ln>
+          <a:extLst>
+            <a:ext uri="{909E8E84-426E-40DD-AFC4-6F175D3DCCD1}">
+              <a14:hiddenFill xmlns:a14="http://schemas.microsoft.com/office/drawing/2010/main">
+                <a:solidFill>
+                  <a:srgbClr val="FFFFFF"/>
+                </a:solidFill>
+              </a14:hiddenFill>
+            </a:ext>
+            <a:ext uri="{91240B29-F687-4F45-9708-019B960494DF}">
+              <a14:hiddenLine xmlns:a14="http://schemas.microsoft.com/office/drawing/2010/main" w="9525">
+                <a:solidFill>
+                  <a:srgbClr val="000000"/>
+                </a:solidFill>
+                <a:miter lim="800000"/>
+                <a:headEnd/>
+                <a:tailEnd/>
+              </a14:hiddenLine>
+            </a:ext>
+          </a:extLst>
+        </p:spPr>
+      </p:pic>
+      <p:sp>
+        <p:nvSpPr>
+          <p:cNvPr id="41" name="TextBox 9">
+            <a:extLst>
+              <a:ext uri="{FF2B5EF4-FFF2-40B4-BE49-F238E27FC236}">
+                <a16:creationId xmlns:a16="http://schemas.microsoft.com/office/drawing/2014/main" id="{510BB2DD-214C-4048-8B13-0A2F20D1B4B3}"/>
+              </a:ext>
+            </a:extLst>
+          </p:cNvPr>
+          <p:cNvSpPr txBox="1">
+            <a:spLocks noChangeArrowheads="1"/>
+          </p:cNvSpPr>
+          <p:nvPr/>
+        </p:nvSpPr>
+        <p:spPr bwMode="auto">
+          <a:xfrm>
+            <a:off x="4241255" y="5178373"/>
+            <a:ext cx="2243137" cy="276999"/>
+          </a:xfrm>
+          <a:prstGeom prst="rect">
+            <a:avLst/>
+          </a:prstGeom>
+          <a:noFill/>
+          <a:ln>
+            <a:noFill/>
+          </a:ln>
+          <a:extLst>
+            <a:ext uri="{909E8E84-426E-40DD-AFC4-6F175D3DCCD1}">
+              <a14:hiddenFill xmlns:a14="http://schemas.microsoft.com/office/drawing/2010/main">
+                <a:solidFill>
+                  <a:srgbClr val="FFFFFF"/>
+                </a:solidFill>
+              </a14:hiddenFill>
+            </a:ext>
+            <a:ext uri="{91240B29-F687-4F45-9708-019B960494DF}">
+              <a14:hiddenLine xmlns:a14="http://schemas.microsoft.com/office/drawing/2010/main" w="9525">
+                <a:solidFill>
+                  <a:srgbClr val="000000"/>
+                </a:solidFill>
+                <a:miter lim="800000"/>
+                <a:headEnd/>
+                <a:tailEnd/>
+              </a14:hiddenLine>
+            </a:ext>
+          </a:extLst>
+        </p:spPr>
+        <p:txBody>
+          <a:bodyPr>
+            <a:spAutoFit/>
+          </a:bodyPr>
+          <a:lstStyle>
+            <a:lvl1pPr>
+              <a:defRPr>
+                <a:solidFill>
+                  <a:schemeClr val="tx1"/>
+                </a:solidFill>
+                <a:latin typeface="Calibri" panose="020F0502020204030204" pitchFamily="34" charset="0"/>
+              </a:defRPr>
+            </a:lvl1pPr>
+            <a:lvl2pPr marL="742950" indent="-285750">
+              <a:defRPr>
+                <a:solidFill>
+                  <a:schemeClr val="tx1"/>
+                </a:solidFill>
+                <a:latin typeface="Calibri" panose="020F0502020204030204" pitchFamily="34" charset="0"/>
+              </a:defRPr>
+            </a:lvl2pPr>
+            <a:lvl3pPr marL="1143000" indent="-228600">
+              <a:defRPr>
+                <a:solidFill>
+                  <a:schemeClr val="tx1"/>
+                </a:solidFill>
+                <a:latin typeface="Calibri" panose="020F0502020204030204" pitchFamily="34" charset="0"/>
+              </a:defRPr>
+            </a:lvl3pPr>
+            <a:lvl4pPr marL="1600200" indent="-228600">
+              <a:defRPr>
+                <a:solidFill>
+                  <a:schemeClr val="tx1"/>
+                </a:solidFill>
+                <a:latin typeface="Calibri" panose="020F0502020204030204" pitchFamily="34" charset="0"/>
+              </a:defRPr>
+            </a:lvl4pPr>
+            <a:lvl5pPr marL="2057400" indent="-228600">
+              <a:defRPr>
+                <a:solidFill>
+                  <a:schemeClr val="tx1"/>
+                </a:solidFill>
+                <a:latin typeface="Calibri" panose="020F0502020204030204" pitchFamily="34" charset="0"/>
+              </a:defRPr>
+            </a:lvl5pPr>
+            <a:lvl6pPr marL="2514600" indent="-228600" eaLnBrk="0" fontAlgn="base" hangingPunct="0">
+              <a:spcBef>
+                <a:spcPct val="0"/>
+              </a:spcBef>
+              <a:spcAft>
+                <a:spcPct val="0"/>
+              </a:spcAft>
+              <a:defRPr>
+                <a:solidFill>
+                  <a:schemeClr val="tx1"/>
+                </a:solidFill>
+                <a:latin typeface="Calibri" panose="020F0502020204030204" pitchFamily="34" charset="0"/>
+              </a:defRPr>
+            </a:lvl6pPr>
+            <a:lvl7pPr marL="2971800" indent="-228600" eaLnBrk="0" fontAlgn="base" hangingPunct="0">
+              <a:spcBef>
+                <a:spcPct val="0"/>
+              </a:spcBef>
+              <a:spcAft>
+                <a:spcPct val="0"/>
+              </a:spcAft>
+              <a:defRPr>
+                <a:solidFill>
+                  <a:schemeClr val="tx1"/>
+                </a:solidFill>
+                <a:latin typeface="Calibri" panose="020F0502020204030204" pitchFamily="34" charset="0"/>
+              </a:defRPr>
+            </a:lvl7pPr>
+            <a:lvl8pPr marL="3429000" indent="-228600" eaLnBrk="0" fontAlgn="base" hangingPunct="0">
+              <a:spcBef>
+                <a:spcPct val="0"/>
+              </a:spcBef>
+              <a:spcAft>
+                <a:spcPct val="0"/>
+              </a:spcAft>
+              <a:defRPr>
+                <a:solidFill>
+                  <a:schemeClr val="tx1"/>
+                </a:solidFill>
+                <a:latin typeface="Calibri" panose="020F0502020204030204" pitchFamily="34" charset="0"/>
+              </a:defRPr>
+            </a:lvl8pPr>
+            <a:lvl9pPr marL="3886200" indent="-228600" eaLnBrk="0" fontAlgn="base" hangingPunct="0">
+              <a:spcBef>
+                <a:spcPct val="0"/>
+              </a:spcBef>
+              <a:spcAft>
+                <a:spcPct val="0"/>
+              </a:spcAft>
+              <a:defRPr>
+                <a:solidFill>
+                  <a:schemeClr val="tx1"/>
+                </a:solidFill>
+                <a:latin typeface="Calibri" panose="020F0502020204030204" pitchFamily="34" charset="0"/>
+              </a:defRPr>
+            </a:lvl9pPr>
+          </a:lstStyle>
+          <a:p>
+            <a:pPr algn="ctr" eaLnBrk="1" hangingPunct="1"/>
+            <a:r>
+              <a:rPr lang="en-US" altLang="en-US" sz="1200" dirty="0">
+                <a:latin typeface="Arial" panose="020B0604020202020204" pitchFamily="34" charset="0"/>
+                <a:ea typeface="Amazon Ember" panose="020B0603020204020204" pitchFamily="34" charset="0"/>
+                <a:cs typeface="Arial" panose="020B0604020202020204" pitchFamily="34" charset="0"/>
+              </a:rPr>
+              <a:t>Amazon API Gateway</a:t>
+            </a:r>
+          </a:p>
+        </p:txBody>
+      </p:sp>
+      <p:cxnSp>
+        <p:nvCxnSpPr>
+          <p:cNvPr id="42" name="Straight Arrow Connector 41">
+            <a:extLst>
+              <a:ext uri="{FF2B5EF4-FFF2-40B4-BE49-F238E27FC236}">
+                <a16:creationId xmlns:a16="http://schemas.microsoft.com/office/drawing/2014/main" id="{574E0876-8418-4265-ACAA-C286516267D9}"/>
+              </a:ext>
+            </a:extLst>
+          </p:cNvPr>
+          <p:cNvCxnSpPr>
+            <a:cxnSpLocks/>
+            <a:stCxn id="36" idx="3"/>
+            <a:endCxn id="32" idx="1"/>
+          </p:cNvCxnSpPr>
+          <p:nvPr/>
+        </p:nvCxnSpPr>
+        <p:spPr>
+          <a:xfrm flipV="1">
+            <a:off x="7544011" y="1857882"/>
+            <a:ext cx="1137899" cy="1334"/>
+          </a:xfrm>
+          <a:prstGeom prst="straightConnector1">
+            <a:avLst/>
+          </a:prstGeom>
+          <a:ln w="12700">
+            <a:solidFill>
+              <a:schemeClr val="tx2"/>
+            </a:solidFill>
+            <a:headEnd type="none" w="med" len="sm"/>
+            <a:tailEnd type="arrow" w="med" len="sm"/>
+          </a:ln>
+        </p:spPr>
+        <p:style>
+          <a:lnRef idx="1">
+            <a:schemeClr val="accent1"/>
+          </a:lnRef>
+          <a:fillRef idx="0">
+            <a:schemeClr val="accent1"/>
+          </a:fillRef>
+          <a:effectRef idx="0">
+            <a:schemeClr val="accent1"/>
+          </a:effectRef>
+          <a:fontRef idx="minor">
+            <a:schemeClr val="tx1"/>
+          </a:fontRef>
+        </p:style>
+      </p:cxnSp>
+      <p:pic>
+        <p:nvPicPr>
+          <p:cNvPr id="1030" name="Picture 6">
+            <a:extLst>
+              <a:ext uri="{FF2B5EF4-FFF2-40B4-BE49-F238E27FC236}">
+                <a16:creationId xmlns:a16="http://schemas.microsoft.com/office/drawing/2014/main" id="{E5A1C4B6-0D9C-417C-90E5-EBA07BFFD4E4}"/>
+              </a:ext>
+            </a:extLst>
+          </p:cNvPr>
+          <p:cNvPicPr>
+            <a:picLocks noChangeAspect="1" noChangeArrowheads="1"/>
+          </p:cNvPicPr>
+          <p:nvPr/>
+        </p:nvPicPr>
+        <p:blipFill>
+          <a:blip r:embed="rId7">
+            <a:extLst>
+              <a:ext uri="{28A0092B-C50C-407E-A947-70E740481C1C}">
+                <a14:useLocalDpi xmlns:a14="http://schemas.microsoft.com/office/drawing/2010/main" val="0"/>
+              </a:ext>
+            </a:extLst>
+          </a:blip>
+          <a:srcRect/>
+          <a:stretch>
+            <a:fillRect/>
+          </a:stretch>
+        </p:blipFill>
+        <p:spPr bwMode="auto">
+          <a:xfrm>
+            <a:off x="2091895" y="1377274"/>
+            <a:ext cx="1162050" cy="1314450"/>
+          </a:xfrm>
+          <a:prstGeom prst="rect">
+            <a:avLst/>
+          </a:prstGeom>
+          <a:noFill/>
+          <a:extLst>
+            <a:ext uri="{909E8E84-426E-40DD-AFC4-6F175D3DCCD1}">
+              <a14:hiddenFill xmlns:a14="http://schemas.microsoft.com/office/drawing/2010/main">
+                <a:solidFill>
+                  <a:srgbClr val="FFFFFF"/>
+                </a:solidFill>
+              </a14:hiddenFill>
+            </a:ext>
+          </a:extLst>
+        </p:spPr>
+      </p:pic>
+      <p:sp>
+        <p:nvSpPr>
+          <p:cNvPr id="65" name="TextBox 27">
+            <a:extLst>
+              <a:ext uri="{FF2B5EF4-FFF2-40B4-BE49-F238E27FC236}">
+                <a16:creationId xmlns:a16="http://schemas.microsoft.com/office/drawing/2014/main" id="{7B4E5791-9B70-46B5-9B9F-C74FB227BAFC}"/>
+              </a:ext>
+            </a:extLst>
+          </p:cNvPr>
+          <p:cNvSpPr txBox="1">
+            <a:spLocks noChangeArrowheads="1"/>
+          </p:cNvSpPr>
+          <p:nvPr/>
+        </p:nvSpPr>
+        <p:spPr bwMode="auto">
+          <a:xfrm>
+            <a:off x="2374293" y="5905674"/>
+            <a:ext cx="2013943" cy="276999"/>
+          </a:xfrm>
+          <a:prstGeom prst="rect">
+            <a:avLst/>
+          </a:prstGeom>
+          <a:noFill/>
+          <a:ln>
+            <a:noFill/>
+          </a:ln>
+          <a:extLst>
+            <a:ext uri="{909E8E84-426E-40DD-AFC4-6F175D3DCCD1}">
+              <a14:hiddenFill xmlns:a14="http://schemas.microsoft.com/office/drawing/2010/main">
+                <a:solidFill>
+                  <a:srgbClr val="FFFFFF"/>
+                </a:solidFill>
+              </a14:hiddenFill>
+            </a:ext>
+            <a:ext uri="{91240B29-F687-4F45-9708-019B960494DF}">
+              <a14:hiddenLine xmlns:a14="http://schemas.microsoft.com/office/drawing/2010/main" w="9525">
+                <a:solidFill>
+                  <a:srgbClr val="000000"/>
+                </a:solidFill>
+                <a:miter lim="800000"/>
+                <a:headEnd/>
+                <a:tailEnd/>
+              </a14:hiddenLine>
+            </a:ext>
+          </a:extLst>
+        </p:spPr>
+        <p:txBody>
+          <a:bodyPr wrap="square">
+            <a:spAutoFit/>
+          </a:bodyPr>
+          <a:lstStyle>
+            <a:lvl1pPr>
+              <a:defRPr>
+                <a:solidFill>
+                  <a:schemeClr val="tx1"/>
+                </a:solidFill>
+                <a:latin typeface="Calibri" panose="020F0502020204030204" pitchFamily="34" charset="0"/>
+              </a:defRPr>
+            </a:lvl1pPr>
+            <a:lvl2pPr marL="742950" indent="-285750">
+              <a:defRPr>
+                <a:solidFill>
+                  <a:schemeClr val="tx1"/>
+                </a:solidFill>
+                <a:latin typeface="Calibri" panose="020F0502020204030204" pitchFamily="34" charset="0"/>
+              </a:defRPr>
+            </a:lvl2pPr>
+            <a:lvl3pPr marL="1143000" indent="-228600">
+              <a:defRPr>
+                <a:solidFill>
+                  <a:schemeClr val="tx1"/>
+                </a:solidFill>
+                <a:latin typeface="Calibri" panose="020F0502020204030204" pitchFamily="34" charset="0"/>
+              </a:defRPr>
+            </a:lvl3pPr>
+            <a:lvl4pPr marL="1600200" indent="-228600">
+              <a:defRPr>
+                <a:solidFill>
+                  <a:schemeClr val="tx1"/>
+                </a:solidFill>
+                <a:latin typeface="Calibri" panose="020F0502020204030204" pitchFamily="34" charset="0"/>
+              </a:defRPr>
+            </a:lvl4pPr>
+            <a:lvl5pPr marL="2057400" indent="-228600">
+              <a:defRPr>
+                <a:solidFill>
+                  <a:schemeClr val="tx1"/>
+                </a:solidFill>
+                <a:latin typeface="Calibri" panose="020F0502020204030204" pitchFamily="34" charset="0"/>
+              </a:defRPr>
+            </a:lvl5pPr>
+            <a:lvl6pPr marL="2514600" indent="-228600" eaLnBrk="0" fontAlgn="base" hangingPunct="0">
+              <a:spcBef>
+                <a:spcPct val="0"/>
+              </a:spcBef>
+              <a:spcAft>
+                <a:spcPct val="0"/>
+              </a:spcAft>
+              <a:defRPr>
+                <a:solidFill>
+                  <a:schemeClr val="tx1"/>
+                </a:solidFill>
+                <a:latin typeface="Calibri" panose="020F0502020204030204" pitchFamily="34" charset="0"/>
+              </a:defRPr>
+            </a:lvl6pPr>
+            <a:lvl7pPr marL="2971800" indent="-228600" eaLnBrk="0" fontAlgn="base" hangingPunct="0">
+              <a:spcBef>
+                <a:spcPct val="0"/>
+              </a:spcBef>
+              <a:spcAft>
+                <a:spcPct val="0"/>
+              </a:spcAft>
+              <a:defRPr>
+                <a:solidFill>
+                  <a:schemeClr val="tx1"/>
+                </a:solidFill>
+                <a:latin typeface="Calibri" panose="020F0502020204030204" pitchFamily="34" charset="0"/>
+              </a:defRPr>
+            </a:lvl7pPr>
+            <a:lvl8pPr marL="3429000" indent="-228600" eaLnBrk="0" fontAlgn="base" hangingPunct="0">
+              <a:spcBef>
+                <a:spcPct val="0"/>
+              </a:spcBef>
+              <a:spcAft>
+                <a:spcPct val="0"/>
+              </a:spcAft>
+              <a:defRPr>
+                <a:solidFill>
+                  <a:schemeClr val="tx1"/>
+                </a:solidFill>
+                <a:latin typeface="Calibri" panose="020F0502020204030204" pitchFamily="34" charset="0"/>
+              </a:defRPr>
+            </a:lvl8pPr>
+            <a:lvl9pPr marL="3886200" indent="-228600" eaLnBrk="0" fontAlgn="base" hangingPunct="0">
+              <a:spcBef>
+                <a:spcPct val="0"/>
+              </a:spcBef>
+              <a:spcAft>
+                <a:spcPct val="0"/>
+              </a:spcAft>
+              <a:defRPr>
+                <a:solidFill>
+                  <a:schemeClr val="tx1"/>
+                </a:solidFill>
+                <a:latin typeface="Calibri" panose="020F0502020204030204" pitchFamily="34" charset="0"/>
+              </a:defRPr>
+            </a:lvl9pPr>
+          </a:lstStyle>
+          <a:p>
+            <a:pPr algn="ctr" eaLnBrk="1" hangingPunct="1"/>
+            <a:r>
+              <a:rPr lang="en-US" altLang="en-US" sz="1200" i="1" dirty="0">
+                <a:latin typeface="Arial" panose="020B0604020202020204" pitchFamily="34" charset="0"/>
+                <a:cs typeface="Arial" panose="020B0604020202020204" pitchFamily="34" charset="0"/>
+              </a:rPr>
+              <a:t>API Gateway </a:t>
+            </a:r>
+            <a:r>
+              <a:rPr lang="en-US" altLang="en-US" sz="1200" i="1" dirty="0" smtClean="0">
+                <a:latin typeface="Arial" panose="020B0604020202020204" pitchFamily="34" charset="0"/>
+                <a:cs typeface="Arial" panose="020B0604020202020204" pitchFamily="34" charset="0"/>
+              </a:rPr>
+              <a:t>endpoint</a:t>
+            </a:r>
+            <a:endParaRPr lang="en-US" altLang="en-US" sz="1200" i="1" dirty="0">
+              <a:latin typeface="Arial" panose="020B0604020202020204" pitchFamily="34" charset="0"/>
+              <a:cs typeface="Arial" panose="020B0604020202020204" pitchFamily="34" charset="0"/>
+            </a:endParaRPr>
+          </a:p>
+        </p:txBody>
+      </p:sp>
+      <p:sp>
+        <p:nvSpPr>
+          <p:cNvPr id="66" name="TextBox 27">
+            <a:extLst>
+              <a:ext uri="{FF2B5EF4-FFF2-40B4-BE49-F238E27FC236}">
+                <a16:creationId xmlns:a16="http://schemas.microsoft.com/office/drawing/2014/main" id="{D4D08766-FB86-419D-9F9F-77A92978BB3A}"/>
+              </a:ext>
+            </a:extLst>
+          </p:cNvPr>
+          <p:cNvSpPr txBox="1">
+            <a:spLocks noChangeArrowheads="1"/>
+          </p:cNvSpPr>
+          <p:nvPr/>
+        </p:nvSpPr>
+        <p:spPr bwMode="auto">
+          <a:xfrm>
+            <a:off x="3138645" y="5589253"/>
+            <a:ext cx="2013943" cy="276999"/>
+          </a:xfrm>
+          <a:prstGeom prst="rect">
+            <a:avLst/>
+          </a:prstGeom>
+          <a:noFill/>
+          <a:ln>
+            <a:noFill/>
+          </a:ln>
+          <a:extLst>
+            <a:ext uri="{909E8E84-426E-40DD-AFC4-6F175D3DCCD1}">
+              <a14:hiddenFill xmlns:a14="http://schemas.microsoft.com/office/drawing/2010/main">
+                <a:solidFill>
+                  <a:srgbClr val="FFFFFF"/>
+                </a:solidFill>
+              </a14:hiddenFill>
+            </a:ext>
+            <a:ext uri="{91240B29-F687-4F45-9708-019B960494DF}">
+              <a14:hiddenLine xmlns:a14="http://schemas.microsoft.com/office/drawing/2010/main" w="9525">
+                <a:solidFill>
+                  <a:srgbClr val="000000"/>
+                </a:solidFill>
+                <a:miter lim="800000"/>
+                <a:headEnd/>
+                <a:tailEnd/>
+              </a14:hiddenLine>
+            </a:ext>
+          </a:extLst>
+        </p:spPr>
+        <p:txBody>
+          <a:bodyPr wrap="square">
+            <a:spAutoFit/>
+          </a:bodyPr>
+          <a:lstStyle>
+            <a:lvl1pPr>
+              <a:defRPr>
+                <a:solidFill>
+                  <a:schemeClr val="tx1"/>
+                </a:solidFill>
+                <a:latin typeface="Calibri" panose="020F0502020204030204" pitchFamily="34" charset="0"/>
+              </a:defRPr>
+            </a:lvl1pPr>
+            <a:lvl2pPr marL="742950" indent="-285750">
+              <a:defRPr>
+                <a:solidFill>
+                  <a:schemeClr val="tx1"/>
+                </a:solidFill>
+                <a:latin typeface="Calibri" panose="020F0502020204030204" pitchFamily="34" charset="0"/>
+              </a:defRPr>
+            </a:lvl2pPr>
+            <a:lvl3pPr marL="1143000" indent="-228600">
+              <a:defRPr>
+                <a:solidFill>
+                  <a:schemeClr val="tx1"/>
+                </a:solidFill>
+                <a:latin typeface="Calibri" panose="020F0502020204030204" pitchFamily="34" charset="0"/>
+              </a:defRPr>
+            </a:lvl3pPr>
+            <a:lvl4pPr marL="1600200" indent="-228600">
+              <a:defRPr>
+                <a:solidFill>
+                  <a:schemeClr val="tx1"/>
+                </a:solidFill>
+                <a:latin typeface="Calibri" panose="020F0502020204030204" pitchFamily="34" charset="0"/>
+              </a:defRPr>
+            </a:lvl4pPr>
+            <a:lvl5pPr marL="2057400" indent="-228600">
+              <a:defRPr>
+                <a:solidFill>
+                  <a:schemeClr val="tx1"/>
+                </a:solidFill>
+                <a:latin typeface="Calibri" panose="020F0502020204030204" pitchFamily="34" charset="0"/>
+              </a:defRPr>
+            </a:lvl5pPr>
+            <a:lvl6pPr marL="2514600" indent="-228600" eaLnBrk="0" fontAlgn="base" hangingPunct="0">
+              <a:spcBef>
+                <a:spcPct val="0"/>
+              </a:spcBef>
+              <a:spcAft>
+                <a:spcPct val="0"/>
+              </a:spcAft>
+              <a:defRPr>
+                <a:solidFill>
+                  <a:schemeClr val="tx1"/>
+                </a:solidFill>
+                <a:latin typeface="Calibri" panose="020F0502020204030204" pitchFamily="34" charset="0"/>
+              </a:defRPr>
+            </a:lvl6pPr>
+            <a:lvl7pPr marL="2971800" indent="-228600" eaLnBrk="0" fontAlgn="base" hangingPunct="0">
+              <a:spcBef>
+                <a:spcPct val="0"/>
+              </a:spcBef>
+              <a:spcAft>
+                <a:spcPct val="0"/>
+              </a:spcAft>
+              <a:defRPr>
+                <a:solidFill>
+                  <a:schemeClr val="tx1"/>
+                </a:solidFill>
+                <a:latin typeface="Calibri" panose="020F0502020204030204" pitchFamily="34" charset="0"/>
+              </a:defRPr>
+            </a:lvl7pPr>
+            <a:lvl8pPr marL="3429000" indent="-228600" eaLnBrk="0" fontAlgn="base" hangingPunct="0">
+              <a:spcBef>
+                <a:spcPct val="0"/>
+              </a:spcBef>
+              <a:spcAft>
+                <a:spcPct val="0"/>
+              </a:spcAft>
+              <a:defRPr>
+                <a:solidFill>
+                  <a:schemeClr val="tx1"/>
+                </a:solidFill>
+                <a:latin typeface="Calibri" panose="020F0502020204030204" pitchFamily="34" charset="0"/>
+              </a:defRPr>
+            </a:lvl8pPr>
+            <a:lvl9pPr marL="3886200" indent="-228600" eaLnBrk="0" fontAlgn="base" hangingPunct="0">
+              <a:spcBef>
+                <a:spcPct val="0"/>
+              </a:spcBef>
+              <a:spcAft>
+                <a:spcPct val="0"/>
+              </a:spcAft>
+              <a:defRPr>
+                <a:solidFill>
+                  <a:schemeClr val="tx1"/>
+                </a:solidFill>
+                <a:latin typeface="Calibri" panose="020F0502020204030204" pitchFamily="34" charset="0"/>
+              </a:defRPr>
+            </a:lvl9pPr>
+          </a:lstStyle>
+          <a:p>
+            <a:pPr algn="ctr" eaLnBrk="1" hangingPunct="1"/>
+            <a:r>
+              <a:rPr lang="en-US" altLang="en-US" sz="1200" i="1" dirty="0" smtClean="0">
+                <a:latin typeface="Arial" panose="020B0604020202020204" pitchFamily="34" charset="0"/>
+                <a:cs typeface="Arial" panose="020B0604020202020204" pitchFamily="34" charset="0"/>
+              </a:rPr>
+              <a:t>Self-provisioning</a:t>
+            </a:r>
+            <a:endParaRPr lang="en-US" altLang="en-US" sz="1200" i="1" dirty="0">
+              <a:latin typeface="Arial" panose="020B0604020202020204" pitchFamily="34" charset="0"/>
+              <a:cs typeface="Arial" panose="020B0604020202020204" pitchFamily="34" charset="0"/>
+            </a:endParaRPr>
+          </a:p>
+        </p:txBody>
+      </p:sp>
+      <p:sp>
+        <p:nvSpPr>
+          <p:cNvPr id="68" name="TextBox 27">
+            <a:extLst>
+              <a:ext uri="{FF2B5EF4-FFF2-40B4-BE49-F238E27FC236}">
+                <a16:creationId xmlns:a16="http://schemas.microsoft.com/office/drawing/2014/main" id="{DAC6AFFE-2A62-42A9-A209-F852F3AC2E75}"/>
+              </a:ext>
+            </a:extLst>
+          </p:cNvPr>
+          <p:cNvSpPr txBox="1">
+            <a:spLocks noChangeArrowheads="1"/>
+          </p:cNvSpPr>
+          <p:nvPr/>
+        </p:nvSpPr>
+        <p:spPr bwMode="auto">
+          <a:xfrm>
+            <a:off x="6396015" y="5905674"/>
+            <a:ext cx="763678" cy="276999"/>
+          </a:xfrm>
+          <a:prstGeom prst="rect">
+            <a:avLst/>
+          </a:prstGeom>
+          <a:noFill/>
+          <a:ln>
+            <a:noFill/>
+          </a:ln>
+          <a:extLst>
+            <a:ext uri="{909E8E84-426E-40DD-AFC4-6F175D3DCCD1}">
+              <a14:hiddenFill xmlns:a14="http://schemas.microsoft.com/office/drawing/2010/main">
+                <a:solidFill>
+                  <a:srgbClr val="FFFFFF"/>
+                </a:solidFill>
+              </a14:hiddenFill>
+            </a:ext>
+            <a:ext uri="{91240B29-F687-4F45-9708-019B960494DF}">
+              <a14:hiddenLine xmlns:a14="http://schemas.microsoft.com/office/drawing/2010/main" w="9525">
+                <a:solidFill>
+                  <a:srgbClr val="000000"/>
+                </a:solidFill>
+                <a:miter lim="800000"/>
+                <a:headEnd/>
+                <a:tailEnd/>
+              </a14:hiddenLine>
+            </a:ext>
+          </a:extLst>
+        </p:spPr>
+        <p:txBody>
+          <a:bodyPr wrap="square">
+            <a:spAutoFit/>
+          </a:bodyPr>
+          <a:lstStyle>
+            <a:lvl1pPr>
+              <a:defRPr>
+                <a:solidFill>
+                  <a:schemeClr val="tx1"/>
+                </a:solidFill>
+                <a:latin typeface="Calibri" panose="020F0502020204030204" pitchFamily="34" charset="0"/>
+              </a:defRPr>
+            </a:lvl1pPr>
+            <a:lvl2pPr marL="742950" indent="-285750">
+              <a:defRPr>
+                <a:solidFill>
+                  <a:schemeClr val="tx1"/>
+                </a:solidFill>
+                <a:latin typeface="Calibri" panose="020F0502020204030204" pitchFamily="34" charset="0"/>
+              </a:defRPr>
+            </a:lvl2pPr>
+            <a:lvl3pPr marL="1143000" indent="-228600">
+              <a:defRPr>
+                <a:solidFill>
+                  <a:schemeClr val="tx1"/>
+                </a:solidFill>
+                <a:latin typeface="Calibri" panose="020F0502020204030204" pitchFamily="34" charset="0"/>
+              </a:defRPr>
+            </a:lvl3pPr>
+            <a:lvl4pPr marL="1600200" indent="-228600">
+              <a:defRPr>
+                <a:solidFill>
+                  <a:schemeClr val="tx1"/>
+                </a:solidFill>
+                <a:latin typeface="Calibri" panose="020F0502020204030204" pitchFamily="34" charset="0"/>
+              </a:defRPr>
+            </a:lvl4pPr>
+            <a:lvl5pPr marL="2057400" indent="-228600">
+              <a:defRPr>
+                <a:solidFill>
+                  <a:schemeClr val="tx1"/>
+                </a:solidFill>
+                <a:latin typeface="Calibri" panose="020F0502020204030204" pitchFamily="34" charset="0"/>
+              </a:defRPr>
+            </a:lvl5pPr>
+            <a:lvl6pPr marL="2514600" indent="-228600" eaLnBrk="0" fontAlgn="base" hangingPunct="0">
+              <a:spcBef>
+                <a:spcPct val="0"/>
+              </a:spcBef>
+              <a:spcAft>
+                <a:spcPct val="0"/>
+              </a:spcAft>
+              <a:defRPr>
+                <a:solidFill>
+                  <a:schemeClr val="tx1"/>
+                </a:solidFill>
+                <a:latin typeface="Calibri" panose="020F0502020204030204" pitchFamily="34" charset="0"/>
+              </a:defRPr>
+            </a:lvl6pPr>
+            <a:lvl7pPr marL="2971800" indent="-228600" eaLnBrk="0" fontAlgn="base" hangingPunct="0">
+              <a:spcBef>
+                <a:spcPct val="0"/>
+              </a:spcBef>
+              <a:spcAft>
+                <a:spcPct val="0"/>
+              </a:spcAft>
+              <a:defRPr>
+                <a:solidFill>
+                  <a:schemeClr val="tx1"/>
+                </a:solidFill>
+                <a:latin typeface="Calibri" panose="020F0502020204030204" pitchFamily="34" charset="0"/>
+              </a:defRPr>
+            </a:lvl7pPr>
+            <a:lvl8pPr marL="3429000" indent="-228600" eaLnBrk="0" fontAlgn="base" hangingPunct="0">
+              <a:spcBef>
+                <a:spcPct val="0"/>
+              </a:spcBef>
+              <a:spcAft>
+                <a:spcPct val="0"/>
+              </a:spcAft>
+              <a:defRPr>
+                <a:solidFill>
+                  <a:schemeClr val="tx1"/>
+                </a:solidFill>
+                <a:latin typeface="Calibri" panose="020F0502020204030204" pitchFamily="34" charset="0"/>
+              </a:defRPr>
+            </a:lvl8pPr>
+            <a:lvl9pPr marL="3886200" indent="-228600" eaLnBrk="0" fontAlgn="base" hangingPunct="0">
+              <a:spcBef>
+                <a:spcPct val="0"/>
+              </a:spcBef>
+              <a:spcAft>
+                <a:spcPct val="0"/>
+              </a:spcAft>
+              <a:defRPr>
+                <a:solidFill>
+                  <a:schemeClr val="tx1"/>
+                </a:solidFill>
+                <a:latin typeface="Calibri" panose="020F0502020204030204" pitchFamily="34" charset="0"/>
+              </a:defRPr>
+            </a:lvl9pPr>
+          </a:lstStyle>
+          <a:p>
+            <a:pPr algn="ctr" eaLnBrk="1" hangingPunct="1"/>
+            <a:r>
+              <a:rPr lang="en-US" altLang="en-US" sz="1200" i="1" dirty="0">
+                <a:latin typeface="Arial" panose="020B0604020202020204" pitchFamily="34" charset="0"/>
+                <a:cs typeface="Arial" panose="020B0604020202020204" pitchFamily="34" charset="0"/>
+              </a:rPr>
+              <a:t>Alerts</a:t>
+            </a:r>
+          </a:p>
+        </p:txBody>
+      </p:sp>
+      <p:sp>
+        <p:nvSpPr>
+          <p:cNvPr id="43" name="TextBox 17">
+            <a:extLst>
+              <a:ext uri="{FF2B5EF4-FFF2-40B4-BE49-F238E27FC236}">
+                <a16:creationId xmlns:a16="http://schemas.microsoft.com/office/drawing/2014/main" id="{63B7648D-FF94-EB49-A0EB-01B019E70912}"/>
+              </a:ext>
+            </a:extLst>
+          </p:cNvPr>
+          <p:cNvSpPr txBox="1">
+            <a:spLocks noChangeArrowheads="1"/>
+          </p:cNvSpPr>
+          <p:nvPr/>
+        </p:nvSpPr>
+        <p:spPr bwMode="auto">
+          <a:xfrm>
+            <a:off x="6489444" y="3678771"/>
+            <a:ext cx="1362074" cy="276999"/>
+          </a:xfrm>
+          <a:prstGeom prst="rect">
+            <a:avLst/>
+          </a:prstGeom>
+          <a:noFill/>
+          <a:ln>
+            <a:noFill/>
+          </a:ln>
+          <a:extLst>
+            <a:ext uri="{909E8E84-426E-40DD-AFC4-6F175D3DCCD1}">
+              <a14:hiddenFill xmlns:a14="http://schemas.microsoft.com/office/drawing/2010/main">
+                <a:solidFill>
+                  <a:srgbClr val="FFFFFF"/>
+                </a:solidFill>
+              </a14:hiddenFill>
+            </a:ext>
+            <a:ext uri="{91240B29-F687-4F45-9708-019B960494DF}">
+              <a14:hiddenLine xmlns:a14="http://schemas.microsoft.com/office/drawing/2010/main" w="9525">
+                <a:solidFill>
+                  <a:srgbClr val="000000"/>
+                </a:solidFill>
+                <a:miter lim="800000"/>
+                <a:headEnd/>
+                <a:tailEnd/>
+              </a14:hiddenLine>
+            </a:ext>
+          </a:extLst>
+        </p:spPr>
+        <p:txBody>
+          <a:bodyPr wrap="square">
+            <a:spAutoFit/>
+          </a:bodyPr>
+          <a:lstStyle>
+            <a:lvl1pPr>
+              <a:defRPr>
+                <a:solidFill>
+                  <a:schemeClr val="tx1"/>
+                </a:solidFill>
+                <a:latin typeface="Calibri" panose="020F0502020204030204" pitchFamily="34" charset="0"/>
+              </a:defRPr>
+            </a:lvl1pPr>
+            <a:lvl2pPr marL="742950" indent="-285750">
+              <a:defRPr>
+                <a:solidFill>
+                  <a:schemeClr val="tx1"/>
+                </a:solidFill>
+                <a:latin typeface="Calibri" panose="020F0502020204030204" pitchFamily="34" charset="0"/>
+              </a:defRPr>
+            </a:lvl2pPr>
+            <a:lvl3pPr marL="1143000" indent="-228600">
+              <a:defRPr>
+                <a:solidFill>
+                  <a:schemeClr val="tx1"/>
+                </a:solidFill>
+                <a:latin typeface="Calibri" panose="020F0502020204030204" pitchFamily="34" charset="0"/>
+              </a:defRPr>
+            </a:lvl3pPr>
+            <a:lvl4pPr marL="1600200" indent="-228600">
+              <a:defRPr>
+                <a:solidFill>
+                  <a:schemeClr val="tx1"/>
+                </a:solidFill>
+                <a:latin typeface="Calibri" panose="020F0502020204030204" pitchFamily="34" charset="0"/>
+              </a:defRPr>
+            </a:lvl4pPr>
+            <a:lvl5pPr marL="2057400" indent="-228600">
+              <a:defRPr>
+                <a:solidFill>
+                  <a:schemeClr val="tx1"/>
+                </a:solidFill>
+                <a:latin typeface="Calibri" panose="020F0502020204030204" pitchFamily="34" charset="0"/>
+              </a:defRPr>
+            </a:lvl5pPr>
+            <a:lvl6pPr marL="2514600" indent="-228600" eaLnBrk="0" fontAlgn="base" hangingPunct="0">
+              <a:spcBef>
+                <a:spcPct val="0"/>
+              </a:spcBef>
+              <a:spcAft>
+                <a:spcPct val="0"/>
+              </a:spcAft>
+              <a:defRPr>
+                <a:solidFill>
+                  <a:schemeClr val="tx1"/>
+                </a:solidFill>
+                <a:latin typeface="Calibri" panose="020F0502020204030204" pitchFamily="34" charset="0"/>
+              </a:defRPr>
+            </a:lvl6pPr>
+            <a:lvl7pPr marL="2971800" indent="-228600" eaLnBrk="0" fontAlgn="base" hangingPunct="0">
+              <a:spcBef>
+                <a:spcPct val="0"/>
+              </a:spcBef>
+              <a:spcAft>
+                <a:spcPct val="0"/>
+              </a:spcAft>
+              <a:defRPr>
+                <a:solidFill>
+                  <a:schemeClr val="tx1"/>
+                </a:solidFill>
+                <a:latin typeface="Calibri" panose="020F0502020204030204" pitchFamily="34" charset="0"/>
+              </a:defRPr>
+            </a:lvl7pPr>
+            <a:lvl8pPr marL="3429000" indent="-228600" eaLnBrk="0" fontAlgn="base" hangingPunct="0">
+              <a:spcBef>
+                <a:spcPct val="0"/>
+              </a:spcBef>
+              <a:spcAft>
+                <a:spcPct val="0"/>
+              </a:spcAft>
+              <a:defRPr>
+                <a:solidFill>
+                  <a:schemeClr val="tx1"/>
+                </a:solidFill>
+                <a:latin typeface="Calibri" panose="020F0502020204030204" pitchFamily="34" charset="0"/>
+              </a:defRPr>
+            </a:lvl8pPr>
+            <a:lvl9pPr marL="3886200" indent="-228600" eaLnBrk="0" fontAlgn="base" hangingPunct="0">
+              <a:spcBef>
+                <a:spcPct val="0"/>
+              </a:spcBef>
+              <a:spcAft>
+                <a:spcPct val="0"/>
+              </a:spcAft>
+              <a:defRPr>
+                <a:solidFill>
+                  <a:schemeClr val="tx1"/>
+                </a:solidFill>
+                <a:latin typeface="Calibri" panose="020F0502020204030204" pitchFamily="34" charset="0"/>
+              </a:defRPr>
+            </a:lvl9pPr>
+          </a:lstStyle>
+          <a:p>
+            <a:pPr algn="ctr" eaLnBrk="1" hangingPunct="1"/>
+            <a:r>
+              <a:rPr lang="en-US" altLang="en-US" sz="1200" dirty="0">
+                <a:latin typeface="Arial" panose="020B0604020202020204" pitchFamily="34" charset="0"/>
+                <a:ea typeface="Amazon Ember" panose="020B0603020204020204" pitchFamily="34" charset="0"/>
+                <a:cs typeface="Arial" panose="020B0604020202020204" pitchFamily="34" charset="0"/>
+              </a:rPr>
+              <a:t>Lambda function</a:t>
+            </a:r>
+          </a:p>
+        </p:txBody>
+      </p:sp>
+      <p:pic>
+        <p:nvPicPr>
+          <p:cNvPr id="44" name="Graphic 13">
+            <a:extLst>
+              <a:ext uri="{FF2B5EF4-FFF2-40B4-BE49-F238E27FC236}">
+                <a16:creationId xmlns:a16="http://schemas.microsoft.com/office/drawing/2014/main" id="{8F81F7C6-9DD3-F14E-B526-B10737DCFF20}"/>
+              </a:ext>
+            </a:extLst>
+          </p:cNvPr>
+          <p:cNvPicPr>
+            <a:picLocks noChangeAspect="1" noChangeArrowheads="1"/>
+          </p:cNvPicPr>
+          <p:nvPr/>
+        </p:nvPicPr>
+        <p:blipFill>
+          <a:blip r:embed="rId8" cstate="hqprint">
+            <a:extLst>
+              <a:ext uri="{28A0092B-C50C-407E-A947-70E740481C1C}">
+                <a14:useLocalDpi xmlns:a14="http://schemas.microsoft.com/office/drawing/2010/main" val="0"/>
+              </a:ext>
+            </a:extLst>
+          </a:blip>
+          <a:srcRect/>
+          <a:stretch>
+            <a:fillRect/>
+          </a:stretch>
+        </p:blipFill>
+        <p:spPr bwMode="auto">
+          <a:xfrm>
+            <a:off x="6950370" y="3199346"/>
+            <a:ext cx="457200" cy="457200"/>
+          </a:xfrm>
+          <a:prstGeom prst="rect">
+            <a:avLst/>
+          </a:prstGeom>
+          <a:noFill/>
+          <a:ln>
+            <a:noFill/>
+          </a:ln>
+          <a:extLst>
+            <a:ext uri="{909E8E84-426E-40DD-AFC4-6F175D3DCCD1}">
+              <a14:hiddenFill xmlns:a14="http://schemas.microsoft.com/office/drawing/2010/main">
+                <a:solidFill>
+                  <a:srgbClr val="FFFFFF"/>
+                </a:solidFill>
+              </a14:hiddenFill>
+            </a:ext>
+            <a:ext uri="{91240B29-F687-4F45-9708-019B960494DF}">
+              <a14:hiddenLine xmlns:a14="http://schemas.microsoft.com/office/drawing/2010/main" w="9525">
+                <a:solidFill>
+                  <a:srgbClr val="000000"/>
+                </a:solidFill>
+                <a:miter lim="800000"/>
+                <a:headEnd/>
+                <a:tailEnd/>
+              </a14:hiddenLine>
+            </a:ext>
+          </a:extLst>
+        </p:spPr>
+      </p:pic>
+      <p:sp>
+        <p:nvSpPr>
+          <p:cNvPr id="51" name="TextBox 17">
+            <a:extLst>
+              <a:ext uri="{FF2B5EF4-FFF2-40B4-BE49-F238E27FC236}">
+                <a16:creationId xmlns:a16="http://schemas.microsoft.com/office/drawing/2014/main" id="{EFF28D48-51E2-784D-8A6B-6A2A796412C6}"/>
+              </a:ext>
+            </a:extLst>
+          </p:cNvPr>
+          <p:cNvSpPr txBox="1">
+            <a:spLocks noChangeArrowheads="1"/>
+          </p:cNvSpPr>
+          <p:nvPr/>
+        </p:nvSpPr>
+        <p:spPr bwMode="auto">
+          <a:xfrm>
+            <a:off x="4645941" y="3678771"/>
+            <a:ext cx="1362074" cy="276999"/>
+          </a:xfrm>
+          <a:prstGeom prst="rect">
+            <a:avLst/>
+          </a:prstGeom>
+          <a:noFill/>
+          <a:ln>
+            <a:noFill/>
+          </a:ln>
+          <a:extLst>
+            <a:ext uri="{909E8E84-426E-40DD-AFC4-6F175D3DCCD1}">
+              <a14:hiddenFill xmlns:a14="http://schemas.microsoft.com/office/drawing/2010/main">
+                <a:solidFill>
+                  <a:srgbClr val="FFFFFF"/>
+                </a:solidFill>
+              </a14:hiddenFill>
+            </a:ext>
+            <a:ext uri="{91240B29-F687-4F45-9708-019B960494DF}">
+              <a14:hiddenLine xmlns:a14="http://schemas.microsoft.com/office/drawing/2010/main" w="9525">
+                <a:solidFill>
+                  <a:srgbClr val="000000"/>
+                </a:solidFill>
+                <a:miter lim="800000"/>
+                <a:headEnd/>
+                <a:tailEnd/>
+              </a14:hiddenLine>
+            </a:ext>
+          </a:extLst>
+        </p:spPr>
+        <p:txBody>
+          <a:bodyPr wrap="square">
+            <a:spAutoFit/>
+          </a:bodyPr>
+          <a:lstStyle>
+            <a:lvl1pPr>
+              <a:defRPr>
+                <a:solidFill>
+                  <a:schemeClr val="tx1"/>
+                </a:solidFill>
+                <a:latin typeface="Calibri" panose="020F0502020204030204" pitchFamily="34" charset="0"/>
+              </a:defRPr>
+            </a:lvl1pPr>
+            <a:lvl2pPr marL="742950" indent="-285750">
+              <a:defRPr>
+                <a:solidFill>
+                  <a:schemeClr val="tx1"/>
+                </a:solidFill>
+                <a:latin typeface="Calibri" panose="020F0502020204030204" pitchFamily="34" charset="0"/>
+              </a:defRPr>
+            </a:lvl2pPr>
+            <a:lvl3pPr marL="1143000" indent="-228600">
+              <a:defRPr>
+                <a:solidFill>
+                  <a:schemeClr val="tx1"/>
+                </a:solidFill>
+                <a:latin typeface="Calibri" panose="020F0502020204030204" pitchFamily="34" charset="0"/>
+              </a:defRPr>
+            </a:lvl3pPr>
+            <a:lvl4pPr marL="1600200" indent="-228600">
+              <a:defRPr>
+                <a:solidFill>
+                  <a:schemeClr val="tx1"/>
+                </a:solidFill>
+                <a:latin typeface="Calibri" panose="020F0502020204030204" pitchFamily="34" charset="0"/>
+              </a:defRPr>
+            </a:lvl4pPr>
+            <a:lvl5pPr marL="2057400" indent="-228600">
+              <a:defRPr>
+                <a:solidFill>
+                  <a:schemeClr val="tx1"/>
+                </a:solidFill>
+                <a:latin typeface="Calibri" panose="020F0502020204030204" pitchFamily="34" charset="0"/>
+              </a:defRPr>
+            </a:lvl5pPr>
+            <a:lvl6pPr marL="2514600" indent="-228600" eaLnBrk="0" fontAlgn="base" hangingPunct="0">
+              <a:spcBef>
+                <a:spcPct val="0"/>
+              </a:spcBef>
+              <a:spcAft>
+                <a:spcPct val="0"/>
+              </a:spcAft>
+              <a:defRPr>
+                <a:solidFill>
+                  <a:schemeClr val="tx1"/>
+                </a:solidFill>
+                <a:latin typeface="Calibri" panose="020F0502020204030204" pitchFamily="34" charset="0"/>
+              </a:defRPr>
+            </a:lvl6pPr>
+            <a:lvl7pPr marL="2971800" indent="-228600" eaLnBrk="0" fontAlgn="base" hangingPunct="0">
+              <a:spcBef>
+                <a:spcPct val="0"/>
+              </a:spcBef>
+              <a:spcAft>
+                <a:spcPct val="0"/>
+              </a:spcAft>
+              <a:defRPr>
+                <a:solidFill>
+                  <a:schemeClr val="tx1"/>
+                </a:solidFill>
+                <a:latin typeface="Calibri" panose="020F0502020204030204" pitchFamily="34" charset="0"/>
+              </a:defRPr>
+            </a:lvl7pPr>
+            <a:lvl8pPr marL="3429000" indent="-228600" eaLnBrk="0" fontAlgn="base" hangingPunct="0">
+              <a:spcBef>
+                <a:spcPct val="0"/>
+              </a:spcBef>
+              <a:spcAft>
+                <a:spcPct val="0"/>
+              </a:spcAft>
+              <a:defRPr>
+                <a:solidFill>
+                  <a:schemeClr val="tx1"/>
+                </a:solidFill>
+                <a:latin typeface="Calibri" panose="020F0502020204030204" pitchFamily="34" charset="0"/>
+              </a:defRPr>
+            </a:lvl8pPr>
+            <a:lvl9pPr marL="3886200" indent="-228600" eaLnBrk="0" fontAlgn="base" hangingPunct="0">
+              <a:spcBef>
+                <a:spcPct val="0"/>
+              </a:spcBef>
+              <a:spcAft>
+                <a:spcPct val="0"/>
+              </a:spcAft>
+              <a:defRPr>
+                <a:solidFill>
+                  <a:schemeClr val="tx1"/>
+                </a:solidFill>
+                <a:latin typeface="Calibri" panose="020F0502020204030204" pitchFamily="34" charset="0"/>
+              </a:defRPr>
+            </a:lvl9pPr>
+          </a:lstStyle>
+          <a:p>
+            <a:pPr algn="ctr" eaLnBrk="1" hangingPunct="1"/>
+            <a:r>
+              <a:rPr lang="en-US" altLang="en-US" sz="1200" dirty="0">
+                <a:latin typeface="Arial" panose="020B0604020202020204" pitchFamily="34" charset="0"/>
+                <a:ea typeface="Amazon Ember" panose="020B0603020204020204" pitchFamily="34" charset="0"/>
+                <a:cs typeface="Arial" panose="020B0604020202020204" pitchFamily="34" charset="0"/>
+              </a:rPr>
+              <a:t>Lambda function</a:t>
+            </a:r>
+          </a:p>
+        </p:txBody>
+      </p:sp>
+      <p:pic>
+        <p:nvPicPr>
+          <p:cNvPr id="52" name="Graphic 13">
+            <a:extLst>
+              <a:ext uri="{FF2B5EF4-FFF2-40B4-BE49-F238E27FC236}">
+                <a16:creationId xmlns:a16="http://schemas.microsoft.com/office/drawing/2014/main" id="{6E4B0F15-8D71-ED4F-8C32-48859B79F341}"/>
+              </a:ext>
+            </a:extLst>
+          </p:cNvPr>
+          <p:cNvPicPr>
+            <a:picLocks noChangeAspect="1" noChangeArrowheads="1"/>
+          </p:cNvPicPr>
+          <p:nvPr/>
+        </p:nvPicPr>
+        <p:blipFill>
+          <a:blip r:embed="rId8" cstate="hqprint">
+            <a:extLst>
+              <a:ext uri="{28A0092B-C50C-407E-A947-70E740481C1C}">
+                <a14:useLocalDpi xmlns:a14="http://schemas.microsoft.com/office/drawing/2010/main" val="0"/>
+              </a:ext>
+            </a:extLst>
+          </a:blip>
+          <a:srcRect/>
+          <a:stretch>
+            <a:fillRect/>
+          </a:stretch>
+        </p:blipFill>
+        <p:spPr bwMode="auto">
+          <a:xfrm>
+            <a:off x="5106867" y="3199346"/>
+            <a:ext cx="457200" cy="457200"/>
+          </a:xfrm>
+          <a:prstGeom prst="rect">
+            <a:avLst/>
+          </a:prstGeom>
+          <a:noFill/>
+          <a:ln>
+            <a:noFill/>
+          </a:ln>
+          <a:extLst>
+            <a:ext uri="{909E8E84-426E-40DD-AFC4-6F175D3DCCD1}">
+              <a14:hiddenFill xmlns:a14="http://schemas.microsoft.com/office/drawing/2010/main">
+                <a:solidFill>
+                  <a:srgbClr val="FFFFFF"/>
+                </a:solidFill>
+              </a14:hiddenFill>
+            </a:ext>
+            <a:ext uri="{91240B29-F687-4F45-9708-019B960494DF}">
+              <a14:hiddenLine xmlns:a14="http://schemas.microsoft.com/office/drawing/2010/main" w="9525">
+                <a:solidFill>
+                  <a:srgbClr val="000000"/>
+                </a:solidFill>
+                <a:miter lim="800000"/>
+                <a:headEnd/>
+                <a:tailEnd/>
+              </a14:hiddenLine>
+            </a:ext>
+          </a:extLst>
+        </p:spPr>
+      </p:pic>
+      <p:sp>
+        <p:nvSpPr>
+          <p:cNvPr id="54" name="TextBox 25">
+            <a:extLst>
+              <a:ext uri="{FF2B5EF4-FFF2-40B4-BE49-F238E27FC236}">
+                <a16:creationId xmlns:a16="http://schemas.microsoft.com/office/drawing/2014/main" id="{CF1D2FAF-CDF3-B247-A7BA-6996CEDA43B7}"/>
+              </a:ext>
+            </a:extLst>
+          </p:cNvPr>
+          <p:cNvSpPr txBox="1">
+            <a:spLocks noChangeArrowheads="1"/>
+          </p:cNvSpPr>
+          <p:nvPr/>
+        </p:nvSpPr>
+        <p:spPr bwMode="auto">
+          <a:xfrm>
+            <a:off x="6504115" y="4950990"/>
+            <a:ext cx="1385885" cy="461665"/>
+          </a:xfrm>
+          <a:prstGeom prst="rect">
+            <a:avLst/>
+          </a:prstGeom>
+          <a:noFill/>
+          <a:ln>
+            <a:noFill/>
+          </a:ln>
+          <a:extLst>
+            <a:ext uri="{909E8E84-426E-40DD-AFC4-6F175D3DCCD1}">
+              <a14:hiddenFill xmlns:a14="http://schemas.microsoft.com/office/drawing/2010/main">
+                <a:solidFill>
+                  <a:srgbClr val="FFFFFF"/>
+                </a:solidFill>
+              </a14:hiddenFill>
+            </a:ext>
+            <a:ext uri="{91240B29-F687-4F45-9708-019B960494DF}">
+              <a14:hiddenLine xmlns:a14="http://schemas.microsoft.com/office/drawing/2010/main" w="9525">
+                <a:solidFill>
+                  <a:srgbClr val="000000"/>
+                </a:solidFill>
+                <a:miter lim="800000"/>
+                <a:headEnd/>
+                <a:tailEnd/>
+              </a14:hiddenLine>
+            </a:ext>
+          </a:extLst>
+        </p:spPr>
+        <p:txBody>
+          <a:bodyPr wrap="square">
+            <a:spAutoFit/>
+          </a:bodyPr>
+          <a:lstStyle>
+            <a:lvl1pPr>
+              <a:defRPr>
+                <a:solidFill>
+                  <a:schemeClr val="tx1"/>
+                </a:solidFill>
+                <a:latin typeface="Calibri" panose="020F0502020204030204" pitchFamily="34" charset="0"/>
+              </a:defRPr>
+            </a:lvl1pPr>
+            <a:lvl2pPr marL="742950" indent="-285750">
+              <a:defRPr>
+                <a:solidFill>
+                  <a:schemeClr val="tx1"/>
+                </a:solidFill>
+                <a:latin typeface="Calibri" panose="020F0502020204030204" pitchFamily="34" charset="0"/>
+              </a:defRPr>
+            </a:lvl2pPr>
+            <a:lvl3pPr marL="1143000" indent="-228600">
+              <a:defRPr>
+                <a:solidFill>
+                  <a:schemeClr val="tx1"/>
+                </a:solidFill>
+                <a:latin typeface="Calibri" panose="020F0502020204030204" pitchFamily="34" charset="0"/>
+              </a:defRPr>
+            </a:lvl3pPr>
+            <a:lvl4pPr marL="1600200" indent="-228600">
+              <a:defRPr>
+                <a:solidFill>
+                  <a:schemeClr val="tx1"/>
+                </a:solidFill>
+                <a:latin typeface="Calibri" panose="020F0502020204030204" pitchFamily="34" charset="0"/>
+              </a:defRPr>
+            </a:lvl4pPr>
+            <a:lvl5pPr marL="2057400" indent="-228600">
+              <a:defRPr>
+                <a:solidFill>
+                  <a:schemeClr val="tx1"/>
+                </a:solidFill>
+                <a:latin typeface="Calibri" panose="020F0502020204030204" pitchFamily="34" charset="0"/>
+              </a:defRPr>
+            </a:lvl5pPr>
+            <a:lvl6pPr marL="2514600" indent="-228600" eaLnBrk="0" fontAlgn="base" hangingPunct="0">
+              <a:spcBef>
+                <a:spcPct val="0"/>
+              </a:spcBef>
+              <a:spcAft>
+                <a:spcPct val="0"/>
+              </a:spcAft>
+              <a:defRPr>
+                <a:solidFill>
+                  <a:schemeClr val="tx1"/>
+                </a:solidFill>
+                <a:latin typeface="Calibri" panose="020F0502020204030204" pitchFamily="34" charset="0"/>
+              </a:defRPr>
+            </a:lvl6pPr>
+            <a:lvl7pPr marL="2971800" indent="-228600" eaLnBrk="0" fontAlgn="base" hangingPunct="0">
+              <a:spcBef>
+                <a:spcPct val="0"/>
+              </a:spcBef>
+              <a:spcAft>
+                <a:spcPct val="0"/>
+              </a:spcAft>
+              <a:defRPr>
+                <a:solidFill>
+                  <a:schemeClr val="tx1"/>
+                </a:solidFill>
+                <a:latin typeface="Calibri" panose="020F0502020204030204" pitchFamily="34" charset="0"/>
+              </a:defRPr>
+            </a:lvl7pPr>
+            <a:lvl8pPr marL="3429000" indent="-228600" eaLnBrk="0" fontAlgn="base" hangingPunct="0">
+              <a:spcBef>
+                <a:spcPct val="0"/>
+              </a:spcBef>
+              <a:spcAft>
+                <a:spcPct val="0"/>
+              </a:spcAft>
+              <a:defRPr>
+                <a:solidFill>
+                  <a:schemeClr val="tx1"/>
+                </a:solidFill>
+                <a:latin typeface="Calibri" panose="020F0502020204030204" pitchFamily="34" charset="0"/>
+              </a:defRPr>
+            </a:lvl8pPr>
+            <a:lvl9pPr marL="3886200" indent="-228600" eaLnBrk="0" fontAlgn="base" hangingPunct="0">
+              <a:spcBef>
+                <a:spcPct val="0"/>
+              </a:spcBef>
+              <a:spcAft>
+                <a:spcPct val="0"/>
+              </a:spcAft>
+              <a:defRPr>
+                <a:solidFill>
+                  <a:schemeClr val="tx1"/>
+                </a:solidFill>
+                <a:latin typeface="Calibri" panose="020F0502020204030204" pitchFamily="34" charset="0"/>
+              </a:defRPr>
+            </a:lvl9pPr>
+          </a:lstStyle>
+          <a:p>
+            <a:pPr algn="ctr" eaLnBrk="1" hangingPunct="1"/>
+            <a:r>
+              <a:rPr lang="en-US" altLang="en-US" sz="1200" dirty="0">
+                <a:latin typeface="Arial" panose="020B0604020202020204" pitchFamily="34" charset="0"/>
+                <a:ea typeface="Amazon Ember" panose="020B0603020204020204" pitchFamily="34" charset="0"/>
+                <a:cs typeface="Arial" panose="020B0604020202020204" pitchFamily="34" charset="0"/>
+              </a:rPr>
+              <a:t>Amazon SNS topic</a:t>
+            </a:r>
+          </a:p>
+        </p:txBody>
+      </p:sp>
+      <p:pic>
+        <p:nvPicPr>
+          <p:cNvPr id="56" name="Graphic 17">
+            <a:extLst>
+              <a:ext uri="{FF2B5EF4-FFF2-40B4-BE49-F238E27FC236}">
+                <a16:creationId xmlns:a16="http://schemas.microsoft.com/office/drawing/2014/main" id="{DAED7E0D-F522-D740-830F-1D0C8935BD0F}"/>
+              </a:ext>
+            </a:extLst>
+          </p:cNvPr>
+          <p:cNvPicPr>
+            <a:picLocks noChangeAspect="1" noChangeArrowheads="1"/>
+          </p:cNvPicPr>
+          <p:nvPr/>
+        </p:nvPicPr>
+        <p:blipFill>
+          <a:blip r:embed="rId9" cstate="hqprint">
+            <a:extLst>
+              <a:ext uri="{28A0092B-C50C-407E-A947-70E740481C1C}">
+                <a14:useLocalDpi xmlns:a14="http://schemas.microsoft.com/office/drawing/2010/main" val="0"/>
+              </a:ext>
+            </a:extLst>
+          </a:blip>
+          <a:srcRect/>
+          <a:stretch>
+            <a:fillRect/>
+          </a:stretch>
+        </p:blipFill>
+        <p:spPr bwMode="auto">
+          <a:xfrm>
+            <a:off x="6966144" y="4477915"/>
+            <a:ext cx="457200" cy="457200"/>
+          </a:xfrm>
+          <a:prstGeom prst="rect">
+            <a:avLst/>
+          </a:prstGeom>
+          <a:noFill/>
+          <a:ln>
+            <a:noFill/>
+          </a:ln>
+          <a:extLst>
+            <a:ext uri="{909E8E84-426E-40DD-AFC4-6F175D3DCCD1}">
+              <a14:hiddenFill xmlns:a14="http://schemas.microsoft.com/office/drawing/2010/main">
+                <a:solidFill>
+                  <a:srgbClr val="FFFFFF"/>
+                </a:solidFill>
+              </a14:hiddenFill>
+            </a:ext>
+            <a:ext uri="{91240B29-F687-4F45-9708-019B960494DF}">
+              <a14:hiddenLine xmlns:a14="http://schemas.microsoft.com/office/drawing/2010/main" w="9525">
+                <a:solidFill>
+                  <a:srgbClr val="000000"/>
+                </a:solidFill>
+                <a:miter lim="800000"/>
+                <a:headEnd/>
+                <a:tailEnd/>
+              </a14:hiddenLine>
+            </a:ext>
+          </a:extLst>
+        </p:spPr>
+      </p:pic>
+      <p:cxnSp>
+        <p:nvCxnSpPr>
+          <p:cNvPr id="69" name="Straight Arrow Connector 68">
+            <a:extLst>
+              <a:ext uri="{FF2B5EF4-FFF2-40B4-BE49-F238E27FC236}">
+                <a16:creationId xmlns:a16="http://schemas.microsoft.com/office/drawing/2014/main" id="{6230956E-A9AF-9A4D-A16A-CE36E6CD4D0F}"/>
+              </a:ext>
+            </a:extLst>
+          </p:cNvPr>
+          <p:cNvCxnSpPr>
+            <a:cxnSpLocks/>
+            <a:stCxn id="38" idx="3"/>
+            <a:endCxn id="36" idx="1"/>
+          </p:cNvCxnSpPr>
+          <p:nvPr/>
+        </p:nvCxnSpPr>
+        <p:spPr>
+          <a:xfrm flipV="1">
+            <a:off x="5742289" y="1859216"/>
+            <a:ext cx="1039722" cy="1244"/>
+          </a:xfrm>
+          <a:prstGeom prst="straightConnector1">
+            <a:avLst/>
+          </a:prstGeom>
+          <a:ln w="12700">
+            <a:solidFill>
+              <a:schemeClr val="tx2"/>
+            </a:solidFill>
+            <a:headEnd type="none" w="med" len="sm"/>
+            <a:tailEnd type="arrow" w="med" len="sm"/>
+          </a:ln>
+        </p:spPr>
+        <p:style>
+          <a:lnRef idx="1">
+            <a:schemeClr val="accent1"/>
+          </a:lnRef>
+          <a:fillRef idx="0">
+            <a:schemeClr val="accent1"/>
+          </a:fillRef>
+          <a:effectRef idx="0">
+            <a:schemeClr val="accent1"/>
+          </a:effectRef>
+          <a:fontRef idx="minor">
+            <a:schemeClr val="tx1"/>
+          </a:fontRef>
+        </p:style>
+      </p:cxnSp>
+      <p:sp>
+        <p:nvSpPr>
+          <p:cNvPr id="70" name="Freeform 69">
+            <a:extLst>
+              <a:ext uri="{FF2B5EF4-FFF2-40B4-BE49-F238E27FC236}">
+                <a16:creationId xmlns:a16="http://schemas.microsoft.com/office/drawing/2014/main" id="{09CF1274-CBEC-8149-BBE8-035C1F46BC64}"/>
+              </a:ext>
+            </a:extLst>
+          </p:cNvPr>
+          <p:cNvSpPr/>
+          <p:nvPr/>
+        </p:nvSpPr>
+        <p:spPr>
+          <a:xfrm flipH="1" flipV="1">
+            <a:off x="2515750" y="2630990"/>
+            <a:ext cx="3056645" cy="3514755"/>
+          </a:xfrm>
+          <a:custGeom>
+            <a:avLst/>
+            <a:gdLst>
+              <a:gd name="connsiteX0" fmla="*/ 1371600 w 1371600"/>
+              <a:gd name="connsiteY0" fmla="*/ 711200 h 711200"/>
+              <a:gd name="connsiteX1" fmla="*/ 1371600 w 1371600"/>
+              <a:gd name="connsiteY1" fmla="*/ 0 h 711200"/>
+              <a:gd name="connsiteX2" fmla="*/ 0 w 1371600"/>
+              <a:gd name="connsiteY2" fmla="*/ 0 h 711200"/>
+            </a:gdLst>
+            <a:ahLst/>
+            <a:cxnLst>
+              <a:cxn ang="0">
+                <a:pos x="connsiteX0" y="connsiteY0"/>
+              </a:cxn>
+              <a:cxn ang="0">
+                <a:pos x="connsiteX1" y="connsiteY1"/>
+              </a:cxn>
+              <a:cxn ang="0">
+                <a:pos x="connsiteX2" y="connsiteY2"/>
+              </a:cxn>
+            </a:cxnLst>
+            <a:rect l="l" t="t" r="r" b="b"/>
+            <a:pathLst>
+              <a:path w="1371600" h="711200">
+                <a:moveTo>
+                  <a:pt x="1371600" y="711200"/>
+                </a:moveTo>
+                <a:lnTo>
+                  <a:pt x="1371600" y="0"/>
+                </a:lnTo>
+                <a:lnTo>
+                  <a:pt x="0" y="0"/>
+                </a:lnTo>
+              </a:path>
+            </a:pathLst>
+          </a:custGeom>
+          <a:noFill/>
+          <a:ln w="12700">
+            <a:solidFill>
+              <a:schemeClr val="tx2"/>
+            </a:solidFill>
+            <a:headEnd type="arrow" w="med" len="sm"/>
+            <a:tailEnd type="none" w="med" len="sm"/>
+          </a:ln>
+        </p:spPr>
+        <p:style>
+          <a:lnRef idx="2">
+            <a:schemeClr val="accent1">
+              <a:shade val="50000"/>
+            </a:schemeClr>
+          </a:lnRef>
+          <a:fillRef idx="1">
+            <a:schemeClr val="accent1"/>
+          </a:fillRef>
+          <a:effectRef idx="0">
+            <a:schemeClr val="accent1"/>
+          </a:effectRef>
+          <a:fontRef idx="minor">
+            <a:schemeClr val="lt1"/>
+          </a:fontRef>
+        </p:style>
+        <p:txBody>
+          <a:bodyPr anchor="ctr"/>
+          <a:lstStyle/>
+          <a:p>
+            <a:pPr algn="ctr" eaLnBrk="1" fontAlgn="auto" hangingPunct="1">
+              <a:spcBef>
+                <a:spcPts val="0"/>
+              </a:spcBef>
+              <a:spcAft>
+                <a:spcPts val="0"/>
+              </a:spcAft>
+              <a:defRPr/>
+            </a:pPr>
+            <a:endParaRPr lang="en-US" dirty="0"/>
+          </a:p>
+        </p:txBody>
+      </p:sp>
+      <p:pic>
+        <p:nvPicPr>
+          <p:cNvPr id="71" name="Graphic 22">
+            <a:extLst>
+              <a:ext uri="{FF2B5EF4-FFF2-40B4-BE49-F238E27FC236}">
+                <a16:creationId xmlns:a16="http://schemas.microsoft.com/office/drawing/2014/main" id="{53741C56-B6EB-774A-BB2F-213B5D9184B9}"/>
+              </a:ext>
+            </a:extLst>
+          </p:cNvPr>
+          <p:cNvPicPr>
+            <a:picLocks noChangeAspect="1" noChangeArrowheads="1"/>
+          </p:cNvPicPr>
+          <p:nvPr/>
+        </p:nvPicPr>
+        <p:blipFill>
+          <a:blip r:embed="rId10">
+            <a:extLst>
+              <a:ext uri="{96DAC541-7B7A-43D3-8B79-37D633B846F1}">
+                <asvg:svgBlip xmlns:asvg="http://schemas.microsoft.com/office/drawing/2016/SVG/main" xmlns="" r:embed="rId11"/>
+              </a:ext>
+            </a:extLst>
+          </a:blip>
+          <a:srcRect/>
+          <a:stretch/>
+        </p:blipFill>
+        <p:spPr bwMode="auto">
+          <a:xfrm>
+            <a:off x="5713526" y="5866252"/>
+            <a:ext cx="469900" cy="469900"/>
+          </a:xfrm>
+          <a:prstGeom prst="rect">
+            <a:avLst/>
+          </a:prstGeom>
+          <a:noFill/>
+          <a:ln>
+            <a:noFill/>
+          </a:ln>
+          <a:extLst>
+            <a:ext uri="{909E8E84-426E-40DD-AFC4-6F175D3DCCD1}">
+              <a14:hiddenFill xmlns:a14="http://schemas.microsoft.com/office/drawing/2010/main">
+                <a:solidFill>
+                  <a:srgbClr val="FFFFFF"/>
+                </a:solidFill>
+              </a14:hiddenFill>
+            </a:ext>
+            <a:ext uri="{91240B29-F687-4F45-9708-019B960494DF}">
+              <a14:hiddenLine xmlns:a14="http://schemas.microsoft.com/office/drawing/2010/main" w="9525">
+                <a:solidFill>
+                  <a:srgbClr val="000000"/>
+                </a:solidFill>
+                <a:miter lim="800000"/>
+                <a:headEnd/>
+                <a:tailEnd/>
+              </a14:hiddenLine>
+            </a:ext>
+          </a:extLst>
+        </p:spPr>
+      </p:pic>
+      <p:sp>
+        <p:nvSpPr>
+          <p:cNvPr id="72" name="TextBox 39">
+            <a:extLst>
+              <a:ext uri="{FF2B5EF4-FFF2-40B4-BE49-F238E27FC236}">
+                <a16:creationId xmlns:a16="http://schemas.microsoft.com/office/drawing/2014/main" id="{2ADCF867-8113-044F-B584-2B500E27F892}"/>
+              </a:ext>
+            </a:extLst>
+          </p:cNvPr>
+          <p:cNvSpPr txBox="1">
+            <a:spLocks noChangeArrowheads="1"/>
+          </p:cNvSpPr>
+          <p:nvPr/>
+        </p:nvSpPr>
+        <p:spPr bwMode="auto">
+          <a:xfrm>
+            <a:off x="5411901" y="6437752"/>
+            <a:ext cx="1073150" cy="261610"/>
+          </a:xfrm>
+          <a:prstGeom prst="rect">
+            <a:avLst/>
+          </a:prstGeom>
+          <a:noFill/>
+          <a:ln>
+            <a:noFill/>
+          </a:ln>
+          <a:extLst>
+            <a:ext uri="{909E8E84-426E-40DD-AFC4-6F175D3DCCD1}">
+              <a14:hiddenFill xmlns:a14="http://schemas.microsoft.com/office/drawing/2010/main">
+                <a:solidFill>
+                  <a:srgbClr val="FFFFFF"/>
+                </a:solidFill>
+              </a14:hiddenFill>
+            </a:ext>
+            <a:ext uri="{91240B29-F687-4F45-9708-019B960494DF}">
+              <a14:hiddenLine xmlns:a14="http://schemas.microsoft.com/office/drawing/2010/main" w="9525">
+                <a:solidFill>
+                  <a:srgbClr val="000000"/>
+                </a:solidFill>
+                <a:miter lim="800000"/>
+                <a:headEnd/>
+                <a:tailEnd/>
+              </a14:hiddenLine>
+            </a:ext>
+          </a:extLst>
+        </p:spPr>
+        <p:txBody>
+          <a:bodyPr>
+            <a:spAutoFit/>
+          </a:bodyPr>
+          <a:lstStyle>
+            <a:lvl1pPr>
+              <a:defRPr>
+                <a:solidFill>
+                  <a:schemeClr val="tx1"/>
+                </a:solidFill>
+                <a:latin typeface="Calibri" panose="020F0502020204030204" pitchFamily="34" charset="0"/>
+              </a:defRPr>
+            </a:lvl1pPr>
+            <a:lvl2pPr marL="742950" indent="-285750">
+              <a:defRPr>
+                <a:solidFill>
+                  <a:schemeClr val="tx1"/>
+                </a:solidFill>
+                <a:latin typeface="Calibri" panose="020F0502020204030204" pitchFamily="34" charset="0"/>
+              </a:defRPr>
+            </a:lvl2pPr>
+            <a:lvl3pPr marL="1143000" indent="-228600">
+              <a:defRPr>
+                <a:solidFill>
+                  <a:schemeClr val="tx1"/>
+                </a:solidFill>
+                <a:latin typeface="Calibri" panose="020F0502020204030204" pitchFamily="34" charset="0"/>
+              </a:defRPr>
+            </a:lvl3pPr>
+            <a:lvl4pPr marL="1600200" indent="-228600">
+              <a:defRPr>
+                <a:solidFill>
+                  <a:schemeClr val="tx1"/>
+                </a:solidFill>
+                <a:latin typeface="Calibri" panose="020F0502020204030204" pitchFamily="34" charset="0"/>
+              </a:defRPr>
+            </a:lvl4pPr>
+            <a:lvl5pPr marL="2057400" indent="-228600">
+              <a:defRPr>
+                <a:solidFill>
+                  <a:schemeClr val="tx1"/>
+                </a:solidFill>
+                <a:latin typeface="Calibri" panose="020F0502020204030204" pitchFamily="34" charset="0"/>
+              </a:defRPr>
+            </a:lvl5pPr>
+            <a:lvl6pPr marL="2514600" indent="-228600" eaLnBrk="0" fontAlgn="base" hangingPunct="0">
+              <a:spcBef>
+                <a:spcPct val="0"/>
+              </a:spcBef>
+              <a:spcAft>
+                <a:spcPct val="0"/>
+              </a:spcAft>
+              <a:defRPr>
+                <a:solidFill>
+                  <a:schemeClr val="tx1"/>
+                </a:solidFill>
+                <a:latin typeface="Calibri" panose="020F0502020204030204" pitchFamily="34" charset="0"/>
+              </a:defRPr>
+            </a:lvl6pPr>
+            <a:lvl7pPr marL="2971800" indent="-228600" eaLnBrk="0" fontAlgn="base" hangingPunct="0">
+              <a:spcBef>
+                <a:spcPct val="0"/>
+              </a:spcBef>
+              <a:spcAft>
+                <a:spcPct val="0"/>
+              </a:spcAft>
+              <a:defRPr>
+                <a:solidFill>
+                  <a:schemeClr val="tx1"/>
+                </a:solidFill>
+                <a:latin typeface="Calibri" panose="020F0502020204030204" pitchFamily="34" charset="0"/>
+              </a:defRPr>
+            </a:lvl7pPr>
+            <a:lvl8pPr marL="3429000" indent="-228600" eaLnBrk="0" fontAlgn="base" hangingPunct="0">
+              <a:spcBef>
+                <a:spcPct val="0"/>
+              </a:spcBef>
+              <a:spcAft>
+                <a:spcPct val="0"/>
+              </a:spcAft>
+              <a:defRPr>
+                <a:solidFill>
+                  <a:schemeClr val="tx1"/>
+                </a:solidFill>
+                <a:latin typeface="Calibri" panose="020F0502020204030204" pitchFamily="34" charset="0"/>
+              </a:defRPr>
+            </a:lvl8pPr>
+            <a:lvl9pPr marL="3886200" indent="-228600" eaLnBrk="0" fontAlgn="base" hangingPunct="0">
+              <a:spcBef>
+                <a:spcPct val="0"/>
+              </a:spcBef>
+              <a:spcAft>
+                <a:spcPct val="0"/>
+              </a:spcAft>
+              <a:defRPr>
+                <a:solidFill>
+                  <a:schemeClr val="tx1"/>
+                </a:solidFill>
+                <a:latin typeface="Calibri" panose="020F0502020204030204" pitchFamily="34" charset="0"/>
+              </a:defRPr>
+            </a:lvl9pPr>
+          </a:lstStyle>
+          <a:p>
+            <a:pPr algn="ctr" eaLnBrk="1" hangingPunct="1"/>
+            <a:r>
+              <a:rPr lang="en-US" altLang="en-US" sz="1100" dirty="0">
+                <a:solidFill>
+                  <a:srgbClr val="000000"/>
+                </a:solidFill>
+                <a:latin typeface="Arial" panose="020B0604020202020204" pitchFamily="34" charset="0"/>
+                <a:cs typeface="Arial" panose="020B0604020202020204" pitchFamily="34" charset="0"/>
+              </a:rPr>
+              <a:t>User</a:t>
+            </a:r>
+          </a:p>
+        </p:txBody>
+      </p:sp>
+      <p:cxnSp>
+        <p:nvCxnSpPr>
+          <p:cNvPr id="73" name="Straight Arrow Connector 72">
+            <a:extLst>
+              <a:ext uri="{FF2B5EF4-FFF2-40B4-BE49-F238E27FC236}">
+                <a16:creationId xmlns:a16="http://schemas.microsoft.com/office/drawing/2014/main" id="{CF5F8764-CD62-B749-8B6E-387092A73A5A}"/>
+              </a:ext>
+            </a:extLst>
+          </p:cNvPr>
+          <p:cNvCxnSpPr/>
+          <p:nvPr/>
+        </p:nvCxnSpPr>
+        <p:spPr>
+          <a:xfrm rot="16200000">
+            <a:off x="5148017" y="2972971"/>
+            <a:ext cx="357923" cy="0"/>
+          </a:xfrm>
+          <a:prstGeom prst="straightConnector1">
+            <a:avLst/>
+          </a:prstGeom>
+          <a:ln w="12700">
+            <a:solidFill>
+              <a:schemeClr val="tx2"/>
+            </a:solidFill>
+            <a:headEnd type="arrow" w="med" len="sm"/>
+            <a:tailEnd type="none" w="med" len="sm"/>
+          </a:ln>
+        </p:spPr>
+        <p:style>
+          <a:lnRef idx="1">
+            <a:schemeClr val="accent1"/>
+          </a:lnRef>
+          <a:fillRef idx="0">
+            <a:schemeClr val="accent1"/>
+          </a:fillRef>
+          <a:effectRef idx="0">
+            <a:schemeClr val="accent1"/>
+          </a:effectRef>
+          <a:fontRef idx="minor">
+            <a:schemeClr val="tx1"/>
+          </a:fontRef>
+        </p:style>
+      </p:cxnSp>
+      <p:sp>
+        <p:nvSpPr>
+          <p:cNvPr id="74" name="Freeform 73">
+            <a:extLst>
+              <a:ext uri="{FF2B5EF4-FFF2-40B4-BE49-F238E27FC236}">
+                <a16:creationId xmlns:a16="http://schemas.microsoft.com/office/drawing/2014/main" id="{816E7F35-2AFA-4042-9928-EA7E8A66AE29}"/>
+              </a:ext>
+            </a:extLst>
+          </p:cNvPr>
+          <p:cNvSpPr/>
+          <p:nvPr/>
+        </p:nvSpPr>
+        <p:spPr>
+          <a:xfrm flipH="1" flipV="1">
+            <a:off x="5493045" y="2783989"/>
+            <a:ext cx="1715366" cy="194206"/>
+          </a:xfrm>
+          <a:custGeom>
+            <a:avLst/>
+            <a:gdLst>
+              <a:gd name="connsiteX0" fmla="*/ 1371600 w 1371600"/>
+              <a:gd name="connsiteY0" fmla="*/ 711200 h 711200"/>
+              <a:gd name="connsiteX1" fmla="*/ 1371600 w 1371600"/>
+              <a:gd name="connsiteY1" fmla="*/ 0 h 711200"/>
+              <a:gd name="connsiteX2" fmla="*/ 0 w 1371600"/>
+              <a:gd name="connsiteY2" fmla="*/ 0 h 711200"/>
+            </a:gdLst>
+            <a:ahLst/>
+            <a:cxnLst>
+              <a:cxn ang="0">
+                <a:pos x="connsiteX0" y="connsiteY0"/>
+              </a:cxn>
+              <a:cxn ang="0">
+                <a:pos x="connsiteX1" y="connsiteY1"/>
+              </a:cxn>
+              <a:cxn ang="0">
+                <a:pos x="connsiteX2" y="connsiteY2"/>
+              </a:cxn>
+            </a:cxnLst>
+            <a:rect l="l" t="t" r="r" b="b"/>
+            <a:pathLst>
+              <a:path w="1371600" h="711200">
+                <a:moveTo>
+                  <a:pt x="1371600" y="711200"/>
+                </a:moveTo>
+                <a:lnTo>
+                  <a:pt x="1371600" y="0"/>
+                </a:lnTo>
+                <a:lnTo>
+                  <a:pt x="0" y="0"/>
+                </a:lnTo>
+              </a:path>
+            </a:pathLst>
+          </a:custGeom>
+          <a:noFill/>
+          <a:ln w="12700">
+            <a:solidFill>
+              <a:schemeClr val="tx2"/>
+            </a:solidFill>
+            <a:headEnd type="none" w="med" len="sm"/>
+            <a:tailEnd type="none" w="med" len="sm"/>
+          </a:ln>
+        </p:spPr>
+        <p:style>
+          <a:lnRef idx="2">
+            <a:schemeClr val="accent1">
+              <a:shade val="50000"/>
+            </a:schemeClr>
+          </a:lnRef>
+          <a:fillRef idx="1">
+            <a:schemeClr val="accent1"/>
+          </a:fillRef>
+          <a:effectRef idx="0">
+            <a:schemeClr val="accent1"/>
+          </a:effectRef>
+          <a:fontRef idx="minor">
+            <a:schemeClr val="lt1"/>
+          </a:fontRef>
+        </p:style>
+        <p:txBody>
+          <a:bodyPr anchor="ctr"/>
+          <a:lstStyle/>
+          <a:p>
+            <a:pPr algn="ctr" eaLnBrk="1" fontAlgn="auto" hangingPunct="1">
+              <a:spcBef>
+                <a:spcPts val="0"/>
+              </a:spcBef>
+              <a:spcAft>
+                <a:spcPts val="0"/>
+              </a:spcAft>
+              <a:defRPr/>
+            </a:pPr>
+            <a:endParaRPr lang="en-US" dirty="0"/>
+          </a:p>
+        </p:txBody>
+      </p:sp>
+      <p:cxnSp>
+        <p:nvCxnSpPr>
+          <p:cNvPr id="75" name="Straight Arrow Connector 74">
+            <a:extLst>
+              <a:ext uri="{FF2B5EF4-FFF2-40B4-BE49-F238E27FC236}">
+                <a16:creationId xmlns:a16="http://schemas.microsoft.com/office/drawing/2014/main" id="{19E98928-8A3D-BF45-92E2-81449DCD81E0}"/>
+              </a:ext>
+            </a:extLst>
+          </p:cNvPr>
+          <p:cNvCxnSpPr/>
+          <p:nvPr/>
+        </p:nvCxnSpPr>
+        <p:spPr>
+          <a:xfrm rot="16200000">
+            <a:off x="7124924" y="3055799"/>
+            <a:ext cx="166975" cy="0"/>
+          </a:xfrm>
+          <a:prstGeom prst="straightConnector1">
+            <a:avLst/>
+          </a:prstGeom>
+          <a:ln w="12700">
+            <a:solidFill>
+              <a:schemeClr val="tx2"/>
+            </a:solidFill>
+            <a:headEnd type="arrow" w="med" len="sm"/>
+            <a:tailEnd type="none" w="med" len="sm"/>
+          </a:ln>
+        </p:spPr>
+        <p:style>
+          <a:lnRef idx="1">
+            <a:schemeClr val="accent1"/>
+          </a:lnRef>
+          <a:fillRef idx="0">
+            <a:schemeClr val="accent1"/>
+          </a:fillRef>
+          <a:effectRef idx="0">
+            <a:schemeClr val="accent1"/>
+          </a:effectRef>
+          <a:fontRef idx="minor">
+            <a:schemeClr val="tx1"/>
+          </a:fontRef>
+        </p:style>
+      </p:cxnSp>
+      <p:cxnSp>
+        <p:nvCxnSpPr>
+          <p:cNvPr id="76" name="Straight Arrow Connector 75">
+            <a:extLst>
+              <a:ext uri="{FF2B5EF4-FFF2-40B4-BE49-F238E27FC236}">
+                <a16:creationId xmlns:a16="http://schemas.microsoft.com/office/drawing/2014/main" id="{1877A14F-B8EE-1F43-B6A7-2DE0A0B78F6E}"/>
+              </a:ext>
+            </a:extLst>
+          </p:cNvPr>
+          <p:cNvCxnSpPr/>
+          <p:nvPr/>
+        </p:nvCxnSpPr>
+        <p:spPr>
+          <a:xfrm rot="16200000">
+            <a:off x="5140995" y="4155897"/>
+            <a:ext cx="357923" cy="0"/>
+          </a:xfrm>
+          <a:prstGeom prst="straightConnector1">
+            <a:avLst/>
+          </a:prstGeom>
+          <a:ln w="12700">
+            <a:solidFill>
+              <a:schemeClr val="tx2"/>
+            </a:solidFill>
+            <a:headEnd type="arrow" w="med" len="sm"/>
+            <a:tailEnd type="none" w="med" len="sm"/>
+          </a:ln>
+        </p:spPr>
+        <p:style>
+          <a:lnRef idx="1">
+            <a:schemeClr val="accent1"/>
+          </a:lnRef>
+          <a:fillRef idx="0">
+            <a:schemeClr val="accent1"/>
+          </a:fillRef>
+          <a:effectRef idx="0">
+            <a:schemeClr val="accent1"/>
+          </a:effectRef>
+          <a:fontRef idx="minor">
+            <a:schemeClr val="tx1"/>
+          </a:fontRef>
+        </p:style>
+      </p:cxnSp>
+      <p:cxnSp>
+        <p:nvCxnSpPr>
+          <p:cNvPr id="77" name="Straight Arrow Connector 76">
+            <a:extLst>
+              <a:ext uri="{FF2B5EF4-FFF2-40B4-BE49-F238E27FC236}">
+                <a16:creationId xmlns:a16="http://schemas.microsoft.com/office/drawing/2014/main" id="{124C11BF-2049-3F4D-B13B-B9127C06844E}"/>
+              </a:ext>
+            </a:extLst>
+          </p:cNvPr>
+          <p:cNvCxnSpPr/>
+          <p:nvPr/>
+        </p:nvCxnSpPr>
+        <p:spPr>
+          <a:xfrm rot="16200000">
+            <a:off x="7015783" y="4128768"/>
+            <a:ext cx="357923" cy="0"/>
+          </a:xfrm>
+          <a:prstGeom prst="straightConnector1">
+            <a:avLst/>
+          </a:prstGeom>
+          <a:ln w="12700">
+            <a:solidFill>
+              <a:schemeClr val="tx2"/>
+            </a:solidFill>
+            <a:headEnd type="arrow" w="med" len="sm"/>
+            <a:tailEnd type="none" w="med" len="sm"/>
+          </a:ln>
+        </p:spPr>
+        <p:style>
+          <a:lnRef idx="1">
+            <a:schemeClr val="accent1"/>
+          </a:lnRef>
+          <a:fillRef idx="0">
+            <a:schemeClr val="accent1"/>
+          </a:fillRef>
+          <a:effectRef idx="0">
+            <a:schemeClr val="accent1"/>
+          </a:effectRef>
+          <a:fontRef idx="minor">
+            <a:schemeClr val="tx1"/>
+          </a:fontRef>
+        </p:style>
+      </p:cxnSp>
+      <p:sp>
+        <p:nvSpPr>
+          <p:cNvPr id="78" name="Freeform 77">
+            <a:extLst>
+              <a:ext uri="{FF2B5EF4-FFF2-40B4-BE49-F238E27FC236}">
+                <a16:creationId xmlns:a16="http://schemas.microsoft.com/office/drawing/2014/main" id="{B9548BC4-921C-784A-B566-6737B6A9C459}"/>
+              </a:ext>
+            </a:extLst>
+          </p:cNvPr>
+          <p:cNvSpPr/>
+          <p:nvPr/>
+        </p:nvSpPr>
+        <p:spPr>
+          <a:xfrm rot="10800000" flipH="1">
+            <a:off x="6186692" y="5465031"/>
+            <a:ext cx="1008052" cy="680712"/>
+          </a:xfrm>
+          <a:custGeom>
+            <a:avLst/>
+            <a:gdLst>
+              <a:gd name="connsiteX0" fmla="*/ 1371600 w 1371600"/>
+              <a:gd name="connsiteY0" fmla="*/ 711200 h 711200"/>
+              <a:gd name="connsiteX1" fmla="*/ 1371600 w 1371600"/>
+              <a:gd name="connsiteY1" fmla="*/ 0 h 711200"/>
+              <a:gd name="connsiteX2" fmla="*/ 0 w 1371600"/>
+              <a:gd name="connsiteY2" fmla="*/ 0 h 711200"/>
+            </a:gdLst>
+            <a:ahLst/>
+            <a:cxnLst>
+              <a:cxn ang="0">
+                <a:pos x="connsiteX0" y="connsiteY0"/>
+              </a:cxn>
+              <a:cxn ang="0">
+                <a:pos x="connsiteX1" y="connsiteY1"/>
+              </a:cxn>
+              <a:cxn ang="0">
+                <a:pos x="connsiteX2" y="connsiteY2"/>
+              </a:cxn>
+            </a:cxnLst>
+            <a:rect l="l" t="t" r="r" b="b"/>
+            <a:pathLst>
+              <a:path w="1371600" h="711200">
+                <a:moveTo>
+                  <a:pt x="1371600" y="711200"/>
+                </a:moveTo>
+                <a:lnTo>
+                  <a:pt x="1371600" y="0"/>
+                </a:lnTo>
+                <a:lnTo>
+                  <a:pt x="0" y="0"/>
+                </a:lnTo>
+              </a:path>
+            </a:pathLst>
+          </a:custGeom>
+          <a:noFill/>
+          <a:ln w="12700">
+            <a:solidFill>
+              <a:schemeClr val="tx2"/>
+            </a:solidFill>
+            <a:headEnd type="none" w="med" len="sm"/>
+            <a:tailEnd type="arrow" w="med" len="sm"/>
+          </a:ln>
+        </p:spPr>
+        <p:style>
+          <a:lnRef idx="2">
+            <a:schemeClr val="accent1">
+              <a:shade val="50000"/>
+            </a:schemeClr>
+          </a:lnRef>
+          <a:fillRef idx="1">
+            <a:schemeClr val="accent1"/>
+          </a:fillRef>
+          <a:effectRef idx="0">
+            <a:schemeClr val="accent1"/>
+          </a:effectRef>
+          <a:fontRef idx="minor">
+            <a:schemeClr val="lt1"/>
+          </a:fontRef>
+        </p:style>
+        <p:txBody>
+          <a:bodyPr anchor="ctr"/>
+          <a:lstStyle/>
+          <a:p>
+            <a:pPr algn="ctr" eaLnBrk="1" fontAlgn="auto" hangingPunct="1">
+              <a:spcBef>
+                <a:spcPts val="0"/>
+              </a:spcBef>
+              <a:spcAft>
+                <a:spcPts val="0"/>
+              </a:spcAft>
+              <a:defRPr/>
+            </a:pPr>
+            <a:endParaRPr lang="en-US" dirty="0"/>
+          </a:p>
+        </p:txBody>
+      </p:sp>
+      <p:sp>
+        <p:nvSpPr>
+          <p:cNvPr id="79" name="Freeform 78">
+            <a:extLst>
+              <a:ext uri="{FF2B5EF4-FFF2-40B4-BE49-F238E27FC236}">
+                <a16:creationId xmlns:a16="http://schemas.microsoft.com/office/drawing/2014/main" id="{C8070288-70EE-9B4E-A224-6DF58944EAFC}"/>
+              </a:ext>
+            </a:extLst>
+          </p:cNvPr>
+          <p:cNvSpPr/>
+          <p:nvPr/>
+        </p:nvSpPr>
+        <p:spPr>
+          <a:xfrm flipH="1" flipV="1">
+            <a:off x="2835231" y="2630989"/>
+            <a:ext cx="2484724" cy="3215236"/>
+          </a:xfrm>
+          <a:custGeom>
+            <a:avLst/>
+            <a:gdLst>
+              <a:gd name="connsiteX0" fmla="*/ 1371600 w 1371600"/>
+              <a:gd name="connsiteY0" fmla="*/ 711200 h 711200"/>
+              <a:gd name="connsiteX1" fmla="*/ 1371600 w 1371600"/>
+              <a:gd name="connsiteY1" fmla="*/ 0 h 711200"/>
+              <a:gd name="connsiteX2" fmla="*/ 0 w 1371600"/>
+              <a:gd name="connsiteY2" fmla="*/ 0 h 711200"/>
+            </a:gdLst>
+            <a:ahLst/>
+            <a:cxnLst>
+              <a:cxn ang="0">
+                <a:pos x="connsiteX0" y="connsiteY0"/>
+              </a:cxn>
+              <a:cxn ang="0">
+                <a:pos x="connsiteX1" y="connsiteY1"/>
+              </a:cxn>
+              <a:cxn ang="0">
+                <a:pos x="connsiteX2" y="connsiteY2"/>
+              </a:cxn>
+            </a:cxnLst>
+            <a:rect l="l" t="t" r="r" b="b"/>
+            <a:pathLst>
+              <a:path w="1371600" h="711200">
+                <a:moveTo>
+                  <a:pt x="1371600" y="711200"/>
+                </a:moveTo>
+                <a:lnTo>
+                  <a:pt x="1371600" y="0"/>
+                </a:lnTo>
+                <a:lnTo>
+                  <a:pt x="0" y="0"/>
+                </a:lnTo>
+              </a:path>
+            </a:pathLst>
+          </a:custGeom>
+          <a:noFill/>
+          <a:ln w="12700">
+            <a:solidFill>
+              <a:schemeClr val="tx2"/>
+            </a:solidFill>
+            <a:headEnd type="arrow" w="med" len="sm"/>
+            <a:tailEnd type="none" w="med" len="sm"/>
+          </a:ln>
+        </p:spPr>
+        <p:style>
+          <a:lnRef idx="2">
+            <a:schemeClr val="accent1">
+              <a:shade val="50000"/>
+            </a:schemeClr>
+          </a:lnRef>
+          <a:fillRef idx="1">
+            <a:schemeClr val="accent1"/>
+          </a:fillRef>
+          <a:effectRef idx="0">
+            <a:schemeClr val="accent1"/>
+          </a:effectRef>
+          <a:fontRef idx="minor">
+            <a:schemeClr val="lt1"/>
+          </a:fontRef>
+        </p:style>
+        <p:txBody>
+          <a:bodyPr anchor="ctr"/>
+          <a:lstStyle/>
+          <a:p>
+            <a:pPr algn="ctr" eaLnBrk="1" fontAlgn="auto" hangingPunct="1">
+              <a:spcBef>
+                <a:spcPts val="0"/>
+              </a:spcBef>
+              <a:spcAft>
+                <a:spcPts val="0"/>
+              </a:spcAft>
+              <a:defRPr/>
+            </a:pPr>
+            <a:endParaRPr lang="en-US" dirty="0"/>
+          </a:p>
+        </p:txBody>
+      </p:sp>
+      <p:cxnSp>
+        <p:nvCxnSpPr>
+          <p:cNvPr id="80" name="Straight Arrow Connector 79">
+            <a:extLst>
+              <a:ext uri="{FF2B5EF4-FFF2-40B4-BE49-F238E27FC236}">
+                <a16:creationId xmlns:a16="http://schemas.microsoft.com/office/drawing/2014/main" id="{56870740-4A39-A14E-85C0-0847598467B9}"/>
+              </a:ext>
+            </a:extLst>
+          </p:cNvPr>
+          <p:cNvCxnSpPr/>
+          <p:nvPr/>
+        </p:nvCxnSpPr>
+        <p:spPr>
+          <a:xfrm rot="16200000">
+            <a:off x="5140994" y="5672471"/>
+            <a:ext cx="357923" cy="0"/>
+          </a:xfrm>
+          <a:prstGeom prst="straightConnector1">
+            <a:avLst/>
+          </a:prstGeom>
+          <a:ln w="12700">
+            <a:solidFill>
+              <a:schemeClr val="tx2"/>
+            </a:solidFill>
+            <a:headEnd type="none" w="med" len="sm"/>
+            <a:tailEnd type="none" w="med" len="sm"/>
+          </a:ln>
+        </p:spPr>
+        <p:style>
+          <a:lnRef idx="1">
+            <a:schemeClr val="accent1"/>
+          </a:lnRef>
+          <a:fillRef idx="0">
+            <a:schemeClr val="accent1"/>
+          </a:fillRef>
+          <a:effectRef idx="0">
+            <a:schemeClr val="accent1"/>
+          </a:effectRef>
+          <a:fontRef idx="minor">
+            <a:schemeClr val="tx1"/>
+          </a:fontRef>
+        </p:style>
+      </p:cxnSp>
+      <p:sp>
+        <p:nvSpPr>
+          <p:cNvPr id="45" name="TextBox 9">
+            <a:extLst>
+              <a:ext uri="{FF2B5EF4-FFF2-40B4-BE49-F238E27FC236}">
+                <a16:creationId xmlns:a16="http://schemas.microsoft.com/office/drawing/2014/main" id="{D74A4489-6EF9-4C42-8389-DEA841189CC2}"/>
+              </a:ext>
+            </a:extLst>
+          </p:cNvPr>
+          <p:cNvSpPr txBox="1">
+            <a:spLocks noChangeArrowheads="1"/>
+          </p:cNvSpPr>
+          <p:nvPr/>
+        </p:nvSpPr>
+        <p:spPr bwMode="auto">
+          <a:xfrm>
+            <a:off x="4827438" y="2242631"/>
+            <a:ext cx="1050413" cy="461665"/>
+          </a:xfrm>
+          <a:prstGeom prst="rect">
+            <a:avLst/>
+          </a:prstGeom>
+          <a:noFill/>
+          <a:ln>
+            <a:noFill/>
+          </a:ln>
+          <a:extLst>
+            <a:ext uri="{909E8E84-426E-40DD-AFC4-6F175D3DCCD1}">
+              <a14:hiddenFill xmlns:a14="http://schemas.microsoft.com/office/drawing/2010/main">
+                <a:solidFill>
+                  <a:srgbClr val="FFFFFF"/>
+                </a:solidFill>
+              </a14:hiddenFill>
+            </a:ext>
+            <a:ext uri="{91240B29-F687-4F45-9708-019B960494DF}">
+              <a14:hiddenLine xmlns:a14="http://schemas.microsoft.com/office/drawing/2010/main" w="9525">
+                <a:solidFill>
+                  <a:srgbClr val="000000"/>
+                </a:solidFill>
+                <a:miter lim="800000"/>
+                <a:headEnd/>
+                <a:tailEnd/>
+              </a14:hiddenLine>
+            </a:ext>
+          </a:extLst>
+        </p:spPr>
+        <p:txBody>
+          <a:bodyPr wrap="square">
+            <a:spAutoFit/>
+          </a:bodyPr>
+          <a:lstStyle>
+            <a:lvl1pPr>
+              <a:defRPr>
+                <a:solidFill>
+                  <a:schemeClr val="tx1"/>
+                </a:solidFill>
+                <a:latin typeface="Calibri" panose="020F0502020204030204" pitchFamily="34" charset="0"/>
+              </a:defRPr>
+            </a:lvl1pPr>
+            <a:lvl2pPr marL="742950" indent="-285750">
+              <a:defRPr>
+                <a:solidFill>
+                  <a:schemeClr val="tx1"/>
+                </a:solidFill>
+                <a:latin typeface="Calibri" panose="020F0502020204030204" pitchFamily="34" charset="0"/>
+              </a:defRPr>
+            </a:lvl2pPr>
+            <a:lvl3pPr marL="1143000" indent="-228600">
+              <a:defRPr>
+                <a:solidFill>
+                  <a:schemeClr val="tx1"/>
+                </a:solidFill>
+                <a:latin typeface="Calibri" panose="020F0502020204030204" pitchFamily="34" charset="0"/>
+              </a:defRPr>
+            </a:lvl3pPr>
+            <a:lvl4pPr marL="1600200" indent="-228600">
+              <a:defRPr>
+                <a:solidFill>
+                  <a:schemeClr val="tx1"/>
+                </a:solidFill>
+                <a:latin typeface="Calibri" panose="020F0502020204030204" pitchFamily="34" charset="0"/>
+              </a:defRPr>
+            </a:lvl4pPr>
+            <a:lvl5pPr marL="2057400" indent="-228600">
+              <a:defRPr>
+                <a:solidFill>
+                  <a:schemeClr val="tx1"/>
+                </a:solidFill>
+                <a:latin typeface="Calibri" panose="020F0502020204030204" pitchFamily="34" charset="0"/>
+              </a:defRPr>
+            </a:lvl5pPr>
+            <a:lvl6pPr marL="2514600" indent="-228600" eaLnBrk="0" fontAlgn="base" hangingPunct="0">
+              <a:spcBef>
+                <a:spcPct val="0"/>
+              </a:spcBef>
+              <a:spcAft>
+                <a:spcPct val="0"/>
+              </a:spcAft>
+              <a:defRPr>
+                <a:solidFill>
+                  <a:schemeClr val="tx1"/>
+                </a:solidFill>
+                <a:latin typeface="Calibri" panose="020F0502020204030204" pitchFamily="34" charset="0"/>
+              </a:defRPr>
+            </a:lvl6pPr>
+            <a:lvl7pPr marL="2971800" indent="-228600" eaLnBrk="0" fontAlgn="base" hangingPunct="0">
+              <a:spcBef>
+                <a:spcPct val="0"/>
+              </a:spcBef>
+              <a:spcAft>
+                <a:spcPct val="0"/>
+              </a:spcAft>
+              <a:defRPr>
+                <a:solidFill>
+                  <a:schemeClr val="tx1"/>
+                </a:solidFill>
+                <a:latin typeface="Calibri" panose="020F0502020204030204" pitchFamily="34" charset="0"/>
+              </a:defRPr>
+            </a:lvl7pPr>
+            <a:lvl8pPr marL="3429000" indent="-228600" eaLnBrk="0" fontAlgn="base" hangingPunct="0">
+              <a:spcBef>
+                <a:spcPct val="0"/>
+              </a:spcBef>
+              <a:spcAft>
+                <a:spcPct val="0"/>
+              </a:spcAft>
+              <a:defRPr>
+                <a:solidFill>
+                  <a:schemeClr val="tx1"/>
+                </a:solidFill>
+                <a:latin typeface="Calibri" panose="020F0502020204030204" pitchFamily="34" charset="0"/>
+              </a:defRPr>
+            </a:lvl8pPr>
+            <a:lvl9pPr marL="3886200" indent="-228600" eaLnBrk="0" fontAlgn="base" hangingPunct="0">
+              <a:spcBef>
+                <a:spcPct val="0"/>
+              </a:spcBef>
+              <a:spcAft>
+                <a:spcPct val="0"/>
+              </a:spcAft>
+              <a:defRPr>
+                <a:solidFill>
+                  <a:schemeClr val="tx1"/>
+                </a:solidFill>
+                <a:latin typeface="Calibri" panose="020F0502020204030204" pitchFamily="34" charset="0"/>
+              </a:defRPr>
+            </a:lvl9pPr>
+          </a:lstStyle>
+          <a:p>
+            <a:pPr algn="ctr" eaLnBrk="1" hangingPunct="1"/>
+            <a:r>
+              <a:rPr lang="en-US" altLang="en-US" sz="1200" dirty="0">
+                <a:latin typeface="Arial" panose="020B0604020202020204" pitchFamily="34" charset="0"/>
+                <a:ea typeface="Amazon Ember" panose="020B0603020204020204" pitchFamily="34" charset="0"/>
+                <a:cs typeface="Arial" panose="020B0604020202020204" pitchFamily="34" charset="0"/>
+              </a:rPr>
+              <a:t>AWS loT Core</a:t>
+            </a:r>
+          </a:p>
+        </p:txBody>
+      </p:sp>
+      <p:sp>
+        <p:nvSpPr>
+          <p:cNvPr id="48" name="TextBox 16">
+            <a:extLst>
+              <a:ext uri="{FF2B5EF4-FFF2-40B4-BE49-F238E27FC236}">
+                <a16:creationId xmlns:a16="http://schemas.microsoft.com/office/drawing/2014/main" id="{099D59F3-19A5-4E47-9AA1-612D0AD90909}"/>
+              </a:ext>
+            </a:extLst>
+          </p:cNvPr>
+          <p:cNvSpPr txBox="1">
+            <a:spLocks noChangeArrowheads="1"/>
+          </p:cNvSpPr>
+          <p:nvPr/>
+        </p:nvSpPr>
+        <p:spPr bwMode="auto">
+          <a:xfrm>
+            <a:off x="419629" y="5543777"/>
+            <a:ext cx="1468727" cy="261610"/>
+          </a:xfrm>
+          <a:prstGeom prst="rect">
+            <a:avLst/>
+          </a:prstGeom>
+          <a:noFill/>
+          <a:ln>
+            <a:noFill/>
+          </a:ln>
+          <a:extLst>
+            <a:ext uri="{909E8E84-426E-40DD-AFC4-6F175D3DCCD1}">
+              <a14:hiddenFill xmlns:a14="http://schemas.microsoft.com/office/drawing/2010/main">
+                <a:solidFill>
+                  <a:srgbClr val="FFFFFF"/>
+                </a:solidFill>
+              </a14:hiddenFill>
+            </a:ext>
+            <a:ext uri="{91240B29-F687-4F45-9708-019B960494DF}">
+              <a14:hiddenLine xmlns:a14="http://schemas.microsoft.com/office/drawing/2010/main" w="9525">
+                <a:solidFill>
+                  <a:srgbClr val="000000"/>
+                </a:solidFill>
+                <a:miter lim="800000"/>
+                <a:headEnd/>
+                <a:tailEnd/>
+              </a14:hiddenLine>
+            </a:ext>
+          </a:extLst>
+        </p:spPr>
+        <p:txBody>
+          <a:bodyPr wrap="square">
+            <a:spAutoFit/>
+          </a:bodyPr>
+          <a:lstStyle>
+            <a:lvl1pPr>
+              <a:defRPr>
+                <a:solidFill>
+                  <a:schemeClr val="tx1"/>
+                </a:solidFill>
+                <a:latin typeface="Calibri" panose="020F0502020204030204" pitchFamily="34" charset="0"/>
+              </a:defRPr>
+            </a:lvl1pPr>
+            <a:lvl2pPr marL="742950" indent="-285750">
+              <a:defRPr>
+                <a:solidFill>
+                  <a:schemeClr val="tx1"/>
+                </a:solidFill>
+                <a:latin typeface="Calibri" panose="020F0502020204030204" pitchFamily="34" charset="0"/>
+              </a:defRPr>
+            </a:lvl2pPr>
+            <a:lvl3pPr marL="1143000" indent="-228600">
+              <a:defRPr>
+                <a:solidFill>
+                  <a:schemeClr val="tx1"/>
+                </a:solidFill>
+                <a:latin typeface="Calibri" panose="020F0502020204030204" pitchFamily="34" charset="0"/>
+              </a:defRPr>
+            </a:lvl3pPr>
+            <a:lvl4pPr marL="1600200" indent="-228600">
+              <a:defRPr>
+                <a:solidFill>
+                  <a:schemeClr val="tx1"/>
+                </a:solidFill>
+                <a:latin typeface="Calibri" panose="020F0502020204030204" pitchFamily="34" charset="0"/>
+              </a:defRPr>
+            </a:lvl4pPr>
+            <a:lvl5pPr marL="2057400" indent="-228600">
+              <a:defRPr>
+                <a:solidFill>
+                  <a:schemeClr val="tx1"/>
+                </a:solidFill>
+                <a:latin typeface="Calibri" panose="020F0502020204030204" pitchFamily="34" charset="0"/>
+              </a:defRPr>
+            </a:lvl5pPr>
+            <a:lvl6pPr marL="2514600" indent="-228600" eaLnBrk="0" fontAlgn="base" hangingPunct="0">
+              <a:spcBef>
+                <a:spcPct val="0"/>
+              </a:spcBef>
+              <a:spcAft>
+                <a:spcPct val="0"/>
+              </a:spcAft>
+              <a:defRPr>
+                <a:solidFill>
+                  <a:schemeClr val="tx1"/>
+                </a:solidFill>
+                <a:latin typeface="Calibri" panose="020F0502020204030204" pitchFamily="34" charset="0"/>
+              </a:defRPr>
+            </a:lvl6pPr>
+            <a:lvl7pPr marL="2971800" indent="-228600" eaLnBrk="0" fontAlgn="base" hangingPunct="0">
+              <a:spcBef>
+                <a:spcPct val="0"/>
+              </a:spcBef>
+              <a:spcAft>
+                <a:spcPct val="0"/>
+              </a:spcAft>
+              <a:defRPr>
+                <a:solidFill>
+                  <a:schemeClr val="tx1"/>
+                </a:solidFill>
+                <a:latin typeface="Calibri" panose="020F0502020204030204" pitchFamily="34" charset="0"/>
+              </a:defRPr>
+            </a:lvl7pPr>
+            <a:lvl8pPr marL="3429000" indent="-228600" eaLnBrk="0" fontAlgn="base" hangingPunct="0">
+              <a:spcBef>
+                <a:spcPct val="0"/>
+              </a:spcBef>
+              <a:spcAft>
+                <a:spcPct val="0"/>
+              </a:spcAft>
+              <a:defRPr>
+                <a:solidFill>
+                  <a:schemeClr val="tx1"/>
+                </a:solidFill>
+                <a:latin typeface="Calibri" panose="020F0502020204030204" pitchFamily="34" charset="0"/>
+              </a:defRPr>
+            </a:lvl8pPr>
+            <a:lvl9pPr marL="3886200" indent="-228600" eaLnBrk="0" fontAlgn="base" hangingPunct="0">
+              <a:spcBef>
+                <a:spcPct val="0"/>
+              </a:spcBef>
+              <a:spcAft>
+                <a:spcPct val="0"/>
+              </a:spcAft>
+              <a:defRPr>
+                <a:solidFill>
+                  <a:schemeClr val="tx1"/>
+                </a:solidFill>
+                <a:latin typeface="Calibri" panose="020F0502020204030204" pitchFamily="34" charset="0"/>
+              </a:defRPr>
+            </a:lvl9pPr>
+          </a:lstStyle>
+          <a:p>
+            <a:pPr algn="ctr" eaLnBrk="1" hangingPunct="1"/>
+            <a:r>
+              <a:rPr lang="en-US" altLang="en-US" sz="1100" dirty="0">
+                <a:latin typeface="Arial" panose="020B0604020202020204" pitchFamily="34" charset="0"/>
+                <a:ea typeface="Amazon Ember" panose="020B0603020204020204" pitchFamily="34" charset="0"/>
+                <a:cs typeface="Arial" panose="020B0604020202020204" pitchFamily="34" charset="0"/>
+              </a:rPr>
+              <a:t>Endpoint</a:t>
+            </a:r>
+          </a:p>
+        </p:txBody>
+      </p:sp>
+      <p:pic>
+        <p:nvPicPr>
+          <p:cNvPr id="49" name="Graphic 6">
+            <a:extLst>
+              <a:ext uri="{FF2B5EF4-FFF2-40B4-BE49-F238E27FC236}">
+                <a16:creationId xmlns:a16="http://schemas.microsoft.com/office/drawing/2014/main" id="{FD960BCD-0D1F-914A-B9E9-229CD74E312A}"/>
+              </a:ext>
+            </a:extLst>
+          </p:cNvPr>
+          <p:cNvPicPr>
+            <a:picLocks noChangeAspect="1" noChangeArrowheads="1"/>
+          </p:cNvPicPr>
+          <p:nvPr/>
+        </p:nvPicPr>
+        <p:blipFill>
+          <a:blip r:embed="rId12">
+            <a:extLst>
+              <a:ext uri="{96DAC541-7B7A-43D3-8B79-37D633B846F1}">
+                <asvg:svgBlip xmlns:asvg="http://schemas.microsoft.com/office/drawing/2016/SVG/main" xmlns="" r:embed="rId13"/>
+              </a:ext>
+            </a:extLst>
+          </a:blip>
+          <a:srcRect/>
+          <a:stretch/>
+        </p:blipFill>
+        <p:spPr bwMode="auto">
+          <a:xfrm>
+            <a:off x="915005" y="5086577"/>
+            <a:ext cx="457200" cy="457200"/>
+          </a:xfrm>
+          <a:prstGeom prst="rect">
+            <a:avLst/>
+          </a:prstGeom>
+          <a:noFill/>
+          <a:ln>
+            <a:noFill/>
+          </a:ln>
+          <a:extLst>
+            <a:ext uri="{909E8E84-426E-40DD-AFC4-6F175D3DCCD1}">
+              <a14:hiddenFill xmlns:a14="http://schemas.microsoft.com/office/drawing/2010/main">
+                <a:solidFill>
+                  <a:srgbClr val="FFFFFF"/>
+                </a:solidFill>
+              </a14:hiddenFill>
+            </a:ext>
+            <a:ext uri="{91240B29-F687-4F45-9708-019B960494DF}">
+              <a14:hiddenLine xmlns:a14="http://schemas.microsoft.com/office/drawing/2010/main" w="9525">
+                <a:solidFill>
+                  <a:srgbClr val="000000"/>
+                </a:solidFill>
+                <a:miter lim="800000"/>
+                <a:headEnd/>
+                <a:tailEnd/>
+              </a14:hiddenLine>
+            </a:ext>
+          </a:extLst>
+        </p:spPr>
+      </p:pic>
+      <p:sp>
+        <p:nvSpPr>
+          <p:cNvPr id="50" name="TextBox 9">
+            <a:extLst>
+              <a:ext uri="{FF2B5EF4-FFF2-40B4-BE49-F238E27FC236}">
+                <a16:creationId xmlns:a16="http://schemas.microsoft.com/office/drawing/2014/main" id="{D74A4489-6EF9-4C42-8389-DEA841189CC2}"/>
+              </a:ext>
+            </a:extLst>
+          </p:cNvPr>
+          <p:cNvSpPr txBox="1">
+            <a:spLocks noChangeArrowheads="1"/>
+          </p:cNvSpPr>
+          <p:nvPr/>
+        </p:nvSpPr>
+        <p:spPr bwMode="auto">
+          <a:xfrm>
+            <a:off x="324116" y="5805387"/>
+            <a:ext cx="1668721" cy="461665"/>
+          </a:xfrm>
+          <a:prstGeom prst="rect">
+            <a:avLst/>
+          </a:prstGeom>
+          <a:noFill/>
+          <a:ln>
+            <a:noFill/>
+          </a:ln>
+          <a:extLst>
+            <a:ext uri="{909E8E84-426E-40DD-AFC4-6F175D3DCCD1}">
+              <a14:hiddenFill xmlns:a14="http://schemas.microsoft.com/office/drawing/2010/main">
+                <a:solidFill>
+                  <a:srgbClr val="FFFFFF"/>
+                </a:solidFill>
+              </a14:hiddenFill>
+            </a:ext>
+            <a:ext uri="{91240B29-F687-4F45-9708-019B960494DF}">
+              <a14:hiddenLine xmlns:a14="http://schemas.microsoft.com/office/drawing/2010/main" w="9525">
+                <a:solidFill>
+                  <a:srgbClr val="000000"/>
+                </a:solidFill>
+                <a:miter lim="800000"/>
+                <a:headEnd/>
+                <a:tailEnd/>
+              </a14:hiddenLine>
+            </a:ext>
+          </a:extLst>
+        </p:spPr>
+        <p:txBody>
+          <a:bodyPr wrap="square">
+            <a:spAutoFit/>
+          </a:bodyPr>
+          <a:lstStyle>
+            <a:lvl1pPr>
+              <a:defRPr>
+                <a:solidFill>
+                  <a:schemeClr val="tx1"/>
+                </a:solidFill>
+                <a:latin typeface="Calibri" panose="020F0502020204030204" pitchFamily="34" charset="0"/>
+              </a:defRPr>
+            </a:lvl1pPr>
+            <a:lvl2pPr marL="742950" indent="-285750">
+              <a:defRPr>
+                <a:solidFill>
+                  <a:schemeClr val="tx1"/>
+                </a:solidFill>
+                <a:latin typeface="Calibri" panose="020F0502020204030204" pitchFamily="34" charset="0"/>
+              </a:defRPr>
+            </a:lvl2pPr>
+            <a:lvl3pPr marL="1143000" indent="-228600">
+              <a:defRPr>
+                <a:solidFill>
+                  <a:schemeClr val="tx1"/>
+                </a:solidFill>
+                <a:latin typeface="Calibri" panose="020F0502020204030204" pitchFamily="34" charset="0"/>
+              </a:defRPr>
+            </a:lvl3pPr>
+            <a:lvl4pPr marL="1600200" indent="-228600">
+              <a:defRPr>
+                <a:solidFill>
+                  <a:schemeClr val="tx1"/>
+                </a:solidFill>
+                <a:latin typeface="Calibri" panose="020F0502020204030204" pitchFamily="34" charset="0"/>
+              </a:defRPr>
+            </a:lvl4pPr>
+            <a:lvl5pPr marL="2057400" indent="-228600">
+              <a:defRPr>
+                <a:solidFill>
+                  <a:schemeClr val="tx1"/>
+                </a:solidFill>
+                <a:latin typeface="Calibri" panose="020F0502020204030204" pitchFamily="34" charset="0"/>
+              </a:defRPr>
+            </a:lvl5pPr>
+            <a:lvl6pPr marL="2514600" indent="-228600" eaLnBrk="0" fontAlgn="base" hangingPunct="0">
+              <a:spcBef>
+                <a:spcPct val="0"/>
+              </a:spcBef>
+              <a:spcAft>
+                <a:spcPct val="0"/>
+              </a:spcAft>
+              <a:defRPr>
+                <a:solidFill>
+                  <a:schemeClr val="tx1"/>
+                </a:solidFill>
+                <a:latin typeface="Calibri" panose="020F0502020204030204" pitchFamily="34" charset="0"/>
+              </a:defRPr>
+            </a:lvl6pPr>
+            <a:lvl7pPr marL="2971800" indent="-228600" eaLnBrk="0" fontAlgn="base" hangingPunct="0">
+              <a:spcBef>
+                <a:spcPct val="0"/>
+              </a:spcBef>
+              <a:spcAft>
+                <a:spcPct val="0"/>
+              </a:spcAft>
+              <a:defRPr>
+                <a:solidFill>
+                  <a:schemeClr val="tx1"/>
+                </a:solidFill>
+                <a:latin typeface="Calibri" panose="020F0502020204030204" pitchFamily="34" charset="0"/>
+              </a:defRPr>
+            </a:lvl7pPr>
+            <a:lvl8pPr marL="3429000" indent="-228600" eaLnBrk="0" fontAlgn="base" hangingPunct="0">
+              <a:spcBef>
+                <a:spcPct val="0"/>
+              </a:spcBef>
+              <a:spcAft>
+                <a:spcPct val="0"/>
+              </a:spcAft>
+              <a:defRPr>
+                <a:solidFill>
+                  <a:schemeClr val="tx1"/>
+                </a:solidFill>
+                <a:latin typeface="Calibri" panose="020F0502020204030204" pitchFamily="34" charset="0"/>
+              </a:defRPr>
+            </a:lvl8pPr>
+            <a:lvl9pPr marL="3886200" indent="-228600" eaLnBrk="0" fontAlgn="base" hangingPunct="0">
+              <a:spcBef>
+                <a:spcPct val="0"/>
+              </a:spcBef>
+              <a:spcAft>
+                <a:spcPct val="0"/>
+              </a:spcAft>
+              <a:defRPr>
+                <a:solidFill>
+                  <a:schemeClr val="tx1"/>
+                </a:solidFill>
+                <a:latin typeface="Calibri" panose="020F0502020204030204" pitchFamily="34" charset="0"/>
+              </a:defRPr>
+            </a:lvl9pPr>
+          </a:lstStyle>
+          <a:p>
+            <a:pPr algn="ctr" eaLnBrk="1" hangingPunct="1"/>
+            <a:r>
+              <a:rPr lang="en-US" altLang="en-US" sz="1200" i="1" dirty="0" smtClean="0">
+                <a:latin typeface="Arial" panose="020B0604020202020204" pitchFamily="34" charset="0"/>
+                <a:ea typeface="Amazon Ember" panose="020B0603020204020204" pitchFamily="34" charset="0"/>
+                <a:cs typeface="Arial" panose="020B0604020202020204" pitchFamily="34" charset="0"/>
+              </a:rPr>
+              <a:t>Where should the endpoint go?</a:t>
+            </a:r>
+            <a:endParaRPr lang="en-US" altLang="en-US" sz="1200" i="1" dirty="0">
+              <a:solidFill>
+                <a:srgbClr val="FF0000"/>
+              </a:solidFill>
+              <a:latin typeface="Arial" panose="020B0604020202020204" pitchFamily="34" charset="0"/>
+              <a:ea typeface="Amazon Ember" panose="020B0603020204020204" pitchFamily="34" charset="0"/>
+              <a:cs typeface="Arial" panose="020B0604020202020204" pitchFamily="34" charset="0"/>
+            </a:endParaRPr>
+          </a:p>
+        </p:txBody>
+      </p:sp>
+      <p:pic>
+        <p:nvPicPr>
+          <p:cNvPr id="53" name="Graphic 17">
+            <a:extLst>
+              <a:ext uri="{FF2B5EF4-FFF2-40B4-BE49-F238E27FC236}">
+                <a16:creationId xmlns:a16="http://schemas.microsoft.com/office/drawing/2014/main" id="{847A7472-D977-624B-9A30-47A44C4FD42F}"/>
+              </a:ext>
+            </a:extLst>
+          </p:cNvPr>
+          <p:cNvPicPr>
+            <a:picLocks noChangeAspect="1" noChangeArrowheads="1"/>
+          </p:cNvPicPr>
+          <p:nvPr/>
+        </p:nvPicPr>
+        <p:blipFill>
+          <a:blip r:embed="rId14"/>
+          <a:srcRect/>
+          <a:stretch/>
+        </p:blipFill>
+        <p:spPr bwMode="auto">
+          <a:xfrm>
+            <a:off x="766340" y="3495516"/>
+            <a:ext cx="762000" cy="762000"/>
+          </a:xfrm>
+          <a:prstGeom prst="rect">
+            <a:avLst/>
+          </a:prstGeom>
+          <a:noFill/>
+          <a:ln>
+            <a:noFill/>
+          </a:ln>
+          <a:extLst>
+            <a:ext uri="{909E8E84-426E-40DD-AFC4-6F175D3DCCD1}">
+              <a14:hiddenFill xmlns:a14="http://schemas.microsoft.com/office/drawing/2010/main">
+                <a:solidFill>
+                  <a:srgbClr val="FFFFFF"/>
+                </a:solidFill>
+              </a14:hiddenFill>
+            </a:ext>
+            <a:ext uri="{91240B29-F687-4F45-9708-019B960494DF}">
+              <a14:hiddenLine xmlns:a14="http://schemas.microsoft.com/office/drawing/2010/main" w="9525">
+                <a:solidFill>
+                  <a:srgbClr val="000000"/>
+                </a:solidFill>
+                <a:miter lim="800000"/>
+                <a:headEnd/>
+                <a:tailEnd/>
+              </a14:hiddenLine>
+            </a:ext>
+          </a:extLst>
+        </p:spPr>
+      </p:pic>
+      <p:sp>
+        <p:nvSpPr>
+          <p:cNvPr id="55" name="TextBox 9">
+            <a:extLst>
+              <a:ext uri="{FF2B5EF4-FFF2-40B4-BE49-F238E27FC236}">
+                <a16:creationId xmlns:a16="http://schemas.microsoft.com/office/drawing/2014/main" id="{D74A4489-6EF9-4C42-8389-DEA841189CC2}"/>
+              </a:ext>
+            </a:extLst>
+          </p:cNvPr>
+          <p:cNvSpPr txBox="1">
+            <a:spLocks noChangeArrowheads="1"/>
+          </p:cNvSpPr>
+          <p:nvPr/>
+        </p:nvSpPr>
+        <p:spPr bwMode="auto">
+          <a:xfrm>
+            <a:off x="242810" y="4259065"/>
+            <a:ext cx="1668721" cy="646331"/>
+          </a:xfrm>
+          <a:prstGeom prst="rect">
+            <a:avLst/>
+          </a:prstGeom>
+          <a:noFill/>
+          <a:ln>
+            <a:noFill/>
+          </a:ln>
+          <a:extLst>
+            <a:ext uri="{909E8E84-426E-40DD-AFC4-6F175D3DCCD1}">
+              <a14:hiddenFill xmlns:a14="http://schemas.microsoft.com/office/drawing/2010/main">
+                <a:solidFill>
+                  <a:srgbClr val="FFFFFF"/>
+                </a:solidFill>
+              </a14:hiddenFill>
+            </a:ext>
+            <a:ext uri="{91240B29-F687-4F45-9708-019B960494DF}">
+              <a14:hiddenLine xmlns:a14="http://schemas.microsoft.com/office/drawing/2010/main" w="9525">
+                <a:solidFill>
+                  <a:srgbClr val="000000"/>
+                </a:solidFill>
+                <a:miter lim="800000"/>
+                <a:headEnd/>
+                <a:tailEnd/>
+              </a14:hiddenLine>
+            </a:ext>
+          </a:extLst>
+        </p:spPr>
+        <p:txBody>
+          <a:bodyPr wrap="square">
+            <a:spAutoFit/>
+          </a:bodyPr>
+          <a:lstStyle>
+            <a:lvl1pPr>
+              <a:defRPr>
+                <a:solidFill>
+                  <a:schemeClr val="tx1"/>
+                </a:solidFill>
+                <a:latin typeface="Calibri" panose="020F0502020204030204" pitchFamily="34" charset="0"/>
+              </a:defRPr>
+            </a:lvl1pPr>
+            <a:lvl2pPr marL="742950" indent="-285750">
+              <a:defRPr>
+                <a:solidFill>
+                  <a:schemeClr val="tx1"/>
+                </a:solidFill>
+                <a:latin typeface="Calibri" panose="020F0502020204030204" pitchFamily="34" charset="0"/>
+              </a:defRPr>
+            </a:lvl2pPr>
+            <a:lvl3pPr marL="1143000" indent="-228600">
+              <a:defRPr>
+                <a:solidFill>
+                  <a:schemeClr val="tx1"/>
+                </a:solidFill>
+                <a:latin typeface="Calibri" panose="020F0502020204030204" pitchFamily="34" charset="0"/>
+              </a:defRPr>
+            </a:lvl3pPr>
+            <a:lvl4pPr marL="1600200" indent="-228600">
+              <a:defRPr>
+                <a:solidFill>
+                  <a:schemeClr val="tx1"/>
+                </a:solidFill>
+                <a:latin typeface="Calibri" panose="020F0502020204030204" pitchFamily="34" charset="0"/>
+              </a:defRPr>
+            </a:lvl4pPr>
+            <a:lvl5pPr marL="2057400" indent="-228600">
+              <a:defRPr>
+                <a:solidFill>
+                  <a:schemeClr val="tx1"/>
+                </a:solidFill>
+                <a:latin typeface="Calibri" panose="020F0502020204030204" pitchFamily="34" charset="0"/>
+              </a:defRPr>
+            </a:lvl5pPr>
+            <a:lvl6pPr marL="2514600" indent="-228600" eaLnBrk="0" fontAlgn="base" hangingPunct="0">
+              <a:spcBef>
+                <a:spcPct val="0"/>
+              </a:spcBef>
+              <a:spcAft>
+                <a:spcPct val="0"/>
+              </a:spcAft>
+              <a:defRPr>
+                <a:solidFill>
+                  <a:schemeClr val="tx1"/>
+                </a:solidFill>
+                <a:latin typeface="Calibri" panose="020F0502020204030204" pitchFamily="34" charset="0"/>
+              </a:defRPr>
+            </a:lvl6pPr>
+            <a:lvl7pPr marL="2971800" indent="-228600" eaLnBrk="0" fontAlgn="base" hangingPunct="0">
+              <a:spcBef>
+                <a:spcPct val="0"/>
+              </a:spcBef>
+              <a:spcAft>
+                <a:spcPct val="0"/>
+              </a:spcAft>
+              <a:defRPr>
+                <a:solidFill>
+                  <a:schemeClr val="tx1"/>
+                </a:solidFill>
+                <a:latin typeface="Calibri" panose="020F0502020204030204" pitchFamily="34" charset="0"/>
+              </a:defRPr>
+            </a:lvl7pPr>
+            <a:lvl8pPr marL="3429000" indent="-228600" eaLnBrk="0" fontAlgn="base" hangingPunct="0">
+              <a:spcBef>
+                <a:spcPct val="0"/>
+              </a:spcBef>
+              <a:spcAft>
+                <a:spcPct val="0"/>
+              </a:spcAft>
+              <a:defRPr>
+                <a:solidFill>
+                  <a:schemeClr val="tx1"/>
+                </a:solidFill>
+                <a:latin typeface="Calibri" panose="020F0502020204030204" pitchFamily="34" charset="0"/>
+              </a:defRPr>
+            </a:lvl8pPr>
+            <a:lvl9pPr marL="3886200" indent="-228600" eaLnBrk="0" fontAlgn="base" hangingPunct="0">
+              <a:spcBef>
+                <a:spcPct val="0"/>
+              </a:spcBef>
+              <a:spcAft>
+                <a:spcPct val="0"/>
+              </a:spcAft>
+              <a:defRPr>
+                <a:solidFill>
+                  <a:schemeClr val="tx1"/>
+                </a:solidFill>
+                <a:latin typeface="Calibri" panose="020F0502020204030204" pitchFamily="34" charset="0"/>
+              </a:defRPr>
+            </a:lvl9pPr>
+          </a:lstStyle>
+          <a:p>
+            <a:pPr algn="ctr"/>
+            <a:r>
+              <a:rPr lang="en-US" altLang="en-US" sz="1200" i="1" dirty="0" smtClean="0">
+                <a:latin typeface="Arial" panose="020B0604020202020204" pitchFamily="34" charset="0"/>
+                <a:ea typeface="Amazon Ember" panose="020B0603020204020204" pitchFamily="34" charset="0"/>
+                <a:cs typeface="Arial" panose="020B0604020202020204" pitchFamily="34" charset="0"/>
+              </a:rPr>
+              <a:t>Why is the icon at right </a:t>
+            </a:r>
+            <a:r>
+              <a:rPr lang="en-US" altLang="en-US" sz="1200" i="1" dirty="0">
+                <a:latin typeface="Arial" panose="020B0604020202020204" pitchFamily="34" charset="0"/>
+                <a:ea typeface="Amazon Ember" panose="020B0603020204020204" pitchFamily="34" charset="0"/>
+                <a:cs typeface="Arial" panose="020B0604020202020204" pitchFamily="34" charset="0"/>
+              </a:rPr>
+              <a:t>purple</a:t>
+            </a:r>
+            <a:r>
+              <a:rPr lang="en-US" altLang="en-US" sz="1200" i="1" dirty="0" smtClean="0">
+                <a:latin typeface="Arial" panose="020B0604020202020204" pitchFamily="34" charset="0"/>
+                <a:ea typeface="Amazon Ember" panose="020B0603020204020204" pitchFamily="34" charset="0"/>
+                <a:cs typeface="Arial" panose="020B0604020202020204" pitchFamily="34" charset="0"/>
+              </a:rPr>
+              <a:t>? It’s pink in the main deck.</a:t>
+            </a:r>
+            <a:endParaRPr lang="en-US" altLang="en-US" sz="1200" i="1" dirty="0">
+              <a:solidFill>
+                <a:srgbClr val="FF0000"/>
+              </a:solidFill>
+              <a:latin typeface="Arial" panose="020B0604020202020204" pitchFamily="34" charset="0"/>
+              <a:ea typeface="Amazon Ember" panose="020B0603020204020204" pitchFamily="34" charset="0"/>
+              <a:cs typeface="Arial" panose="020B0604020202020204" pitchFamily="34" charset="0"/>
+            </a:endParaRPr>
+          </a:p>
+        </p:txBody>
+      </p:sp>
+    </p:spTree>
+    <p:extLst>
+      <p:ext uri="{BB962C8B-B14F-4D97-AF65-F5344CB8AC3E}">
+        <p14:creationId xmlns:p14="http://schemas.microsoft.com/office/powerpoint/2010/main" val="2682772541"/>
+      </p:ext>
+    </p:extLst>
+  </p:cSld>
+  <p:clrMapOvr>
+    <a:masterClrMapping/>
+  </p:clrMapOvr>
+</p:sld>
+</file>
+
+<file path=ppt/slides/slide2.xml><?xml version="1.0" encoding="utf-8"?>
+<p:sld xmlns:a="http://schemas.openxmlformats.org/drawingml/2006/main" xmlns:r="http://schemas.openxmlformats.org/officeDocument/2006/relationships" xmlns:p="http://schemas.openxmlformats.org/presentationml/2006/main">
+  <p:cSld>
+    <p:spTree>
+      <p:nvGrpSpPr>
+        <p:cNvPr id="1" name=""/>
+        <p:cNvGrpSpPr/>
+        <p:nvPr/>
+      </p:nvGrpSpPr>
+      <p:grpSpPr>
+        <a:xfrm>
+          <a:off x="0" y="0"/>
+          <a:ext cx="0" cy="0"/>
+          <a:chOff x="0" y="0"/>
+          <a:chExt cx="0" cy="0"/>
+        </a:xfrm>
+      </p:grpSpPr>
+      <p:sp>
+        <p:nvSpPr>
+          <p:cNvPr id="4" name="Rectangle 3">
+            <a:extLst>
+              <a:ext uri="{FF2B5EF4-FFF2-40B4-BE49-F238E27FC236}">
+                <a16:creationId xmlns:a16="http://schemas.microsoft.com/office/drawing/2014/main" id="{04EAE552-E817-4F36-B1A7-BFA6CCEF6B05}"/>
+              </a:ext>
+            </a:extLst>
+          </p:cNvPr>
+          <p:cNvSpPr/>
+          <p:nvPr/>
+        </p:nvSpPr>
+        <p:spPr>
+          <a:xfrm>
             <a:off x="4292556" y="1258122"/>
             <a:ext cx="5651777" cy="4023741"/>
           </a:xfrm>
@@ -3470,7 +7660,7 @@
           <p:nvPr/>
         </p:nvPicPr>
         <p:blipFill>
-          <a:blip r:embed="rId3">
+          <a:blip r:embed="rId3" cstate="hqprint">
             <a:extLst>
               <a:ext uri="{28A0092B-C50C-407E-A947-70E740481C1C}">
                 <a14:useLocalDpi xmlns:a14="http://schemas.microsoft.com/office/drawing/2010/main" val="0"/>
@@ -3690,7 +7880,7 @@
           <p:nvPr/>
         </p:nvPicPr>
         <p:blipFill>
-          <a:blip r:embed="rId3">
+          <a:blip r:embed="rId3" cstate="hqprint">
             <a:extLst>
               <a:ext uri="{28A0092B-C50C-407E-A947-70E740481C1C}">
                 <a14:useLocalDpi xmlns:a14="http://schemas.microsoft.com/office/drawing/2010/main" val="0"/>
@@ -4528,7 +8718,7 @@
         </p:nvSpPr>
         <p:spPr>
           <a:xfrm>
-            <a:off x="1372467" y="321617"/>
+            <a:off x="1015221" y="348518"/>
             <a:ext cx="10108648" cy="644525"/>
           </a:xfrm>
           <a:prstGeom prst="rect">
@@ -4559,9 +8749,18 @@
           <a:p>
             <a:pPr algn="ctr"/>
             <a:r>
-              <a:rPr lang="en-US" altLang="en-US" sz="3600" dirty="0"/>
-              <a:t>ConnectSense Smart Power Cord on AWS</a:t>
+              <a:rPr lang="en-US" altLang="en-US" sz="3600" dirty="0" smtClean="0">
+                <a:solidFill>
+                  <a:srgbClr val="FF0000"/>
+                </a:solidFill>
+              </a:rPr>
+              <a:t>Previous version (for reference only)</a:t>
             </a:r>
+            <a:endParaRPr lang="en-US" altLang="en-US" sz="3600" dirty="0">
+              <a:solidFill>
+                <a:srgbClr val="FF0000"/>
+              </a:solidFill>
+            </a:endParaRPr>
           </a:p>
         </p:txBody>
       </p:sp>
@@ -4580,7 +8779,7 @@
           <p:nvPr/>
         </p:nvPicPr>
         <p:blipFill>
-          <a:blip r:embed="rId4">
+          <a:blip r:embed="rId4" cstate="hqprint">
             <a:extLst>
               <a:ext uri="{28A0092B-C50C-407E-A947-70E740481C1C}">
                 <a14:useLocalDpi xmlns:a14="http://schemas.microsoft.com/office/drawing/2010/main" val="0"/>
@@ -4801,7 +9000,7 @@
           <p:nvPr/>
         </p:nvPicPr>
         <p:blipFill>
-          <a:blip r:embed="rId5">
+          <a:blip r:embed="rId5" cstate="hqprint">
             <a:extLst>
               <a:ext uri="{28A0092B-C50C-407E-A947-70E740481C1C}">
                 <a14:useLocalDpi xmlns:a14="http://schemas.microsoft.com/office/drawing/2010/main" val="0"/>
@@ -5022,7 +9221,7 @@
           <p:nvPr/>
         </p:nvPicPr>
         <p:blipFill>
-          <a:blip r:embed="rId6">
+          <a:blip r:embed="rId6" cstate="hqprint">
             <a:extLst>
               <a:ext uri="{28A0092B-C50C-407E-A947-70E740481C1C}">
                 <a14:useLocalDpi xmlns:a14="http://schemas.microsoft.com/office/drawing/2010/main" val="0"/>
@@ -5243,7 +9442,7 @@
           <p:nvPr/>
         </p:nvPicPr>
         <p:blipFill>
-          <a:blip r:embed="rId7">
+          <a:blip r:embed="rId7" cstate="hqprint">
             <a:extLst>
               <a:ext uri="{28A0092B-C50C-407E-A947-70E740481C1C}">
                 <a14:useLocalDpi xmlns:a14="http://schemas.microsoft.com/office/drawing/2010/main" val="0"/>
@@ -5510,7 +9709,7 @@
           <p:nvPr/>
         </p:nvPicPr>
         <p:blipFill>
-          <a:blip r:embed="rId8">
+          <a:blip r:embed="rId8" cstate="hqprint">
             <a:extLst>
               <a:ext uri="{28A0092B-C50C-407E-A947-70E740481C1C}">
                 <a14:useLocalDpi xmlns:a14="http://schemas.microsoft.com/office/drawing/2010/main" val="0"/>
@@ -5777,7 +9976,7 @@
           <p:nvPr/>
         </p:nvPicPr>
         <p:blipFill>
-          <a:blip r:embed="rId9">
+          <a:blip r:embed="rId9" cstate="hqprint">
             <a:extLst>
               <a:ext uri="{28A0092B-C50C-407E-A947-70E740481C1C}">
                 <a14:useLocalDpi xmlns:a14="http://schemas.microsoft.com/office/drawing/2010/main" val="0"/>
@@ -6773,10 +10972,80 @@
           </a:p>
         </p:txBody>
       </p:sp>
+      <p:cxnSp>
+        <p:nvCxnSpPr>
+          <p:cNvPr id="3" name="Straight Connector 2"/>
+          <p:cNvCxnSpPr/>
+          <p:nvPr/>
+        </p:nvCxnSpPr>
+        <p:spPr>
+          <a:xfrm>
+            <a:off x="699247" y="1013012"/>
+            <a:ext cx="10703859" cy="5036938"/>
+          </a:xfrm>
+          <a:prstGeom prst="line">
+            <a:avLst/>
+          </a:prstGeom>
+          <a:ln>
+            <a:solidFill>
+              <a:srgbClr val="FF0000"/>
+            </a:solidFill>
+          </a:ln>
+        </p:spPr>
+        <p:style>
+          <a:lnRef idx="1">
+            <a:schemeClr val="accent2"/>
+          </a:lnRef>
+          <a:fillRef idx="0">
+            <a:schemeClr val="accent2"/>
+          </a:fillRef>
+          <a:effectRef idx="0">
+            <a:schemeClr val="accent2"/>
+          </a:effectRef>
+          <a:fontRef idx="minor">
+            <a:schemeClr val="tx1"/>
+          </a:fontRef>
+        </p:style>
+      </p:cxnSp>
+      <p:cxnSp>
+        <p:nvCxnSpPr>
+          <p:cNvPr id="43" name="Straight Connector 42"/>
+          <p:cNvCxnSpPr/>
+          <p:nvPr/>
+        </p:nvCxnSpPr>
+        <p:spPr>
+          <a:xfrm flipV="1">
+            <a:off x="1201271" y="824753"/>
+            <a:ext cx="9251576" cy="5499997"/>
+          </a:xfrm>
+          <a:prstGeom prst="line">
+            <a:avLst/>
+          </a:prstGeom>
+          <a:ln>
+            <a:solidFill>
+              <a:srgbClr val="FF0000"/>
+            </a:solidFill>
+          </a:ln>
+        </p:spPr>
+        <p:style>
+          <a:lnRef idx="1">
+            <a:schemeClr val="accent2"/>
+          </a:lnRef>
+          <a:fillRef idx="0">
+            <a:schemeClr val="accent2"/>
+          </a:fillRef>
+          <a:effectRef idx="0">
+            <a:schemeClr val="accent2"/>
+          </a:effectRef>
+          <a:fontRef idx="minor">
+            <a:schemeClr val="tx1"/>
+          </a:fontRef>
+        </p:style>
+      </p:cxnSp>
     </p:spTree>
     <p:extLst>
       <p:ext uri="{BB962C8B-B14F-4D97-AF65-F5344CB8AC3E}">
-        <p14:creationId xmlns:p14="http://schemas.microsoft.com/office/powerpoint/2010/main" val="2682772541"/>
+        <p14:creationId xmlns:p14="http://schemas.microsoft.com/office/powerpoint/2010/main" val="594809241"/>
       </p:ext>
     </p:extLst>
   </p:cSld>

</xml_diff>

<commit_message>
Added a question to the architecture diagram
</commit_message>
<xml_diff>
--- a/docs/images/connectsense-spc-architecture-diagram.pptx
+++ b/docs/images/connectsense-spc-architecture-diagram.pptx
@@ -5994,7 +5994,7 @@
           <a:blip r:embed="rId10">
             <a:extLst>
               <a:ext uri="{96DAC541-7B7A-43D3-8B79-37D633B846F1}">
-                <asvg:svgBlip xmlns:asvg="http://schemas.microsoft.com/office/drawing/2016/SVG/main" xmlns="" r:embed="rId11"/>
+                <asvg:svgBlip xmlns="" xmlns:asvg="http://schemas.microsoft.com/office/drawing/2016/SVG/main" r:embed="rId11"/>
               </a:ext>
             </a:extLst>
           </a:blip>
@@ -7040,7 +7040,7 @@
           <a:blip r:embed="rId12">
             <a:extLst>
               <a:ext uri="{96DAC541-7B7A-43D3-8B79-37D633B846F1}">
-                <asvg:svgBlip xmlns:asvg="http://schemas.microsoft.com/office/drawing/2016/SVG/main" xmlns="" r:embed="rId13"/>
+                <asvg:svgBlip xmlns="" xmlns:asvg="http://schemas.microsoft.com/office/drawing/2016/SVG/main" r:embed="rId13"/>
               </a:ext>
             </a:extLst>
           </a:blip>
@@ -7096,8 +7096,8 @@
         </p:nvSpPr>
         <p:spPr bwMode="auto">
           <a:xfrm>
-            <a:off x="324116" y="5805387"/>
-            <a:ext cx="1668721" cy="461665"/>
+            <a:off x="261361" y="5805387"/>
+            <a:ext cx="1797737" cy="646331"/>
           </a:xfrm>
           <a:prstGeom prst="rect">
             <a:avLst/>
@@ -7236,7 +7236,15 @@
                 <a:ea typeface="Amazon Ember" panose="020B0603020204020204" pitchFamily="34" charset="0"/>
                 <a:cs typeface="Arial" panose="020B0604020202020204" pitchFamily="34" charset="0"/>
               </a:rPr>
-              <a:t>Where should the endpoint go?</a:t>
+              <a:t>Where should the endpoint go</a:t>
+            </a:r>
+            <a:r>
+              <a:rPr lang="en-US" altLang="en-US" sz="1200" i="1" dirty="0" smtClean="0">
+                <a:latin typeface="Arial" panose="020B0604020202020204" pitchFamily="34" charset="0"/>
+                <a:ea typeface="Amazon Ember" panose="020B0603020204020204" pitchFamily="34" charset="0"/>
+                <a:cs typeface="Arial" panose="020B0604020202020204" pitchFamily="34" charset="0"/>
+              </a:rPr>
+              <a:t>? (Actually, there are two.)</a:t>
             </a:r>
             <a:endParaRPr lang="en-US" altLang="en-US" sz="1200" i="1" dirty="0">
               <a:solidFill>

</xml_diff>

<commit_message>
Updates to deployment guide
</commit_message>
<xml_diff>
--- a/docs/images/connectsense-spc-architecture-diagram.pptx
+++ b/docs/images/connectsense-spc-architecture-diagram.pptx
@@ -260,7 +260,7 @@
           <a:p>
             <a:fld id="{B254F3FA-2CD2-47E1-9871-C6CD92049798}" type="datetimeFigureOut">
               <a:rPr lang="en-US" smtClean="0"/>
-              <a:t>2/26/2021</a:t>
+              <a:t>3/12/2021</a:t>
             </a:fld>
             <a:endParaRPr lang="en-US"/>
           </a:p>
@@ -458,7 +458,7 @@
           <a:p>
             <a:fld id="{B254F3FA-2CD2-47E1-9871-C6CD92049798}" type="datetimeFigureOut">
               <a:rPr lang="en-US" smtClean="0"/>
-              <a:t>2/26/2021</a:t>
+              <a:t>3/12/2021</a:t>
             </a:fld>
             <a:endParaRPr lang="en-US"/>
           </a:p>
@@ -666,7 +666,7 @@
           <a:p>
             <a:fld id="{B254F3FA-2CD2-47E1-9871-C6CD92049798}" type="datetimeFigureOut">
               <a:rPr lang="en-US" smtClean="0"/>
-              <a:t>2/26/2021</a:t>
+              <a:t>3/12/2021</a:t>
             </a:fld>
             <a:endParaRPr lang="en-US"/>
           </a:p>
@@ -864,7 +864,7 @@
           <a:p>
             <a:fld id="{B254F3FA-2CD2-47E1-9871-C6CD92049798}" type="datetimeFigureOut">
               <a:rPr lang="en-US" smtClean="0"/>
-              <a:t>2/26/2021</a:t>
+              <a:t>3/12/2021</a:t>
             </a:fld>
             <a:endParaRPr lang="en-US"/>
           </a:p>
@@ -1139,7 +1139,7 @@
           <a:p>
             <a:fld id="{B254F3FA-2CD2-47E1-9871-C6CD92049798}" type="datetimeFigureOut">
               <a:rPr lang="en-US" smtClean="0"/>
-              <a:t>2/26/2021</a:t>
+              <a:t>3/12/2021</a:t>
             </a:fld>
             <a:endParaRPr lang="en-US"/>
           </a:p>
@@ -1404,7 +1404,7 @@
           <a:p>
             <a:fld id="{B254F3FA-2CD2-47E1-9871-C6CD92049798}" type="datetimeFigureOut">
               <a:rPr lang="en-US" smtClean="0"/>
-              <a:t>2/26/2021</a:t>
+              <a:t>3/12/2021</a:t>
             </a:fld>
             <a:endParaRPr lang="en-US"/>
           </a:p>
@@ -1816,7 +1816,7 @@
           <a:p>
             <a:fld id="{B254F3FA-2CD2-47E1-9871-C6CD92049798}" type="datetimeFigureOut">
               <a:rPr lang="en-US" smtClean="0"/>
-              <a:t>2/26/2021</a:t>
+              <a:t>3/12/2021</a:t>
             </a:fld>
             <a:endParaRPr lang="en-US"/>
           </a:p>
@@ -1957,7 +1957,7 @@
           <a:p>
             <a:fld id="{B254F3FA-2CD2-47E1-9871-C6CD92049798}" type="datetimeFigureOut">
               <a:rPr lang="en-US" smtClean="0"/>
-              <a:t>2/26/2021</a:t>
+              <a:t>3/12/2021</a:t>
             </a:fld>
             <a:endParaRPr lang="en-US"/>
           </a:p>
@@ -2070,7 +2070,7 @@
           <a:p>
             <a:fld id="{B254F3FA-2CD2-47E1-9871-C6CD92049798}" type="datetimeFigureOut">
               <a:rPr lang="en-US" smtClean="0"/>
-              <a:t>2/26/2021</a:t>
+              <a:t>3/12/2021</a:t>
             </a:fld>
             <a:endParaRPr lang="en-US"/>
           </a:p>
@@ -2381,7 +2381,7 @@
           <a:p>
             <a:fld id="{B254F3FA-2CD2-47E1-9871-C6CD92049798}" type="datetimeFigureOut">
               <a:rPr lang="en-US" smtClean="0"/>
-              <a:t>2/26/2021</a:t>
+              <a:t>3/12/2021</a:t>
             </a:fld>
             <a:endParaRPr lang="en-US"/>
           </a:p>
@@ -2669,7 +2669,7 @@
           <a:p>
             <a:fld id="{B254F3FA-2CD2-47E1-9871-C6CD92049798}" type="datetimeFigureOut">
               <a:rPr lang="en-US" smtClean="0"/>
-              <a:t>2/26/2021</a:t>
+              <a:t>3/12/2021</a:t>
             </a:fld>
             <a:endParaRPr lang="en-US"/>
           </a:p>
@@ -2910,7 +2910,7 @@
           <a:p>
             <a:fld id="{B254F3FA-2CD2-47E1-9871-C6CD92049798}" type="datetimeFigureOut">
               <a:rPr lang="en-US" smtClean="0"/>
-              <a:t>2/26/2021</a:t>
+              <a:t>3/12/2021</a:t>
             </a:fld>
             <a:endParaRPr lang="en-US"/>
           </a:p>
@@ -3327,6 +3327,66 @@
           <a:chExt cx="0" cy="0"/>
         </a:xfrm>
       </p:grpSpPr>
+      <p:pic>
+        <p:nvPicPr>
+          <p:cNvPr id="63" name="Graphic 5">
+            <a:extLst>
+              <a:ext uri="{FF2B5EF4-FFF2-40B4-BE49-F238E27FC236}">
+                <a16:creationId xmlns:a16="http://schemas.microsoft.com/office/drawing/2014/main" id="{B6B83E8C-9972-DE46-B410-542652635491}"/>
+              </a:ext>
+            </a:extLst>
+          </p:cNvPr>
+          <p:cNvPicPr>
+            <a:picLocks noChangeAspect="1" noChangeArrowheads="1"/>
+          </p:cNvPicPr>
+          <p:nvPr/>
+        </p:nvPicPr>
+        <p:blipFill>
+          <a:blip r:embed="rId2" cstate="hqprint">
+            <a:extLst>
+              <a:ext uri="{28A0092B-C50C-407E-A947-70E740481C1C}">
+                <a14:useLocalDpi xmlns:a14="http://schemas.microsoft.com/office/drawing/2010/main" val="0"/>
+              </a:ext>
+            </a:extLst>
+          </a:blip>
+          <a:srcRect/>
+          <a:stretch>
+            <a:fillRect/>
+          </a:stretch>
+        </p:blipFill>
+        <p:spPr bwMode="auto">
+          <a:xfrm>
+            <a:off x="4292556" y="1254034"/>
+            <a:ext cx="352612" cy="352612"/>
+          </a:xfrm>
+          <a:prstGeom prst="rect">
+            <a:avLst/>
+          </a:prstGeom>
+          <a:noFill/>
+          <a:ln>
+            <a:noFill/>
+          </a:ln>
+          <a:extLst>
+            <a:ext uri="{909E8E84-426E-40DD-AFC4-6F175D3DCCD1}">
+              <a14:hiddenFill xmlns:a14="http://schemas.microsoft.com/office/drawing/2010/main">
+                <a:solidFill>
+                  <a:srgbClr val="FFFFFF"/>
+                </a:solidFill>
+              </a14:hiddenFill>
+            </a:ext>
+            <a:ext uri="{91240B29-F687-4F45-9708-019B960494DF}">
+              <a14:hiddenLine xmlns:a14="http://schemas.microsoft.com/office/drawing/2010/main" w="9525">
+                <a:solidFill>
+                  <a:srgbClr val="000000"/>
+                </a:solidFill>
+                <a:miter lim="800000"/>
+                <a:headEnd/>
+                <a:tailEnd/>
+              </a14:hiddenLine>
+            </a:ext>
+          </a:extLst>
+        </p:spPr>
+      </p:pic>
       <p:sp>
         <p:nvSpPr>
           <p:cNvPr id="4" name="Rectangle 3">
@@ -3341,8 +3401,8 @@
         </p:nvSpPr>
         <p:spPr>
           <a:xfrm>
-            <a:off x="4292556" y="966142"/>
-            <a:ext cx="5651777" cy="4615108"/>
+            <a:off x="4292556" y="1254034"/>
+            <a:ext cx="5651777" cy="4327216"/>
           </a:xfrm>
           <a:prstGeom prst="rect">
             <a:avLst/>
@@ -3396,66 +3456,6 @@
           </a:p>
         </p:txBody>
       </p:sp>
-      <p:pic>
-        <p:nvPicPr>
-          <p:cNvPr id="5" name="Graphic 5">
-            <a:extLst>
-              <a:ext uri="{FF2B5EF4-FFF2-40B4-BE49-F238E27FC236}">
-                <a16:creationId xmlns:a16="http://schemas.microsoft.com/office/drawing/2014/main" id="{4E5B5B1E-F8CF-49A0-A14E-8A5B54B57736}"/>
-              </a:ext>
-            </a:extLst>
-          </p:cNvPr>
-          <p:cNvPicPr>
-            <a:picLocks noChangeAspect="1" noChangeArrowheads="1"/>
-          </p:cNvPicPr>
-          <p:nvPr/>
-        </p:nvPicPr>
-        <p:blipFill>
-          <a:blip r:embed="rId2">
-            <a:extLst>
-              <a:ext uri="{28A0092B-C50C-407E-A947-70E740481C1C}">
-                <a14:useLocalDpi xmlns:a14="http://schemas.microsoft.com/office/drawing/2010/main" val="0"/>
-              </a:ext>
-            </a:extLst>
-          </a:blip>
-          <a:srcRect/>
-          <a:stretch>
-            <a:fillRect/>
-          </a:stretch>
-        </p:blipFill>
-        <p:spPr bwMode="auto">
-          <a:xfrm>
-            <a:off x="4292556" y="966142"/>
-            <a:ext cx="433365" cy="483749"/>
-          </a:xfrm>
-          <a:prstGeom prst="rect">
-            <a:avLst/>
-          </a:prstGeom>
-          <a:noFill/>
-          <a:ln>
-            <a:noFill/>
-          </a:ln>
-          <a:extLst>
-            <a:ext uri="{909E8E84-426E-40DD-AFC4-6F175D3DCCD1}">
-              <a14:hiddenFill xmlns:a14="http://schemas.microsoft.com/office/drawing/2010/main">
-                <a:solidFill>
-                  <a:srgbClr val="FFFFFF"/>
-                </a:solidFill>
-              </a14:hiddenFill>
-            </a:ext>
-            <a:ext uri="{91240B29-F687-4F45-9708-019B960494DF}">
-              <a14:hiddenLine xmlns:a14="http://schemas.microsoft.com/office/drawing/2010/main" w="9525">
-                <a:solidFill>
-                  <a:srgbClr val="000000"/>
-                </a:solidFill>
-                <a:miter lim="800000"/>
-                <a:headEnd/>
-                <a:tailEnd/>
-              </a14:hiddenLine>
-            </a:ext>
-          </a:extLst>
-        </p:spPr>
-      </p:pic>
       <p:cxnSp>
         <p:nvCxnSpPr>
           <p:cNvPr id="20" name="Straight Arrow Connector 19">
@@ -3467,14 +3467,15 @@
           </p:cNvPr>
           <p:cNvCxnSpPr>
             <a:cxnSpLocks/>
+            <a:stCxn id="58" idx="3"/>
             <a:endCxn id="38" idx="1"/>
           </p:cNvCxnSpPr>
           <p:nvPr/>
         </p:nvCxnSpPr>
         <p:spPr>
-          <a:xfrm flipV="1">
-            <a:off x="3223993" y="1860460"/>
-            <a:ext cx="1756296" cy="0"/>
+          <a:xfrm>
+            <a:off x="2943096" y="2128817"/>
+            <a:ext cx="2038727" cy="2578"/>
           </a:xfrm>
           <a:prstGeom prst="straightConnector1">
             <a:avLst/>
@@ -3518,8 +3519,8 @@
         </p:nvSpPr>
         <p:spPr bwMode="auto">
           <a:xfrm>
-            <a:off x="3377350" y="1454370"/>
-            <a:ext cx="844114" cy="646331"/>
+            <a:off x="2975190" y="1861014"/>
+            <a:ext cx="1268591" cy="276999"/>
           </a:xfrm>
           <a:prstGeom prst="rect">
             <a:avLst/>
@@ -3651,7 +3652,7 @@
             </a:lvl9pPr>
           </a:lstStyle>
           <a:p>
-            <a:pPr algn="ctr" eaLnBrk="1" hangingPunct="1"/>
+            <a:pPr eaLnBrk="1" hangingPunct="1"/>
             <a:r>
               <a:rPr lang="en-US" altLang="en-US" sz="1200" i="1" dirty="0">
                 <a:latin typeface="Arial" panose="020B0604020202020204" pitchFamily="34" charset="0"/>
@@ -3666,23 +3667,7 @@
               </a:rPr>
               <a:t>metrics</a:t>
             </a:r>
-          </a:p>
-          <a:p>
-            <a:pPr algn="ctr" eaLnBrk="1" hangingPunct="1"/>
-            <a:r>
-              <a:rPr lang="en-US" altLang="en-US" sz="1200" i="1" dirty="0" smtClean="0">
-                <a:solidFill>
-                  <a:srgbClr val="FF0000"/>
-                </a:solidFill>
-                <a:latin typeface="Arial" panose="020B0604020202020204" pitchFamily="34" charset="0"/>
-                <a:cs typeface="Arial" panose="020B0604020202020204" pitchFamily="34" charset="0"/>
-              </a:rPr>
-              <a:t>[or data?]</a:t>
-            </a:r>
-            <a:endParaRPr lang="en-US" altLang="en-US" sz="1200" i="1" dirty="0">
-              <a:solidFill>
-                <a:srgbClr val="FF0000"/>
-              </a:solidFill>
+            <a:endParaRPr lang="en-US" altLang="en-US" sz="1200" i="1" dirty="0" smtClean="0">
               <a:latin typeface="Arial" panose="020B0604020202020204" pitchFamily="34" charset="0"/>
               <a:cs typeface="Arial" panose="020B0604020202020204" pitchFamily="34" charset="0"/>
             </a:endParaRPr>
@@ -3718,7 +3703,7 @@
         </p:blipFill>
         <p:spPr bwMode="auto">
           <a:xfrm>
-            <a:off x="8681910" y="1476882"/>
+            <a:off x="8681910" y="1747817"/>
             <a:ext cx="762000" cy="762000"/>
           </a:xfrm>
           <a:prstGeom prst="rect">
@@ -3765,7 +3750,7 @@
         </p:nvSpPr>
         <p:spPr bwMode="auto">
           <a:xfrm>
-            <a:off x="7987191" y="2242630"/>
+            <a:off x="7987191" y="2513565"/>
             <a:ext cx="2268537" cy="276999"/>
           </a:xfrm>
           <a:prstGeom prst="rect">
@@ -3939,7 +3924,7 @@
         </p:blipFill>
         <p:spPr bwMode="auto">
           <a:xfrm>
-            <a:off x="6782011" y="1478216"/>
+            <a:off x="6782011" y="1749151"/>
             <a:ext cx="762000" cy="762000"/>
           </a:xfrm>
           <a:prstGeom prst="rect">
@@ -3986,7 +3971,7 @@
         </p:nvSpPr>
         <p:spPr bwMode="auto">
           <a:xfrm>
-            <a:off x="6023186" y="2242630"/>
+            <a:off x="6023186" y="2513565"/>
             <a:ext cx="2279650" cy="276999"/>
           </a:xfrm>
           <a:prstGeom prst="rect">
@@ -4160,236 +4145,7 @@
         </p:blipFill>
         <p:spPr bwMode="auto">
           <a:xfrm>
-            <a:off x="4980289" y="1479460"/>
-            <a:ext cx="762000" cy="762000"/>
-          </a:xfrm>
-          <a:prstGeom prst="rect">
-            <a:avLst/>
-          </a:prstGeom>
-          <a:noFill/>
-          <a:ln>
-            <a:noFill/>
-          </a:ln>
-          <a:extLst>
-            <a:ext uri="{909E8E84-426E-40DD-AFC4-6F175D3DCCD1}">
-              <a14:hiddenFill xmlns:a14="http://schemas.microsoft.com/office/drawing/2010/main">
-                <a:solidFill>
-                  <a:srgbClr val="FFFFFF"/>
-                </a:solidFill>
-              </a14:hiddenFill>
-            </a:ext>
-            <a:ext uri="{91240B29-F687-4F45-9708-019B960494DF}">
-              <a14:hiddenLine xmlns:a14="http://schemas.microsoft.com/office/drawing/2010/main" w="9525">
-                <a:solidFill>
-                  <a:srgbClr val="000000"/>
-                </a:solidFill>
-                <a:miter lim="800000"/>
-                <a:headEnd/>
-                <a:tailEnd/>
-              </a14:hiddenLine>
-            </a:ext>
-          </a:extLst>
-        </p:spPr>
-      </p:pic>
-      <p:sp>
-        <p:nvSpPr>
-          <p:cNvPr id="39" name="TextBox 9">
-            <a:extLst>
-              <a:ext uri="{FF2B5EF4-FFF2-40B4-BE49-F238E27FC236}">
-                <a16:creationId xmlns:a16="http://schemas.microsoft.com/office/drawing/2014/main" id="{D74A4489-6EF9-4C42-8389-DEA841189CC2}"/>
-              </a:ext>
-            </a:extLst>
-          </p:cNvPr>
-          <p:cNvSpPr txBox="1">
-            <a:spLocks noChangeArrowheads="1"/>
-          </p:cNvSpPr>
-          <p:nvPr/>
-        </p:nvSpPr>
-        <p:spPr bwMode="auto">
-          <a:xfrm>
-            <a:off x="270848" y="2100701"/>
-            <a:ext cx="1740820" cy="830997"/>
-          </a:xfrm>
-          <a:prstGeom prst="rect">
-            <a:avLst/>
-          </a:prstGeom>
-          <a:noFill/>
-          <a:ln>
-            <a:noFill/>
-          </a:ln>
-          <a:extLst>
-            <a:ext uri="{909E8E84-426E-40DD-AFC4-6F175D3DCCD1}">
-              <a14:hiddenFill xmlns:a14="http://schemas.microsoft.com/office/drawing/2010/main">
-                <a:solidFill>
-                  <a:srgbClr val="FFFFFF"/>
-                </a:solidFill>
-              </a14:hiddenFill>
-            </a:ext>
-            <a:ext uri="{91240B29-F687-4F45-9708-019B960494DF}">
-              <a14:hiddenLine xmlns:a14="http://schemas.microsoft.com/office/drawing/2010/main" w="9525">
-                <a:solidFill>
-                  <a:srgbClr val="000000"/>
-                </a:solidFill>
-                <a:miter lim="800000"/>
-                <a:headEnd/>
-                <a:tailEnd/>
-              </a14:hiddenLine>
-            </a:ext>
-          </a:extLst>
-        </p:spPr>
-        <p:txBody>
-          <a:bodyPr wrap="square">
-            <a:spAutoFit/>
-          </a:bodyPr>
-          <a:lstStyle>
-            <a:lvl1pPr>
-              <a:defRPr>
-                <a:solidFill>
-                  <a:schemeClr val="tx1"/>
-                </a:solidFill>
-                <a:latin typeface="Calibri" panose="020F0502020204030204" pitchFamily="34" charset="0"/>
-              </a:defRPr>
-            </a:lvl1pPr>
-            <a:lvl2pPr marL="742950" indent="-285750">
-              <a:defRPr>
-                <a:solidFill>
-                  <a:schemeClr val="tx1"/>
-                </a:solidFill>
-                <a:latin typeface="Calibri" panose="020F0502020204030204" pitchFamily="34" charset="0"/>
-              </a:defRPr>
-            </a:lvl2pPr>
-            <a:lvl3pPr marL="1143000" indent="-228600">
-              <a:defRPr>
-                <a:solidFill>
-                  <a:schemeClr val="tx1"/>
-                </a:solidFill>
-                <a:latin typeface="Calibri" panose="020F0502020204030204" pitchFamily="34" charset="0"/>
-              </a:defRPr>
-            </a:lvl3pPr>
-            <a:lvl4pPr marL="1600200" indent="-228600">
-              <a:defRPr>
-                <a:solidFill>
-                  <a:schemeClr val="tx1"/>
-                </a:solidFill>
-                <a:latin typeface="Calibri" panose="020F0502020204030204" pitchFamily="34" charset="0"/>
-              </a:defRPr>
-            </a:lvl4pPr>
-            <a:lvl5pPr marL="2057400" indent="-228600">
-              <a:defRPr>
-                <a:solidFill>
-                  <a:schemeClr val="tx1"/>
-                </a:solidFill>
-                <a:latin typeface="Calibri" panose="020F0502020204030204" pitchFamily="34" charset="0"/>
-              </a:defRPr>
-            </a:lvl5pPr>
-            <a:lvl6pPr marL="2514600" indent="-228600" eaLnBrk="0" fontAlgn="base" hangingPunct="0">
-              <a:spcBef>
-                <a:spcPct val="0"/>
-              </a:spcBef>
-              <a:spcAft>
-                <a:spcPct val="0"/>
-              </a:spcAft>
-              <a:defRPr>
-                <a:solidFill>
-                  <a:schemeClr val="tx1"/>
-                </a:solidFill>
-                <a:latin typeface="Calibri" panose="020F0502020204030204" pitchFamily="34" charset="0"/>
-              </a:defRPr>
-            </a:lvl6pPr>
-            <a:lvl7pPr marL="2971800" indent="-228600" eaLnBrk="0" fontAlgn="base" hangingPunct="0">
-              <a:spcBef>
-                <a:spcPct val="0"/>
-              </a:spcBef>
-              <a:spcAft>
-                <a:spcPct val="0"/>
-              </a:spcAft>
-              <a:defRPr>
-                <a:solidFill>
-                  <a:schemeClr val="tx1"/>
-                </a:solidFill>
-                <a:latin typeface="Calibri" panose="020F0502020204030204" pitchFamily="34" charset="0"/>
-              </a:defRPr>
-            </a:lvl7pPr>
-            <a:lvl8pPr marL="3429000" indent="-228600" eaLnBrk="0" fontAlgn="base" hangingPunct="0">
-              <a:spcBef>
-                <a:spcPct val="0"/>
-              </a:spcBef>
-              <a:spcAft>
-                <a:spcPct val="0"/>
-              </a:spcAft>
-              <a:defRPr>
-                <a:solidFill>
-                  <a:schemeClr val="tx1"/>
-                </a:solidFill>
-                <a:latin typeface="Calibri" panose="020F0502020204030204" pitchFamily="34" charset="0"/>
-              </a:defRPr>
-            </a:lvl8pPr>
-            <a:lvl9pPr marL="3886200" indent="-228600" eaLnBrk="0" fontAlgn="base" hangingPunct="0">
-              <a:spcBef>
-                <a:spcPct val="0"/>
-              </a:spcBef>
-              <a:spcAft>
-                <a:spcPct val="0"/>
-              </a:spcAft>
-              <a:defRPr>
-                <a:solidFill>
-                  <a:schemeClr val="tx1"/>
-                </a:solidFill>
-                <a:latin typeface="Calibri" panose="020F0502020204030204" pitchFamily="34" charset="0"/>
-              </a:defRPr>
-            </a:lvl9pPr>
-          </a:lstStyle>
-          <a:p>
-            <a:pPr algn="ctr" eaLnBrk="1" hangingPunct="1"/>
-            <a:r>
-              <a:rPr lang="en-US" altLang="en-US" sz="1200" i="1" dirty="0" smtClean="0">
-                <a:latin typeface="Arial" panose="020B0604020202020204" pitchFamily="34" charset="0"/>
-                <a:ea typeface="Amazon Ember" panose="020B0603020204020204" pitchFamily="34" charset="0"/>
-                <a:cs typeface="Arial" panose="020B0604020202020204" pitchFamily="34" charset="0"/>
-              </a:rPr>
-              <a:t>Create a standalone label for this icon when we know exactly what it needs to say.</a:t>
-            </a:r>
-            <a:endParaRPr lang="en-US" altLang="en-US" sz="1200" i="1" dirty="0">
-              <a:solidFill>
-                <a:srgbClr val="FF0000"/>
-              </a:solidFill>
-              <a:latin typeface="Arial" panose="020B0604020202020204" pitchFamily="34" charset="0"/>
-              <a:ea typeface="Amazon Ember" panose="020B0603020204020204" pitchFamily="34" charset="0"/>
-              <a:cs typeface="Arial" panose="020B0604020202020204" pitchFamily="34" charset="0"/>
-            </a:endParaRPr>
-          </a:p>
-        </p:txBody>
-      </p:sp>
-      <p:pic>
-        <p:nvPicPr>
-          <p:cNvPr id="40" name="Graphic 17">
-            <a:extLst>
-              <a:ext uri="{FF2B5EF4-FFF2-40B4-BE49-F238E27FC236}">
-                <a16:creationId xmlns:a16="http://schemas.microsoft.com/office/drawing/2014/main" id="{A08B7917-0113-4121-AE23-7D907597515B}"/>
-              </a:ext>
-            </a:extLst>
-          </p:cNvPr>
-          <p:cNvPicPr>
-            <a:picLocks noChangeAspect="1" noChangeArrowheads="1"/>
-          </p:cNvPicPr>
-          <p:nvPr/>
-        </p:nvPicPr>
-        <p:blipFill>
-          <a:blip r:embed="rId6" cstate="hqprint">
-            <a:extLst>
-              <a:ext uri="{28A0092B-C50C-407E-A947-70E740481C1C}">
-                <a14:useLocalDpi xmlns:a14="http://schemas.microsoft.com/office/drawing/2010/main" val="0"/>
-              </a:ext>
-            </a:extLst>
-          </a:blip>
-          <a:srcRect/>
-          <a:stretch>
-            <a:fillRect/>
-          </a:stretch>
-        </p:blipFill>
-        <p:spPr bwMode="auto">
-          <a:xfrm>
-            <a:off x="4977010" y="4406713"/>
+            <a:off x="4981823" y="1750395"/>
             <a:ext cx="762000" cy="762000"/>
           </a:xfrm>
           <a:prstGeom prst="rect">
@@ -4599,7 +4355,7 @@
         </p:nvCxnSpPr>
         <p:spPr>
           <a:xfrm flipV="1">
-            <a:off x="7544011" y="1857882"/>
+            <a:off x="7544011" y="2128817"/>
             <a:ext cx="1137899" cy="1334"/>
           </a:xfrm>
           <a:prstGeom prst="straightConnector1">
@@ -4628,53 +4384,6 @@
           </a:fontRef>
         </p:style>
       </p:cxnSp>
-      <p:pic>
-        <p:nvPicPr>
-          <p:cNvPr id="1030" name="Picture 6">
-            <a:extLst>
-              <a:ext uri="{FF2B5EF4-FFF2-40B4-BE49-F238E27FC236}">
-                <a16:creationId xmlns:a16="http://schemas.microsoft.com/office/drawing/2014/main" id="{E5A1C4B6-0D9C-417C-90E5-EBA07BFFD4E4}"/>
-              </a:ext>
-            </a:extLst>
-          </p:cNvPr>
-          <p:cNvPicPr>
-            <a:picLocks noChangeAspect="1" noChangeArrowheads="1"/>
-          </p:cNvPicPr>
-          <p:nvPr/>
-        </p:nvPicPr>
-        <p:blipFill>
-          <a:blip r:embed="rId7">
-            <a:extLst>
-              <a:ext uri="{28A0092B-C50C-407E-A947-70E740481C1C}">
-                <a14:useLocalDpi xmlns:a14="http://schemas.microsoft.com/office/drawing/2010/main" val="0"/>
-              </a:ext>
-            </a:extLst>
-          </a:blip>
-          <a:srcRect/>
-          <a:stretch>
-            <a:fillRect/>
-          </a:stretch>
-        </p:blipFill>
-        <p:spPr bwMode="auto">
-          <a:xfrm>
-            <a:off x="2091895" y="1377274"/>
-            <a:ext cx="1162050" cy="1314450"/>
-          </a:xfrm>
-          <a:prstGeom prst="rect">
-            <a:avLst/>
-          </a:prstGeom>
-          <a:noFill/>
-          <a:extLst>
-            <a:ext uri="{909E8E84-426E-40DD-AFC4-6F175D3DCCD1}">
-              <a14:hiddenFill xmlns:a14="http://schemas.microsoft.com/office/drawing/2010/main">
-                <a:solidFill>
-                  <a:srgbClr val="FFFFFF"/>
-                </a:solidFill>
-              </a14:hiddenFill>
-            </a:ext>
-          </a:extLst>
-        </p:spPr>
-      </p:pic>
       <p:sp>
         <p:nvSpPr>
           <p:cNvPr id="65" name="TextBox 27">
@@ -4691,7 +4400,7 @@
         </p:nvSpPr>
         <p:spPr bwMode="auto">
           <a:xfrm>
-            <a:off x="2374293" y="5905674"/>
+            <a:off x="2975190" y="5905674"/>
             <a:ext cx="2013943" cy="276999"/>
           </a:xfrm>
           <a:prstGeom prst="rect">
@@ -4824,7 +4533,7 @@
             </a:lvl9pPr>
           </a:lstStyle>
           <a:p>
-            <a:pPr algn="ctr" eaLnBrk="1" hangingPunct="1"/>
+            <a:pPr eaLnBrk="1" hangingPunct="1"/>
             <a:r>
               <a:rPr lang="en-US" altLang="en-US" sz="1200" i="1" dirty="0">
                 <a:latin typeface="Arial" panose="020B0604020202020204" pitchFamily="34" charset="0"/>
@@ -4862,7 +4571,7 @@
         </p:nvSpPr>
         <p:spPr bwMode="auto">
           <a:xfrm>
-            <a:off x="3138645" y="5589253"/>
+            <a:off x="2975190" y="5580544"/>
             <a:ext cx="2013943" cy="276999"/>
           </a:xfrm>
           <a:prstGeom prst="rect">
@@ -4995,7 +4704,7 @@
             </a:lvl9pPr>
           </a:lstStyle>
           <a:p>
-            <a:pPr algn="ctr" eaLnBrk="1" hangingPunct="1"/>
+            <a:pPr eaLnBrk="1" hangingPunct="1"/>
             <a:r>
               <a:rPr lang="en-US" altLang="en-US" sz="1200" i="1" dirty="0" smtClean="0">
                 <a:latin typeface="Arial" panose="020B0604020202020204" pitchFamily="34" charset="0"/>
@@ -5186,7 +4895,7 @@
         </p:nvSpPr>
         <p:spPr bwMode="auto">
           <a:xfrm>
-            <a:off x="6489444" y="3678771"/>
+            <a:off x="6481974" y="3678771"/>
             <a:ext cx="1362074" cy="276999"/>
           </a:xfrm>
           <a:prstGeom prst="rect">
@@ -5346,7 +5055,7 @@
           <p:nvPr/>
         </p:nvPicPr>
         <p:blipFill>
-          <a:blip r:embed="rId8" cstate="hqprint">
+          <a:blip r:embed="rId6" cstate="hqprint">
             <a:extLst>
               <a:ext uri="{28A0092B-C50C-407E-A947-70E740481C1C}">
                 <a14:useLocalDpi xmlns:a14="http://schemas.microsoft.com/office/drawing/2010/main" val="0"/>
@@ -5360,7 +5069,7 @@
         </p:blipFill>
         <p:spPr bwMode="auto">
           <a:xfrm>
-            <a:off x="6950370" y="3199346"/>
+            <a:off x="6934411" y="3241681"/>
             <a:ext cx="457200" cy="457200"/>
           </a:xfrm>
           <a:prstGeom prst="rect">
@@ -5407,7 +5116,7 @@
         </p:nvSpPr>
         <p:spPr bwMode="auto">
           <a:xfrm>
-            <a:off x="4645941" y="3678771"/>
+            <a:off x="4681786" y="3678771"/>
             <a:ext cx="1362074" cy="276999"/>
           </a:xfrm>
           <a:prstGeom prst="rect">
@@ -5567,7 +5276,7 @@
           <p:nvPr/>
         </p:nvPicPr>
         <p:blipFill>
-          <a:blip r:embed="rId8" cstate="hqprint">
+          <a:blip r:embed="rId6" cstate="hqprint">
             <a:extLst>
               <a:ext uri="{28A0092B-C50C-407E-A947-70E740481C1C}">
                 <a14:useLocalDpi xmlns:a14="http://schemas.microsoft.com/office/drawing/2010/main" val="0"/>
@@ -5581,7 +5290,7 @@
         </p:blipFill>
         <p:spPr bwMode="auto">
           <a:xfrm>
-            <a:off x="5106867" y="3199346"/>
+            <a:off x="5134223" y="3241681"/>
             <a:ext cx="457200" cy="457200"/>
           </a:xfrm>
           <a:prstGeom prst="rect">
@@ -5628,8 +5337,8 @@
         </p:nvSpPr>
         <p:spPr bwMode="auto">
           <a:xfrm>
-            <a:off x="6504115" y="4950990"/>
-            <a:ext cx="1385885" cy="461665"/>
+            <a:off x="6376469" y="4913995"/>
+            <a:ext cx="1573085" cy="276999"/>
           </a:xfrm>
           <a:prstGeom prst="rect">
             <a:avLst/>
@@ -5788,7 +5497,7 @@
           <p:nvPr/>
         </p:nvPicPr>
         <p:blipFill>
-          <a:blip r:embed="rId9" cstate="hqprint">
+          <a:blip r:embed="rId7" cstate="hqprint">
             <a:extLst>
               <a:ext uri="{28A0092B-C50C-407E-A947-70E740481C1C}">
                 <a14:useLocalDpi xmlns:a14="http://schemas.microsoft.com/office/drawing/2010/main" val="0"/>
@@ -5802,7 +5511,7 @@
         </p:blipFill>
         <p:spPr bwMode="auto">
           <a:xfrm>
-            <a:off x="6966144" y="4477915"/>
+            <a:off x="6934411" y="4477915"/>
             <a:ext cx="457200" cy="457200"/>
           </a:xfrm>
           <a:prstGeom prst="rect">
@@ -5851,8 +5560,8 @@
         </p:nvCxnSpPr>
         <p:spPr>
           <a:xfrm flipV="1">
-            <a:off x="5742289" y="1859216"/>
-            <a:ext cx="1039722" cy="1244"/>
+            <a:off x="5743823" y="2130151"/>
+            <a:ext cx="1038188" cy="1244"/>
           </a:xfrm>
           <a:prstGeom prst="straightConnector1">
             <a:avLst/>
@@ -5894,8 +5603,8 @@
         </p:nvSpPr>
         <p:spPr>
           <a:xfrm flipH="1" flipV="1">
-            <a:off x="2515750" y="2630990"/>
-            <a:ext cx="3056645" cy="3514755"/>
+            <a:off x="2515748" y="2899710"/>
+            <a:ext cx="3056645" cy="3246034"/>
           </a:xfrm>
           <a:custGeom>
             <a:avLst/>
@@ -5991,10 +5700,10 @@
           <p:nvPr/>
         </p:nvPicPr>
         <p:blipFill>
-          <a:blip r:embed="rId10">
+          <a:blip r:embed="rId8">
             <a:extLst>
               <a:ext uri="{96DAC541-7B7A-43D3-8B79-37D633B846F1}">
-                <asvg:svgBlip xmlns:asvg="http://schemas.microsoft.com/office/drawing/2016/SVG/main" xmlns="" r:embed="rId11"/>
+                <asvg:svgBlip xmlns="" xmlns:asvg="http://schemas.microsoft.com/office/drawing/2016/SVG/main" r:embed="rId11"/>
               </a:ext>
             </a:extLst>
           </a:blip>
@@ -6050,8 +5759,8 @@
         </p:nvSpPr>
         <p:spPr bwMode="auto">
           <a:xfrm>
-            <a:off x="5411901" y="6437752"/>
-            <a:ext cx="1073150" cy="261610"/>
+            <a:off x="5411901" y="6302284"/>
+            <a:ext cx="1073150" cy="276999"/>
           </a:xfrm>
           <a:prstGeom prst="rect">
             <a:avLst/>
@@ -6185,7 +5894,7 @@
           <a:p>
             <a:pPr algn="ctr" eaLnBrk="1" hangingPunct="1"/>
             <a:r>
-              <a:rPr lang="en-US" altLang="en-US" sz="1100" dirty="0">
+              <a:rPr lang="en-US" altLang="en-US" sz="1200" dirty="0">
                 <a:solidFill>
                   <a:srgbClr val="000000"/>
                 </a:solidFill>
@@ -6206,13 +5915,16 @@
               </a:ext>
             </a:extLst>
           </p:cNvPr>
-          <p:cNvCxnSpPr/>
+          <p:cNvCxnSpPr>
+            <a:stCxn id="52" idx="0"/>
+            <a:endCxn id="45" idx="2"/>
+          </p:cNvCxnSpPr>
           <p:nvPr/>
         </p:nvCxnSpPr>
         <p:spPr>
-          <a:xfrm rot="16200000">
-            <a:off x="5148017" y="2972971"/>
-            <a:ext cx="357923" cy="0"/>
+          <a:xfrm flipV="1">
+            <a:off x="5362823" y="2790565"/>
+            <a:ext cx="0" cy="451116"/>
           </a:xfrm>
           <a:prstGeom prst="straightConnector1">
             <a:avLst/>
@@ -6254,8 +5966,8 @@
         </p:nvSpPr>
         <p:spPr>
           <a:xfrm flipH="1" flipV="1">
-            <a:off x="5493045" y="2783989"/>
-            <a:ext cx="1715366" cy="194206"/>
+            <a:off x="5493044" y="2783988"/>
+            <a:ext cx="1673701" cy="249308"/>
           </a:xfrm>
           <a:custGeom>
             <a:avLst/>
@@ -6345,13 +6057,16 @@
               </a:ext>
             </a:extLst>
           </p:cNvPr>
-          <p:cNvCxnSpPr/>
+          <p:cNvCxnSpPr>
+            <a:stCxn id="44" idx="0"/>
+            <a:endCxn id="74" idx="2"/>
+          </p:cNvCxnSpPr>
           <p:nvPr/>
         </p:nvCxnSpPr>
         <p:spPr>
-          <a:xfrm rot="16200000">
-            <a:off x="7124924" y="3055799"/>
-            <a:ext cx="166975" cy="0"/>
+          <a:xfrm flipV="1">
+            <a:off x="7163011" y="3033296"/>
+            <a:ext cx="3734" cy="208385"/>
           </a:xfrm>
           <a:prstGeom prst="straightConnector1">
             <a:avLst/>
@@ -6388,13 +6103,16 @@
               </a:ext>
             </a:extLst>
           </p:cNvPr>
-          <p:cNvCxnSpPr/>
+          <p:cNvCxnSpPr>
+            <a:stCxn id="46" idx="0"/>
+            <a:endCxn id="51" idx="2"/>
+          </p:cNvCxnSpPr>
           <p:nvPr/>
         </p:nvCxnSpPr>
         <p:spPr>
-          <a:xfrm rot="16200000">
-            <a:off x="5140995" y="4155897"/>
-            <a:ext cx="357923" cy="0"/>
+          <a:xfrm flipV="1">
+            <a:off x="5362823" y="3955770"/>
+            <a:ext cx="0" cy="456802"/>
           </a:xfrm>
           <a:prstGeom prst="straightConnector1">
             <a:avLst/>
@@ -6435,9 +6153,9 @@
           <p:nvPr/>
         </p:nvCxnSpPr>
         <p:spPr>
-          <a:xfrm rot="16200000">
-            <a:off x="7015783" y="4128768"/>
-            <a:ext cx="357923" cy="0"/>
+          <a:xfrm flipV="1">
+            <a:off x="7159276" y="3955770"/>
+            <a:ext cx="7470" cy="522145"/>
           </a:xfrm>
           <a:prstGeom prst="straightConnector1">
             <a:avLst/>
@@ -6479,8 +6197,8 @@
         </p:nvSpPr>
         <p:spPr>
           <a:xfrm rot="10800000" flipH="1">
-            <a:off x="6186692" y="5465031"/>
-            <a:ext cx="1008052" cy="680712"/>
+            <a:off x="6186692" y="5199493"/>
+            <a:ext cx="980054" cy="946250"/>
           </a:xfrm>
           <a:custGeom>
             <a:avLst/>
@@ -6575,8 +6293,8 @@
         </p:nvSpPr>
         <p:spPr>
           <a:xfrm flipH="1" flipV="1">
-            <a:off x="2835231" y="2630989"/>
-            <a:ext cx="2484724" cy="3215236"/>
+            <a:off x="2835228" y="2897619"/>
+            <a:ext cx="2527059" cy="2948606"/>
           </a:xfrm>
           <a:custGeom>
             <a:avLst/>
@@ -6666,13 +6384,16 @@
               </a:ext>
             </a:extLst>
           </p:cNvPr>
-          <p:cNvCxnSpPr/>
+          <p:cNvCxnSpPr>
+            <a:stCxn id="79" idx="2"/>
+            <a:endCxn id="41" idx="2"/>
+          </p:cNvCxnSpPr>
           <p:nvPr/>
         </p:nvCxnSpPr>
         <p:spPr>
-          <a:xfrm rot="16200000">
-            <a:off x="5140994" y="5672471"/>
-            <a:ext cx="357923" cy="0"/>
+          <a:xfrm flipV="1">
+            <a:off x="5362287" y="5455372"/>
+            <a:ext cx="537" cy="390853"/>
           </a:xfrm>
           <a:prstGeom prst="straightConnector1">
             <a:avLst/>
@@ -6716,8 +6437,8 @@
         </p:nvSpPr>
         <p:spPr bwMode="auto">
           <a:xfrm>
-            <a:off x="4827438" y="2242631"/>
-            <a:ext cx="1050413" cy="461665"/>
+            <a:off x="4786858" y="2513566"/>
+            <a:ext cx="1151930" cy="276999"/>
           </a:xfrm>
           <a:prstGeom prst="rect">
             <a:avLst/>
@@ -6861,12 +6582,124 @@
           </a:p>
         </p:txBody>
       </p:sp>
+      <p:pic>
+        <p:nvPicPr>
+          <p:cNvPr id="46" name="Graphic 17">
+            <a:extLst>
+              <a:ext uri="{FF2B5EF4-FFF2-40B4-BE49-F238E27FC236}">
+                <a16:creationId xmlns:a16="http://schemas.microsoft.com/office/drawing/2014/main" id="{847A7472-D977-624B-9A30-47A44C4FD42F}"/>
+              </a:ext>
+            </a:extLst>
+          </p:cNvPr>
+          <p:cNvPicPr>
+            <a:picLocks noChangeAspect="1" noChangeArrowheads="1"/>
+          </p:cNvPicPr>
+          <p:nvPr/>
+        </p:nvPicPr>
+        <p:blipFill>
+          <a:blip r:embed="rId12"/>
+          <a:srcRect/>
+          <a:stretch/>
+        </p:blipFill>
+        <p:spPr bwMode="auto">
+          <a:xfrm>
+            <a:off x="4981823" y="4412572"/>
+            <a:ext cx="762000" cy="762000"/>
+          </a:xfrm>
+          <a:prstGeom prst="rect">
+            <a:avLst/>
+          </a:prstGeom>
+          <a:noFill/>
+          <a:ln>
+            <a:noFill/>
+          </a:ln>
+          <a:extLst>
+            <a:ext uri="{909E8E84-426E-40DD-AFC4-6F175D3DCCD1}">
+              <a14:hiddenFill xmlns:a14="http://schemas.microsoft.com/office/drawing/2010/main">
+                <a:solidFill>
+                  <a:srgbClr val="FFFFFF"/>
+                </a:solidFill>
+              </a14:hiddenFill>
+            </a:ext>
+            <a:ext uri="{91240B29-F687-4F45-9708-019B960494DF}">
+              <a14:hiddenLine xmlns:a14="http://schemas.microsoft.com/office/drawing/2010/main" w="9525">
+                <a:solidFill>
+                  <a:srgbClr val="000000"/>
+                </a:solidFill>
+                <a:miter lim="800000"/>
+                <a:headEnd/>
+                <a:tailEnd/>
+              </a14:hiddenLine>
+            </a:ext>
+          </a:extLst>
+        </p:spPr>
+      </p:pic>
+      <p:pic>
+        <p:nvPicPr>
+          <p:cNvPr id="58" name="Graphic 38">
+            <a:extLst>
+              <a:ext uri="{FF2B5EF4-FFF2-40B4-BE49-F238E27FC236}">
+                <a16:creationId xmlns:a16="http://schemas.microsoft.com/office/drawing/2014/main" id="{9C592231-DBDA-B24F-8E19-37175CF5622A}"/>
+              </a:ext>
+            </a:extLst>
+          </p:cNvPr>
+          <p:cNvPicPr>
+            <a:picLocks noChangeAspect="1" noChangeArrowheads="1"/>
+          </p:cNvPicPr>
+          <p:nvPr/>
+        </p:nvPicPr>
+        <p:blipFill>
+          <a:blip r:embed="rId13" cstate="hqprint">
+            <a:extLst>
+              <a:ext uri="{28A0092B-C50C-407E-A947-70E740481C1C}">
+                <a14:useLocalDpi xmlns:a14="http://schemas.microsoft.com/office/drawing/2010/main" val="0"/>
+              </a:ext>
+            </a:extLst>
+          </a:blip>
+          <a:srcRect/>
+          <a:stretch>
+            <a:fillRect/>
+          </a:stretch>
+        </p:blipFill>
+        <p:spPr bwMode="auto">
+          <a:xfrm>
+            <a:off x="2485896" y="1900217"/>
+            <a:ext cx="457200" cy="457200"/>
+          </a:xfrm>
+          <a:prstGeom prst="rect">
+            <a:avLst/>
+          </a:prstGeom>
+          <a:noFill/>
+          <a:ln>
+            <a:noFill/>
+          </a:ln>
+          <a:extLst>
+            <a:ext uri="{909E8E84-426E-40DD-AFC4-6F175D3DCCD1}">
+              <a14:hiddenFill xmlns:a14="http://schemas.microsoft.com/office/drawing/2010/main">
+                <a:solidFill>
+                  <a:srgbClr val="FFFFFF"/>
+                </a:solidFill>
+              </a14:hiddenFill>
+            </a:ext>
+            <a:ext uri="{91240B29-F687-4F45-9708-019B960494DF}">
+              <a14:hiddenLine xmlns:a14="http://schemas.microsoft.com/office/drawing/2010/main" w="9525">
+                <a:solidFill>
+                  <a:srgbClr val="000000"/>
+                </a:solidFill>
+                <a:miter lim="800000"/>
+                <a:headEnd/>
+                <a:tailEnd/>
+              </a14:hiddenLine>
+            </a:ext>
+          </a:extLst>
+        </p:spPr>
+      </p:pic>
       <p:sp>
         <p:nvSpPr>
-          <p:cNvPr id="48" name="TextBox 16">
-            <a:extLst>
-              <a:ext uri="{FF2B5EF4-FFF2-40B4-BE49-F238E27FC236}">
-                <a16:creationId xmlns:a16="http://schemas.microsoft.com/office/drawing/2014/main" id="{099D59F3-19A5-4E47-9AA1-612D0AD90909}"/>
+          <p:cNvPr id="59" name="TextBox 9">
+            <a:extLst>
+              <a:ext uri="{FF2B5EF4-FFF2-40B4-BE49-F238E27FC236}">
+                <a16:creationId xmlns:a16="http://schemas.microsoft.com/office/drawing/2014/main" id="{D74A4489-6EF9-4C42-8389-DEA841189CC2}"/>
               </a:ext>
             </a:extLst>
           </p:cNvPr>
@@ -6877,8 +6710,8 @@
         </p:nvSpPr>
         <p:spPr bwMode="auto">
           <a:xfrm>
-            <a:off x="150687" y="5785824"/>
-            <a:ext cx="1468727" cy="261610"/>
+            <a:off x="1943392" y="2357417"/>
+            <a:ext cx="1549009" cy="461665"/>
           </a:xfrm>
           <a:prstGeom prst="rect">
             <a:avLst/>
@@ -7012,260 +6845,14 @@
           <a:p>
             <a:pPr algn="ctr" eaLnBrk="1" hangingPunct="1"/>
             <a:r>
-              <a:rPr lang="en-US" altLang="en-US" sz="1100" dirty="0">
+              <a:rPr lang="en-US" altLang="en-US" sz="1200" dirty="0" smtClean="0">
                 <a:latin typeface="Arial" panose="020B0604020202020204" pitchFamily="34" charset="0"/>
                 <a:ea typeface="Amazon Ember" panose="020B0603020204020204" pitchFamily="34" charset="0"/>
                 <a:cs typeface="Arial" panose="020B0604020202020204" pitchFamily="34" charset="0"/>
               </a:rPr>
-              <a:t>Endpoint</a:t>
+              <a:t>Smart Power Cord for AWS</a:t>
             </a:r>
-          </a:p>
-        </p:txBody>
-      </p:sp>
-      <p:pic>
-        <p:nvPicPr>
-          <p:cNvPr id="49" name="Graphic 6">
-            <a:extLst>
-              <a:ext uri="{FF2B5EF4-FFF2-40B4-BE49-F238E27FC236}">
-                <a16:creationId xmlns:a16="http://schemas.microsoft.com/office/drawing/2014/main" id="{FD960BCD-0D1F-914A-B9E9-229CD74E312A}"/>
-              </a:ext>
-            </a:extLst>
-          </p:cNvPr>
-          <p:cNvPicPr>
-            <a:picLocks noChangeAspect="1" noChangeArrowheads="1"/>
-          </p:cNvPicPr>
-          <p:nvPr/>
-        </p:nvPicPr>
-        <p:blipFill>
-          <a:blip r:embed="rId12">
-            <a:extLst>
-              <a:ext uri="{96DAC541-7B7A-43D3-8B79-37D633B846F1}">
-                <asvg:svgBlip xmlns:asvg="http://schemas.microsoft.com/office/drawing/2016/SVG/main" xmlns="" r:embed="rId13"/>
-              </a:ext>
-            </a:extLst>
-          </a:blip>
-          <a:srcRect/>
-          <a:stretch/>
-        </p:blipFill>
-        <p:spPr bwMode="auto">
-          <a:xfrm>
-            <a:off x="646063" y="5373449"/>
-            <a:ext cx="457200" cy="457200"/>
-          </a:xfrm>
-          <a:prstGeom prst="rect">
-            <a:avLst/>
-          </a:prstGeom>
-          <a:noFill/>
-          <a:ln>
-            <a:noFill/>
-          </a:ln>
-          <a:extLst>
-            <a:ext uri="{909E8E84-426E-40DD-AFC4-6F175D3DCCD1}">
-              <a14:hiddenFill xmlns:a14="http://schemas.microsoft.com/office/drawing/2010/main">
-                <a:solidFill>
-                  <a:srgbClr val="FFFFFF"/>
-                </a:solidFill>
-              </a14:hiddenFill>
-            </a:ext>
-            <a:ext uri="{91240B29-F687-4F45-9708-019B960494DF}">
-              <a14:hiddenLine xmlns:a14="http://schemas.microsoft.com/office/drawing/2010/main" w="9525">
-                <a:solidFill>
-                  <a:srgbClr val="000000"/>
-                </a:solidFill>
-                <a:miter lim="800000"/>
-                <a:headEnd/>
-                <a:tailEnd/>
-              </a14:hiddenLine>
-            </a:ext>
-          </a:extLst>
-        </p:spPr>
-      </p:pic>
-      <p:sp>
-        <p:nvSpPr>
-          <p:cNvPr id="50" name="TextBox 9">
-            <a:extLst>
-              <a:ext uri="{FF2B5EF4-FFF2-40B4-BE49-F238E27FC236}">
-                <a16:creationId xmlns:a16="http://schemas.microsoft.com/office/drawing/2014/main" id="{D74A4489-6EF9-4C42-8389-DEA841189CC2}"/>
-              </a:ext>
-            </a:extLst>
-          </p:cNvPr>
-          <p:cNvSpPr txBox="1">
-            <a:spLocks noChangeArrowheads="1"/>
-          </p:cNvSpPr>
-          <p:nvPr/>
-        </p:nvSpPr>
-        <p:spPr bwMode="auto">
-          <a:xfrm>
-            <a:off x="208745" y="6047434"/>
-            <a:ext cx="1919010" cy="461665"/>
-          </a:xfrm>
-          <a:prstGeom prst="rect">
-            <a:avLst/>
-          </a:prstGeom>
-          <a:noFill/>
-          <a:ln>
-            <a:noFill/>
-          </a:ln>
-          <a:extLst>
-            <a:ext uri="{909E8E84-426E-40DD-AFC4-6F175D3DCCD1}">
-              <a14:hiddenFill xmlns:a14="http://schemas.microsoft.com/office/drawing/2010/main">
-                <a:solidFill>
-                  <a:srgbClr val="FFFFFF"/>
-                </a:solidFill>
-              </a14:hiddenFill>
-            </a:ext>
-            <a:ext uri="{91240B29-F687-4F45-9708-019B960494DF}">
-              <a14:hiddenLine xmlns:a14="http://schemas.microsoft.com/office/drawing/2010/main" w="9525">
-                <a:solidFill>
-                  <a:srgbClr val="000000"/>
-                </a:solidFill>
-                <a:miter lim="800000"/>
-                <a:headEnd/>
-                <a:tailEnd/>
-              </a14:hiddenLine>
-            </a:ext>
-          </a:extLst>
-        </p:spPr>
-        <p:txBody>
-          <a:bodyPr wrap="square">
-            <a:spAutoFit/>
-          </a:bodyPr>
-          <a:lstStyle>
-            <a:lvl1pPr>
-              <a:defRPr>
-                <a:solidFill>
-                  <a:schemeClr val="tx1"/>
-                </a:solidFill>
-                <a:latin typeface="Calibri" panose="020F0502020204030204" pitchFamily="34" charset="0"/>
-              </a:defRPr>
-            </a:lvl1pPr>
-            <a:lvl2pPr marL="742950" indent="-285750">
-              <a:defRPr>
-                <a:solidFill>
-                  <a:schemeClr val="tx1"/>
-                </a:solidFill>
-                <a:latin typeface="Calibri" panose="020F0502020204030204" pitchFamily="34" charset="0"/>
-              </a:defRPr>
-            </a:lvl2pPr>
-            <a:lvl3pPr marL="1143000" indent="-228600">
-              <a:defRPr>
-                <a:solidFill>
-                  <a:schemeClr val="tx1"/>
-                </a:solidFill>
-                <a:latin typeface="Calibri" panose="020F0502020204030204" pitchFamily="34" charset="0"/>
-              </a:defRPr>
-            </a:lvl3pPr>
-            <a:lvl4pPr marL="1600200" indent="-228600">
-              <a:defRPr>
-                <a:solidFill>
-                  <a:schemeClr val="tx1"/>
-                </a:solidFill>
-                <a:latin typeface="Calibri" panose="020F0502020204030204" pitchFamily="34" charset="0"/>
-              </a:defRPr>
-            </a:lvl4pPr>
-            <a:lvl5pPr marL="2057400" indent="-228600">
-              <a:defRPr>
-                <a:solidFill>
-                  <a:schemeClr val="tx1"/>
-                </a:solidFill>
-                <a:latin typeface="Calibri" panose="020F0502020204030204" pitchFamily="34" charset="0"/>
-              </a:defRPr>
-            </a:lvl5pPr>
-            <a:lvl6pPr marL="2514600" indent="-228600" eaLnBrk="0" fontAlgn="base" hangingPunct="0">
-              <a:spcBef>
-                <a:spcPct val="0"/>
-              </a:spcBef>
-              <a:spcAft>
-                <a:spcPct val="0"/>
-              </a:spcAft>
-              <a:defRPr>
-                <a:solidFill>
-                  <a:schemeClr val="tx1"/>
-                </a:solidFill>
-                <a:latin typeface="Calibri" panose="020F0502020204030204" pitchFamily="34" charset="0"/>
-              </a:defRPr>
-            </a:lvl6pPr>
-            <a:lvl7pPr marL="2971800" indent="-228600" eaLnBrk="0" fontAlgn="base" hangingPunct="0">
-              <a:spcBef>
-                <a:spcPct val="0"/>
-              </a:spcBef>
-              <a:spcAft>
-                <a:spcPct val="0"/>
-              </a:spcAft>
-              <a:defRPr>
-                <a:solidFill>
-                  <a:schemeClr val="tx1"/>
-                </a:solidFill>
-                <a:latin typeface="Calibri" panose="020F0502020204030204" pitchFamily="34" charset="0"/>
-              </a:defRPr>
-            </a:lvl7pPr>
-            <a:lvl8pPr marL="3429000" indent="-228600" eaLnBrk="0" fontAlgn="base" hangingPunct="0">
-              <a:spcBef>
-                <a:spcPct val="0"/>
-              </a:spcBef>
-              <a:spcAft>
-                <a:spcPct val="0"/>
-              </a:spcAft>
-              <a:defRPr>
-                <a:solidFill>
-                  <a:schemeClr val="tx1"/>
-                </a:solidFill>
-                <a:latin typeface="Calibri" panose="020F0502020204030204" pitchFamily="34" charset="0"/>
-              </a:defRPr>
-            </a:lvl8pPr>
-            <a:lvl9pPr marL="3886200" indent="-228600" eaLnBrk="0" fontAlgn="base" hangingPunct="0">
-              <a:spcBef>
-                <a:spcPct val="0"/>
-              </a:spcBef>
-              <a:spcAft>
-                <a:spcPct val="0"/>
-              </a:spcAft>
-              <a:defRPr>
-                <a:solidFill>
-                  <a:schemeClr val="tx1"/>
-                </a:solidFill>
-                <a:latin typeface="Calibri" panose="020F0502020204030204" pitchFamily="34" charset="0"/>
-              </a:defRPr>
-            </a:lvl9pPr>
-          </a:lstStyle>
-          <a:p>
-            <a:pPr algn="ctr" eaLnBrk="1" hangingPunct="1"/>
-            <a:r>
-              <a:rPr lang="en-US" altLang="en-US" sz="1200" i="1" dirty="0" smtClean="0">
-                <a:latin typeface="Arial" panose="020B0604020202020204" pitchFamily="34" charset="0"/>
-                <a:ea typeface="Amazon Ember" panose="020B0603020204020204" pitchFamily="34" charset="0"/>
-                <a:cs typeface="Arial" panose="020B0604020202020204" pitchFamily="34" charset="0"/>
-              </a:rPr>
-              <a:t>Where </a:t>
-            </a:r>
-            <a:r>
-              <a:rPr lang="en-US" altLang="en-US" sz="1200" i="1" dirty="0" smtClean="0">
-                <a:latin typeface="Arial" panose="020B0604020202020204" pitchFamily="34" charset="0"/>
-                <a:ea typeface="Amazon Ember" panose="020B0603020204020204" pitchFamily="34" charset="0"/>
-                <a:cs typeface="Arial" panose="020B0604020202020204" pitchFamily="34" charset="0"/>
-              </a:rPr>
-              <a:t>do </a:t>
-            </a:r>
-            <a:r>
-              <a:rPr lang="en-US" altLang="en-US" sz="1200" i="1" dirty="0" smtClean="0">
-                <a:latin typeface="Arial" panose="020B0604020202020204" pitchFamily="34" charset="0"/>
-                <a:ea typeface="Amazon Ember" panose="020B0603020204020204" pitchFamily="34" charset="0"/>
-                <a:cs typeface="Arial" panose="020B0604020202020204" pitchFamily="34" charset="0"/>
-              </a:rPr>
-              <a:t>the </a:t>
-            </a:r>
-            <a:r>
-              <a:rPr lang="en-US" altLang="en-US" sz="1200" i="1" dirty="0" smtClean="0">
-                <a:latin typeface="Arial" panose="020B0604020202020204" pitchFamily="34" charset="0"/>
-                <a:ea typeface="Amazon Ember" panose="020B0603020204020204" pitchFamily="34" charset="0"/>
-                <a:cs typeface="Arial" panose="020B0604020202020204" pitchFamily="34" charset="0"/>
-              </a:rPr>
-              <a:t>two endpoints fit in the flow?</a:t>
-            </a:r>
-            <a:endParaRPr lang="en-US" altLang="en-US" sz="1200" i="1" dirty="0">
-              <a:solidFill>
-                <a:srgbClr val="FF0000"/>
-              </a:solidFill>
+            <a:endParaRPr lang="en-US" altLang="en-US" sz="1200" dirty="0">
               <a:latin typeface="Arial" panose="020B0604020202020204" pitchFamily="34" charset="0"/>
               <a:ea typeface="Amazon Ember" panose="020B0603020204020204" pitchFamily="34" charset="0"/>
               <a:cs typeface="Arial" panose="020B0604020202020204" pitchFamily="34" charset="0"/>
@@ -7273,462 +6860,6 @@
           </a:p>
         </p:txBody>
       </p:sp>
-      <p:pic>
-        <p:nvPicPr>
-          <p:cNvPr id="53" name="Graphic 17">
-            <a:extLst>
-              <a:ext uri="{FF2B5EF4-FFF2-40B4-BE49-F238E27FC236}">
-                <a16:creationId xmlns:a16="http://schemas.microsoft.com/office/drawing/2014/main" id="{847A7472-D977-624B-9A30-47A44C4FD42F}"/>
-              </a:ext>
-            </a:extLst>
-          </p:cNvPr>
-          <p:cNvPicPr>
-            <a:picLocks noChangeAspect="1" noChangeArrowheads="1"/>
-          </p:cNvPicPr>
-          <p:nvPr/>
-        </p:nvPicPr>
-        <p:blipFill>
-          <a:blip r:embed="rId14"/>
-          <a:srcRect/>
-          <a:stretch/>
-        </p:blipFill>
-        <p:spPr bwMode="auto">
-          <a:xfrm>
-            <a:off x="766340" y="3495516"/>
-            <a:ext cx="762000" cy="762000"/>
-          </a:xfrm>
-          <a:prstGeom prst="rect">
-            <a:avLst/>
-          </a:prstGeom>
-          <a:noFill/>
-          <a:ln>
-            <a:noFill/>
-          </a:ln>
-          <a:extLst>
-            <a:ext uri="{909E8E84-426E-40DD-AFC4-6F175D3DCCD1}">
-              <a14:hiddenFill xmlns:a14="http://schemas.microsoft.com/office/drawing/2010/main">
-                <a:solidFill>
-                  <a:srgbClr val="FFFFFF"/>
-                </a:solidFill>
-              </a14:hiddenFill>
-            </a:ext>
-            <a:ext uri="{91240B29-F687-4F45-9708-019B960494DF}">
-              <a14:hiddenLine xmlns:a14="http://schemas.microsoft.com/office/drawing/2010/main" w="9525">
-                <a:solidFill>
-                  <a:srgbClr val="000000"/>
-                </a:solidFill>
-                <a:miter lim="800000"/>
-                <a:headEnd/>
-                <a:tailEnd/>
-              </a14:hiddenLine>
-            </a:ext>
-          </a:extLst>
-        </p:spPr>
-      </p:pic>
-      <p:sp>
-        <p:nvSpPr>
-          <p:cNvPr id="55" name="TextBox 9">
-            <a:extLst>
-              <a:ext uri="{FF2B5EF4-FFF2-40B4-BE49-F238E27FC236}">
-                <a16:creationId xmlns:a16="http://schemas.microsoft.com/office/drawing/2014/main" id="{D74A4489-6EF9-4C42-8389-DEA841189CC2}"/>
-              </a:ext>
-            </a:extLst>
-          </p:cNvPr>
-          <p:cNvSpPr txBox="1">
-            <a:spLocks noChangeArrowheads="1"/>
-          </p:cNvSpPr>
-          <p:nvPr/>
-        </p:nvSpPr>
-        <p:spPr bwMode="auto">
-          <a:xfrm>
-            <a:off x="242810" y="4259065"/>
-            <a:ext cx="1668721" cy="646331"/>
-          </a:xfrm>
-          <a:prstGeom prst="rect">
-            <a:avLst/>
-          </a:prstGeom>
-          <a:noFill/>
-          <a:ln>
-            <a:noFill/>
-          </a:ln>
-          <a:extLst>
-            <a:ext uri="{909E8E84-426E-40DD-AFC4-6F175D3DCCD1}">
-              <a14:hiddenFill xmlns:a14="http://schemas.microsoft.com/office/drawing/2010/main">
-                <a:solidFill>
-                  <a:srgbClr val="FFFFFF"/>
-                </a:solidFill>
-              </a14:hiddenFill>
-            </a:ext>
-            <a:ext uri="{91240B29-F687-4F45-9708-019B960494DF}">
-              <a14:hiddenLine xmlns:a14="http://schemas.microsoft.com/office/drawing/2010/main" w="9525">
-                <a:solidFill>
-                  <a:srgbClr val="000000"/>
-                </a:solidFill>
-                <a:miter lim="800000"/>
-                <a:headEnd/>
-                <a:tailEnd/>
-              </a14:hiddenLine>
-            </a:ext>
-          </a:extLst>
-        </p:spPr>
-        <p:txBody>
-          <a:bodyPr wrap="square">
-            <a:spAutoFit/>
-          </a:bodyPr>
-          <a:lstStyle>
-            <a:lvl1pPr>
-              <a:defRPr>
-                <a:solidFill>
-                  <a:schemeClr val="tx1"/>
-                </a:solidFill>
-                <a:latin typeface="Calibri" panose="020F0502020204030204" pitchFamily="34" charset="0"/>
-              </a:defRPr>
-            </a:lvl1pPr>
-            <a:lvl2pPr marL="742950" indent="-285750">
-              <a:defRPr>
-                <a:solidFill>
-                  <a:schemeClr val="tx1"/>
-                </a:solidFill>
-                <a:latin typeface="Calibri" panose="020F0502020204030204" pitchFamily="34" charset="0"/>
-              </a:defRPr>
-            </a:lvl2pPr>
-            <a:lvl3pPr marL="1143000" indent="-228600">
-              <a:defRPr>
-                <a:solidFill>
-                  <a:schemeClr val="tx1"/>
-                </a:solidFill>
-                <a:latin typeface="Calibri" panose="020F0502020204030204" pitchFamily="34" charset="0"/>
-              </a:defRPr>
-            </a:lvl3pPr>
-            <a:lvl4pPr marL="1600200" indent="-228600">
-              <a:defRPr>
-                <a:solidFill>
-                  <a:schemeClr val="tx1"/>
-                </a:solidFill>
-                <a:latin typeface="Calibri" panose="020F0502020204030204" pitchFamily="34" charset="0"/>
-              </a:defRPr>
-            </a:lvl4pPr>
-            <a:lvl5pPr marL="2057400" indent="-228600">
-              <a:defRPr>
-                <a:solidFill>
-                  <a:schemeClr val="tx1"/>
-                </a:solidFill>
-                <a:latin typeface="Calibri" panose="020F0502020204030204" pitchFamily="34" charset="0"/>
-              </a:defRPr>
-            </a:lvl5pPr>
-            <a:lvl6pPr marL="2514600" indent="-228600" eaLnBrk="0" fontAlgn="base" hangingPunct="0">
-              <a:spcBef>
-                <a:spcPct val="0"/>
-              </a:spcBef>
-              <a:spcAft>
-                <a:spcPct val="0"/>
-              </a:spcAft>
-              <a:defRPr>
-                <a:solidFill>
-                  <a:schemeClr val="tx1"/>
-                </a:solidFill>
-                <a:latin typeface="Calibri" panose="020F0502020204030204" pitchFamily="34" charset="0"/>
-              </a:defRPr>
-            </a:lvl6pPr>
-            <a:lvl7pPr marL="2971800" indent="-228600" eaLnBrk="0" fontAlgn="base" hangingPunct="0">
-              <a:spcBef>
-                <a:spcPct val="0"/>
-              </a:spcBef>
-              <a:spcAft>
-                <a:spcPct val="0"/>
-              </a:spcAft>
-              <a:defRPr>
-                <a:solidFill>
-                  <a:schemeClr val="tx1"/>
-                </a:solidFill>
-                <a:latin typeface="Calibri" panose="020F0502020204030204" pitchFamily="34" charset="0"/>
-              </a:defRPr>
-            </a:lvl7pPr>
-            <a:lvl8pPr marL="3429000" indent="-228600" eaLnBrk="0" fontAlgn="base" hangingPunct="0">
-              <a:spcBef>
-                <a:spcPct val="0"/>
-              </a:spcBef>
-              <a:spcAft>
-                <a:spcPct val="0"/>
-              </a:spcAft>
-              <a:defRPr>
-                <a:solidFill>
-                  <a:schemeClr val="tx1"/>
-                </a:solidFill>
-                <a:latin typeface="Calibri" panose="020F0502020204030204" pitchFamily="34" charset="0"/>
-              </a:defRPr>
-            </a:lvl8pPr>
-            <a:lvl9pPr marL="3886200" indent="-228600" eaLnBrk="0" fontAlgn="base" hangingPunct="0">
-              <a:spcBef>
-                <a:spcPct val="0"/>
-              </a:spcBef>
-              <a:spcAft>
-                <a:spcPct val="0"/>
-              </a:spcAft>
-              <a:defRPr>
-                <a:solidFill>
-                  <a:schemeClr val="tx1"/>
-                </a:solidFill>
-                <a:latin typeface="Calibri" panose="020F0502020204030204" pitchFamily="34" charset="0"/>
-              </a:defRPr>
-            </a:lvl9pPr>
-          </a:lstStyle>
-          <a:p>
-            <a:pPr algn="ctr"/>
-            <a:r>
-              <a:rPr lang="en-US" altLang="en-US" sz="1200" i="1" dirty="0" smtClean="0">
-                <a:latin typeface="Arial" panose="020B0604020202020204" pitchFamily="34" charset="0"/>
-                <a:ea typeface="Amazon Ember" panose="020B0603020204020204" pitchFamily="34" charset="0"/>
-                <a:cs typeface="Arial" panose="020B0604020202020204" pitchFamily="34" charset="0"/>
-              </a:rPr>
-              <a:t>Why is the icon at right </a:t>
-            </a:r>
-            <a:r>
-              <a:rPr lang="en-US" altLang="en-US" sz="1200" i="1" dirty="0">
-                <a:latin typeface="Arial" panose="020B0604020202020204" pitchFamily="34" charset="0"/>
-                <a:ea typeface="Amazon Ember" panose="020B0603020204020204" pitchFamily="34" charset="0"/>
-                <a:cs typeface="Arial" panose="020B0604020202020204" pitchFamily="34" charset="0"/>
-              </a:rPr>
-              <a:t>purple</a:t>
-            </a:r>
-            <a:r>
-              <a:rPr lang="en-US" altLang="en-US" sz="1200" i="1" dirty="0" smtClean="0">
-                <a:latin typeface="Arial" panose="020B0604020202020204" pitchFamily="34" charset="0"/>
-                <a:ea typeface="Amazon Ember" panose="020B0603020204020204" pitchFamily="34" charset="0"/>
-                <a:cs typeface="Arial" panose="020B0604020202020204" pitchFamily="34" charset="0"/>
-              </a:rPr>
-              <a:t>? It’s pink in the main deck.</a:t>
-            </a:r>
-            <a:endParaRPr lang="en-US" altLang="en-US" sz="1200" i="1" dirty="0">
-              <a:solidFill>
-                <a:srgbClr val="FF0000"/>
-              </a:solidFill>
-              <a:latin typeface="Arial" panose="020B0604020202020204" pitchFamily="34" charset="0"/>
-              <a:ea typeface="Amazon Ember" panose="020B0603020204020204" pitchFamily="34" charset="0"/>
-              <a:cs typeface="Arial" panose="020B0604020202020204" pitchFamily="34" charset="0"/>
-            </a:endParaRPr>
-          </a:p>
-        </p:txBody>
-      </p:sp>
-      <p:sp>
-        <p:nvSpPr>
-          <p:cNvPr id="47" name="TextBox 16">
-            <a:extLst>
-              <a:ext uri="{FF2B5EF4-FFF2-40B4-BE49-F238E27FC236}">
-                <a16:creationId xmlns:a16="http://schemas.microsoft.com/office/drawing/2014/main" id="{099D59F3-19A5-4E47-9AA1-612D0AD90909}"/>
-              </a:ext>
-            </a:extLst>
-          </p:cNvPr>
-          <p:cNvSpPr txBox="1">
-            <a:spLocks noChangeArrowheads="1"/>
-          </p:cNvSpPr>
-          <p:nvPr/>
-        </p:nvSpPr>
-        <p:spPr bwMode="auto">
-          <a:xfrm>
-            <a:off x="787181" y="5794789"/>
-            <a:ext cx="1468727" cy="261610"/>
-          </a:xfrm>
-          <a:prstGeom prst="rect">
-            <a:avLst/>
-          </a:prstGeom>
-          <a:noFill/>
-          <a:ln>
-            <a:noFill/>
-          </a:ln>
-          <a:extLst>
-            <a:ext uri="{909E8E84-426E-40DD-AFC4-6F175D3DCCD1}">
-              <a14:hiddenFill xmlns:a14="http://schemas.microsoft.com/office/drawing/2010/main">
-                <a:solidFill>
-                  <a:srgbClr val="FFFFFF"/>
-                </a:solidFill>
-              </a14:hiddenFill>
-            </a:ext>
-            <a:ext uri="{91240B29-F687-4F45-9708-019B960494DF}">
-              <a14:hiddenLine xmlns:a14="http://schemas.microsoft.com/office/drawing/2010/main" w="9525">
-                <a:solidFill>
-                  <a:srgbClr val="000000"/>
-                </a:solidFill>
-                <a:miter lim="800000"/>
-                <a:headEnd/>
-                <a:tailEnd/>
-              </a14:hiddenLine>
-            </a:ext>
-          </a:extLst>
-        </p:spPr>
-        <p:txBody>
-          <a:bodyPr wrap="square">
-            <a:spAutoFit/>
-          </a:bodyPr>
-          <a:lstStyle>
-            <a:lvl1pPr>
-              <a:defRPr>
-                <a:solidFill>
-                  <a:schemeClr val="tx1"/>
-                </a:solidFill>
-                <a:latin typeface="Calibri" panose="020F0502020204030204" pitchFamily="34" charset="0"/>
-              </a:defRPr>
-            </a:lvl1pPr>
-            <a:lvl2pPr marL="742950" indent="-285750">
-              <a:defRPr>
-                <a:solidFill>
-                  <a:schemeClr val="tx1"/>
-                </a:solidFill>
-                <a:latin typeface="Calibri" panose="020F0502020204030204" pitchFamily="34" charset="0"/>
-              </a:defRPr>
-            </a:lvl2pPr>
-            <a:lvl3pPr marL="1143000" indent="-228600">
-              <a:defRPr>
-                <a:solidFill>
-                  <a:schemeClr val="tx1"/>
-                </a:solidFill>
-                <a:latin typeface="Calibri" panose="020F0502020204030204" pitchFamily="34" charset="0"/>
-              </a:defRPr>
-            </a:lvl3pPr>
-            <a:lvl4pPr marL="1600200" indent="-228600">
-              <a:defRPr>
-                <a:solidFill>
-                  <a:schemeClr val="tx1"/>
-                </a:solidFill>
-                <a:latin typeface="Calibri" panose="020F0502020204030204" pitchFamily="34" charset="0"/>
-              </a:defRPr>
-            </a:lvl4pPr>
-            <a:lvl5pPr marL="2057400" indent="-228600">
-              <a:defRPr>
-                <a:solidFill>
-                  <a:schemeClr val="tx1"/>
-                </a:solidFill>
-                <a:latin typeface="Calibri" panose="020F0502020204030204" pitchFamily="34" charset="0"/>
-              </a:defRPr>
-            </a:lvl5pPr>
-            <a:lvl6pPr marL="2514600" indent="-228600" eaLnBrk="0" fontAlgn="base" hangingPunct="0">
-              <a:spcBef>
-                <a:spcPct val="0"/>
-              </a:spcBef>
-              <a:spcAft>
-                <a:spcPct val="0"/>
-              </a:spcAft>
-              <a:defRPr>
-                <a:solidFill>
-                  <a:schemeClr val="tx1"/>
-                </a:solidFill>
-                <a:latin typeface="Calibri" panose="020F0502020204030204" pitchFamily="34" charset="0"/>
-              </a:defRPr>
-            </a:lvl6pPr>
-            <a:lvl7pPr marL="2971800" indent="-228600" eaLnBrk="0" fontAlgn="base" hangingPunct="0">
-              <a:spcBef>
-                <a:spcPct val="0"/>
-              </a:spcBef>
-              <a:spcAft>
-                <a:spcPct val="0"/>
-              </a:spcAft>
-              <a:defRPr>
-                <a:solidFill>
-                  <a:schemeClr val="tx1"/>
-                </a:solidFill>
-                <a:latin typeface="Calibri" panose="020F0502020204030204" pitchFamily="34" charset="0"/>
-              </a:defRPr>
-            </a:lvl7pPr>
-            <a:lvl8pPr marL="3429000" indent="-228600" eaLnBrk="0" fontAlgn="base" hangingPunct="0">
-              <a:spcBef>
-                <a:spcPct val="0"/>
-              </a:spcBef>
-              <a:spcAft>
-                <a:spcPct val="0"/>
-              </a:spcAft>
-              <a:defRPr>
-                <a:solidFill>
-                  <a:schemeClr val="tx1"/>
-                </a:solidFill>
-                <a:latin typeface="Calibri" panose="020F0502020204030204" pitchFamily="34" charset="0"/>
-              </a:defRPr>
-            </a:lvl8pPr>
-            <a:lvl9pPr marL="3886200" indent="-228600" eaLnBrk="0" fontAlgn="base" hangingPunct="0">
-              <a:spcBef>
-                <a:spcPct val="0"/>
-              </a:spcBef>
-              <a:spcAft>
-                <a:spcPct val="0"/>
-              </a:spcAft>
-              <a:defRPr>
-                <a:solidFill>
-                  <a:schemeClr val="tx1"/>
-                </a:solidFill>
-                <a:latin typeface="Calibri" panose="020F0502020204030204" pitchFamily="34" charset="0"/>
-              </a:defRPr>
-            </a:lvl9pPr>
-          </a:lstStyle>
-          <a:p>
-            <a:pPr algn="ctr" eaLnBrk="1" hangingPunct="1"/>
-            <a:r>
-              <a:rPr lang="en-US" altLang="en-US" sz="1100" dirty="0">
-                <a:latin typeface="Arial" panose="020B0604020202020204" pitchFamily="34" charset="0"/>
-                <a:ea typeface="Amazon Ember" panose="020B0603020204020204" pitchFamily="34" charset="0"/>
-                <a:cs typeface="Arial" panose="020B0604020202020204" pitchFamily="34" charset="0"/>
-              </a:rPr>
-              <a:t>Endpoint</a:t>
-            </a:r>
-          </a:p>
-        </p:txBody>
-      </p:sp>
-      <p:pic>
-        <p:nvPicPr>
-          <p:cNvPr id="57" name="Graphic 6">
-            <a:extLst>
-              <a:ext uri="{FF2B5EF4-FFF2-40B4-BE49-F238E27FC236}">
-                <a16:creationId xmlns:a16="http://schemas.microsoft.com/office/drawing/2014/main" id="{FD960BCD-0D1F-914A-B9E9-229CD74E312A}"/>
-              </a:ext>
-            </a:extLst>
-          </p:cNvPr>
-          <p:cNvPicPr>
-            <a:picLocks noChangeAspect="1" noChangeArrowheads="1"/>
-          </p:cNvPicPr>
-          <p:nvPr/>
-        </p:nvPicPr>
-        <p:blipFill>
-          <a:blip r:embed="rId12">
-            <a:extLst>
-              <a:ext uri="{96DAC541-7B7A-43D3-8B79-37D633B846F1}">
-                <asvg:svgBlip xmlns:asvg="http://schemas.microsoft.com/office/drawing/2016/SVG/main" xmlns="" r:embed="rId13"/>
-              </a:ext>
-            </a:extLst>
-          </a:blip>
-          <a:srcRect/>
-          <a:stretch/>
-        </p:blipFill>
-        <p:spPr bwMode="auto">
-          <a:xfrm>
-            <a:off x="1282557" y="5382414"/>
-            <a:ext cx="457200" cy="457200"/>
-          </a:xfrm>
-          <a:prstGeom prst="rect">
-            <a:avLst/>
-          </a:prstGeom>
-          <a:noFill/>
-          <a:ln>
-            <a:noFill/>
-          </a:ln>
-          <a:extLst>
-            <a:ext uri="{909E8E84-426E-40DD-AFC4-6F175D3DCCD1}">
-              <a14:hiddenFill xmlns:a14="http://schemas.microsoft.com/office/drawing/2010/main">
-                <a:solidFill>
-                  <a:srgbClr val="FFFFFF"/>
-                </a:solidFill>
-              </a14:hiddenFill>
-            </a:ext>
-            <a:ext uri="{91240B29-F687-4F45-9708-019B960494DF}">
-              <a14:hiddenLine xmlns:a14="http://schemas.microsoft.com/office/drawing/2010/main" w="9525">
-                <a:solidFill>
-                  <a:srgbClr val="000000"/>
-                </a:solidFill>
-                <a:miter lim="800000"/>
-                <a:headEnd/>
-                <a:tailEnd/>
-              </a14:hiddenLine>
-            </a:ext>
-          </a:extLst>
-        </p:spPr>
-      </p:pic>
     </p:spTree>
     <p:extLst>
       <p:ext uri="{BB962C8B-B14F-4D97-AF65-F5344CB8AC3E}">

</xml_diff>

<commit_message>
Production doc builds - 2021/03/18 22:00:06 UTC
</commit_message>
<xml_diff>
--- a/docs/images/connectsense-spc-architecture-diagram.pptx
+++ b/docs/images/connectsense-spc-architecture-diagram.pptx
@@ -260,9 +260,9 @@
           <a:p>
             <a:fld id="{B254F3FA-2CD2-47E1-9871-C6CD92049798}" type="datetimeFigureOut">
               <a:rPr lang="en-US" smtClean="0"/>
-              <a:t>3/12/2021</a:t>
+              <a:t>3/17/2021</a:t>
             </a:fld>
-            <a:endParaRPr lang="en-US"/>
+            <a:endParaRPr lang="en-US" dirty="0"/>
           </a:p>
         </p:txBody>
       </p:sp>
@@ -287,7 +287,7 @@
           <a:bodyPr/>
           <a:lstStyle/>
           <a:p>
-            <a:endParaRPr lang="en-US"/>
+            <a:endParaRPr lang="en-US" dirty="0"/>
           </a:p>
         </p:txBody>
       </p:sp>
@@ -316,7 +316,7 @@
               <a:rPr lang="en-US" smtClean="0"/>
               <a:t>‹#›</a:t>
             </a:fld>
-            <a:endParaRPr lang="en-US"/>
+            <a:endParaRPr lang="en-US" dirty="0"/>
           </a:p>
         </p:txBody>
       </p:sp>
@@ -458,9 +458,9 @@
           <a:p>
             <a:fld id="{B254F3FA-2CD2-47E1-9871-C6CD92049798}" type="datetimeFigureOut">
               <a:rPr lang="en-US" smtClean="0"/>
-              <a:t>3/12/2021</a:t>
+              <a:t>3/17/2021</a:t>
             </a:fld>
-            <a:endParaRPr lang="en-US"/>
+            <a:endParaRPr lang="en-US" dirty="0"/>
           </a:p>
         </p:txBody>
       </p:sp>
@@ -485,7 +485,7 @@
           <a:bodyPr/>
           <a:lstStyle/>
           <a:p>
-            <a:endParaRPr lang="en-US"/>
+            <a:endParaRPr lang="en-US" dirty="0"/>
           </a:p>
         </p:txBody>
       </p:sp>
@@ -514,7 +514,7 @@
               <a:rPr lang="en-US" smtClean="0"/>
               <a:t>‹#›</a:t>
             </a:fld>
-            <a:endParaRPr lang="en-US"/>
+            <a:endParaRPr lang="en-US" dirty="0"/>
           </a:p>
         </p:txBody>
       </p:sp>
@@ -666,9 +666,9 @@
           <a:p>
             <a:fld id="{B254F3FA-2CD2-47E1-9871-C6CD92049798}" type="datetimeFigureOut">
               <a:rPr lang="en-US" smtClean="0"/>
-              <a:t>3/12/2021</a:t>
+              <a:t>3/17/2021</a:t>
             </a:fld>
-            <a:endParaRPr lang="en-US"/>
+            <a:endParaRPr lang="en-US" dirty="0"/>
           </a:p>
         </p:txBody>
       </p:sp>
@@ -693,7 +693,7 @@
           <a:bodyPr/>
           <a:lstStyle/>
           <a:p>
-            <a:endParaRPr lang="en-US"/>
+            <a:endParaRPr lang="en-US" dirty="0"/>
           </a:p>
         </p:txBody>
       </p:sp>
@@ -722,7 +722,7 @@
               <a:rPr lang="en-US" smtClean="0"/>
               <a:t>‹#›</a:t>
             </a:fld>
-            <a:endParaRPr lang="en-US"/>
+            <a:endParaRPr lang="en-US" dirty="0"/>
           </a:p>
         </p:txBody>
       </p:sp>
@@ -864,9 +864,9 @@
           <a:p>
             <a:fld id="{B254F3FA-2CD2-47E1-9871-C6CD92049798}" type="datetimeFigureOut">
               <a:rPr lang="en-US" smtClean="0"/>
-              <a:t>3/12/2021</a:t>
+              <a:t>3/17/2021</a:t>
             </a:fld>
-            <a:endParaRPr lang="en-US"/>
+            <a:endParaRPr lang="en-US" dirty="0"/>
           </a:p>
         </p:txBody>
       </p:sp>
@@ -891,7 +891,7 @@
           <a:bodyPr/>
           <a:lstStyle/>
           <a:p>
-            <a:endParaRPr lang="en-US"/>
+            <a:endParaRPr lang="en-US" dirty="0"/>
           </a:p>
         </p:txBody>
       </p:sp>
@@ -920,7 +920,7 @@
               <a:rPr lang="en-US" smtClean="0"/>
               <a:t>‹#›</a:t>
             </a:fld>
-            <a:endParaRPr lang="en-US"/>
+            <a:endParaRPr lang="en-US" dirty="0"/>
           </a:p>
         </p:txBody>
       </p:sp>
@@ -1139,9 +1139,9 @@
           <a:p>
             <a:fld id="{B254F3FA-2CD2-47E1-9871-C6CD92049798}" type="datetimeFigureOut">
               <a:rPr lang="en-US" smtClean="0"/>
-              <a:t>3/12/2021</a:t>
+              <a:t>3/17/2021</a:t>
             </a:fld>
-            <a:endParaRPr lang="en-US"/>
+            <a:endParaRPr lang="en-US" dirty="0"/>
           </a:p>
         </p:txBody>
       </p:sp>
@@ -1166,7 +1166,7 @@
           <a:bodyPr/>
           <a:lstStyle/>
           <a:p>
-            <a:endParaRPr lang="en-US"/>
+            <a:endParaRPr lang="en-US" dirty="0"/>
           </a:p>
         </p:txBody>
       </p:sp>
@@ -1195,7 +1195,7 @@
               <a:rPr lang="en-US" smtClean="0"/>
               <a:t>‹#›</a:t>
             </a:fld>
-            <a:endParaRPr lang="en-US"/>
+            <a:endParaRPr lang="en-US" dirty="0"/>
           </a:p>
         </p:txBody>
       </p:sp>
@@ -1404,9 +1404,9 @@
           <a:p>
             <a:fld id="{B254F3FA-2CD2-47E1-9871-C6CD92049798}" type="datetimeFigureOut">
               <a:rPr lang="en-US" smtClean="0"/>
-              <a:t>3/12/2021</a:t>
+              <a:t>3/17/2021</a:t>
             </a:fld>
-            <a:endParaRPr lang="en-US"/>
+            <a:endParaRPr lang="en-US" dirty="0"/>
           </a:p>
         </p:txBody>
       </p:sp>
@@ -1431,7 +1431,7 @@
           <a:bodyPr/>
           <a:lstStyle/>
           <a:p>
-            <a:endParaRPr lang="en-US"/>
+            <a:endParaRPr lang="en-US" dirty="0"/>
           </a:p>
         </p:txBody>
       </p:sp>
@@ -1460,7 +1460,7 @@
               <a:rPr lang="en-US" smtClean="0"/>
               <a:t>‹#›</a:t>
             </a:fld>
-            <a:endParaRPr lang="en-US"/>
+            <a:endParaRPr lang="en-US" dirty="0"/>
           </a:p>
         </p:txBody>
       </p:sp>
@@ -1816,9 +1816,9 @@
           <a:p>
             <a:fld id="{B254F3FA-2CD2-47E1-9871-C6CD92049798}" type="datetimeFigureOut">
               <a:rPr lang="en-US" smtClean="0"/>
-              <a:t>3/12/2021</a:t>
+              <a:t>3/17/2021</a:t>
             </a:fld>
-            <a:endParaRPr lang="en-US"/>
+            <a:endParaRPr lang="en-US" dirty="0"/>
           </a:p>
         </p:txBody>
       </p:sp>
@@ -1843,7 +1843,7 @@
           <a:bodyPr/>
           <a:lstStyle/>
           <a:p>
-            <a:endParaRPr lang="en-US"/>
+            <a:endParaRPr lang="en-US" dirty="0"/>
           </a:p>
         </p:txBody>
       </p:sp>
@@ -1872,7 +1872,7 @@
               <a:rPr lang="en-US" smtClean="0"/>
               <a:t>‹#›</a:t>
             </a:fld>
-            <a:endParaRPr lang="en-US"/>
+            <a:endParaRPr lang="en-US" dirty="0"/>
           </a:p>
         </p:txBody>
       </p:sp>
@@ -1957,9 +1957,9 @@
           <a:p>
             <a:fld id="{B254F3FA-2CD2-47E1-9871-C6CD92049798}" type="datetimeFigureOut">
               <a:rPr lang="en-US" smtClean="0"/>
-              <a:t>3/12/2021</a:t>
+              <a:t>3/17/2021</a:t>
             </a:fld>
-            <a:endParaRPr lang="en-US"/>
+            <a:endParaRPr lang="en-US" dirty="0"/>
           </a:p>
         </p:txBody>
       </p:sp>
@@ -1984,7 +1984,7 @@
           <a:bodyPr/>
           <a:lstStyle/>
           <a:p>
-            <a:endParaRPr lang="en-US"/>
+            <a:endParaRPr lang="en-US" dirty="0"/>
           </a:p>
         </p:txBody>
       </p:sp>
@@ -2013,7 +2013,7 @@
               <a:rPr lang="en-US" smtClean="0"/>
               <a:t>‹#›</a:t>
             </a:fld>
-            <a:endParaRPr lang="en-US"/>
+            <a:endParaRPr lang="en-US" dirty="0"/>
           </a:p>
         </p:txBody>
       </p:sp>
@@ -2070,9 +2070,9 @@
           <a:p>
             <a:fld id="{B254F3FA-2CD2-47E1-9871-C6CD92049798}" type="datetimeFigureOut">
               <a:rPr lang="en-US" smtClean="0"/>
-              <a:t>3/12/2021</a:t>
+              <a:t>3/17/2021</a:t>
             </a:fld>
-            <a:endParaRPr lang="en-US"/>
+            <a:endParaRPr lang="en-US" dirty="0"/>
           </a:p>
         </p:txBody>
       </p:sp>
@@ -2097,7 +2097,7 @@
           <a:bodyPr/>
           <a:lstStyle/>
           <a:p>
-            <a:endParaRPr lang="en-US"/>
+            <a:endParaRPr lang="en-US" dirty="0"/>
           </a:p>
         </p:txBody>
       </p:sp>
@@ -2126,7 +2126,7 @@
               <a:rPr lang="en-US" smtClean="0"/>
               <a:t>‹#›</a:t>
             </a:fld>
-            <a:endParaRPr lang="en-US"/>
+            <a:endParaRPr lang="en-US" dirty="0"/>
           </a:p>
         </p:txBody>
       </p:sp>
@@ -2381,9 +2381,9 @@
           <a:p>
             <a:fld id="{B254F3FA-2CD2-47E1-9871-C6CD92049798}" type="datetimeFigureOut">
               <a:rPr lang="en-US" smtClean="0"/>
-              <a:t>3/12/2021</a:t>
+              <a:t>3/17/2021</a:t>
             </a:fld>
-            <a:endParaRPr lang="en-US"/>
+            <a:endParaRPr lang="en-US" dirty="0"/>
           </a:p>
         </p:txBody>
       </p:sp>
@@ -2408,7 +2408,7 @@
           <a:bodyPr/>
           <a:lstStyle/>
           <a:p>
-            <a:endParaRPr lang="en-US"/>
+            <a:endParaRPr lang="en-US" dirty="0"/>
           </a:p>
         </p:txBody>
       </p:sp>
@@ -2437,7 +2437,7 @@
               <a:rPr lang="en-US" smtClean="0"/>
               <a:t>‹#›</a:t>
             </a:fld>
-            <a:endParaRPr lang="en-US"/>
+            <a:endParaRPr lang="en-US" dirty="0"/>
           </a:p>
         </p:txBody>
       </p:sp>
@@ -2571,7 +2571,7 @@
             </a:lvl9pPr>
           </a:lstStyle>
           <a:p>
-            <a:endParaRPr lang="en-US"/>
+            <a:endParaRPr lang="en-US" dirty="0"/>
           </a:p>
         </p:txBody>
       </p:sp>
@@ -2669,9 +2669,9 @@
           <a:p>
             <a:fld id="{B254F3FA-2CD2-47E1-9871-C6CD92049798}" type="datetimeFigureOut">
               <a:rPr lang="en-US" smtClean="0"/>
-              <a:t>3/12/2021</a:t>
+              <a:t>3/17/2021</a:t>
             </a:fld>
-            <a:endParaRPr lang="en-US"/>
+            <a:endParaRPr lang="en-US" dirty="0"/>
           </a:p>
         </p:txBody>
       </p:sp>
@@ -2696,7 +2696,7 @@
           <a:bodyPr/>
           <a:lstStyle/>
           <a:p>
-            <a:endParaRPr lang="en-US"/>
+            <a:endParaRPr lang="en-US" dirty="0"/>
           </a:p>
         </p:txBody>
       </p:sp>
@@ -2725,7 +2725,7 @@
               <a:rPr lang="en-US" smtClean="0"/>
               <a:t>‹#›</a:t>
             </a:fld>
-            <a:endParaRPr lang="en-US"/>
+            <a:endParaRPr lang="en-US" dirty="0"/>
           </a:p>
         </p:txBody>
       </p:sp>
@@ -2910,9 +2910,9 @@
           <a:p>
             <a:fld id="{B254F3FA-2CD2-47E1-9871-C6CD92049798}" type="datetimeFigureOut">
               <a:rPr lang="en-US" smtClean="0"/>
-              <a:t>3/12/2021</a:t>
+              <a:t>3/17/2021</a:t>
             </a:fld>
-            <a:endParaRPr lang="en-US"/>
+            <a:endParaRPr lang="en-US" dirty="0"/>
           </a:p>
         </p:txBody>
       </p:sp>
@@ -2955,7 +2955,7 @@
             </a:lvl1pPr>
           </a:lstStyle>
           <a:p>
-            <a:endParaRPr lang="en-US"/>
+            <a:endParaRPr lang="en-US" dirty="0"/>
           </a:p>
         </p:txBody>
       </p:sp>
@@ -3002,7 +3002,7 @@
               <a:rPr lang="en-US" smtClean="0"/>
               <a:t>‹#›</a:t>
             </a:fld>
-            <a:endParaRPr lang="en-US"/>
+            <a:endParaRPr lang="en-US" dirty="0"/>
           </a:p>
         </p:txBody>
       </p:sp>
@@ -3658,19 +3658,8 @@
                 <a:latin typeface="Arial" panose="020B0604020202020204" pitchFamily="34" charset="0"/>
                 <a:cs typeface="Arial" panose="020B0604020202020204" pitchFamily="34" charset="0"/>
               </a:rPr>
-              <a:t>Device </a:t>
+              <a:t>Device metrics</a:t>
             </a:r>
-            <a:r>
-              <a:rPr lang="en-US" altLang="en-US" sz="1200" i="1" dirty="0" smtClean="0">
-                <a:latin typeface="Arial" panose="020B0604020202020204" pitchFamily="34" charset="0"/>
-                <a:cs typeface="Arial" panose="020B0604020202020204" pitchFamily="34" charset="0"/>
-              </a:rPr>
-              <a:t>metrics</a:t>
-            </a:r>
-            <a:endParaRPr lang="en-US" altLang="en-US" sz="1200" i="1" dirty="0" smtClean="0">
-              <a:latin typeface="Arial" panose="020B0604020202020204" pitchFamily="34" charset="0"/>
-              <a:cs typeface="Arial" panose="020B0604020202020204" pitchFamily="34" charset="0"/>
-            </a:endParaRPr>
           </a:p>
         </p:txBody>
       </p:sp>
@@ -4386,177 +4375,6 @@
       </p:cxnSp>
       <p:sp>
         <p:nvSpPr>
-          <p:cNvPr id="65" name="TextBox 27">
-            <a:extLst>
-              <a:ext uri="{FF2B5EF4-FFF2-40B4-BE49-F238E27FC236}">
-                <a16:creationId xmlns:a16="http://schemas.microsoft.com/office/drawing/2014/main" id="{7B4E5791-9B70-46B5-9B9F-C74FB227BAFC}"/>
-              </a:ext>
-            </a:extLst>
-          </p:cNvPr>
-          <p:cNvSpPr txBox="1">
-            <a:spLocks noChangeArrowheads="1"/>
-          </p:cNvSpPr>
-          <p:nvPr/>
-        </p:nvSpPr>
-        <p:spPr bwMode="auto">
-          <a:xfrm>
-            <a:off x="2975190" y="5905674"/>
-            <a:ext cx="2013943" cy="276999"/>
-          </a:xfrm>
-          <a:prstGeom prst="rect">
-            <a:avLst/>
-          </a:prstGeom>
-          <a:noFill/>
-          <a:ln>
-            <a:noFill/>
-          </a:ln>
-          <a:extLst>
-            <a:ext uri="{909E8E84-426E-40DD-AFC4-6F175D3DCCD1}">
-              <a14:hiddenFill xmlns:a14="http://schemas.microsoft.com/office/drawing/2010/main">
-                <a:solidFill>
-                  <a:srgbClr val="FFFFFF"/>
-                </a:solidFill>
-              </a14:hiddenFill>
-            </a:ext>
-            <a:ext uri="{91240B29-F687-4F45-9708-019B960494DF}">
-              <a14:hiddenLine xmlns:a14="http://schemas.microsoft.com/office/drawing/2010/main" w="9525">
-                <a:solidFill>
-                  <a:srgbClr val="000000"/>
-                </a:solidFill>
-                <a:miter lim="800000"/>
-                <a:headEnd/>
-                <a:tailEnd/>
-              </a14:hiddenLine>
-            </a:ext>
-          </a:extLst>
-        </p:spPr>
-        <p:txBody>
-          <a:bodyPr wrap="square">
-            <a:spAutoFit/>
-          </a:bodyPr>
-          <a:lstStyle>
-            <a:lvl1pPr>
-              <a:defRPr>
-                <a:solidFill>
-                  <a:schemeClr val="tx1"/>
-                </a:solidFill>
-                <a:latin typeface="Calibri" panose="020F0502020204030204" pitchFamily="34" charset="0"/>
-              </a:defRPr>
-            </a:lvl1pPr>
-            <a:lvl2pPr marL="742950" indent="-285750">
-              <a:defRPr>
-                <a:solidFill>
-                  <a:schemeClr val="tx1"/>
-                </a:solidFill>
-                <a:latin typeface="Calibri" panose="020F0502020204030204" pitchFamily="34" charset="0"/>
-              </a:defRPr>
-            </a:lvl2pPr>
-            <a:lvl3pPr marL="1143000" indent="-228600">
-              <a:defRPr>
-                <a:solidFill>
-                  <a:schemeClr val="tx1"/>
-                </a:solidFill>
-                <a:latin typeface="Calibri" panose="020F0502020204030204" pitchFamily="34" charset="0"/>
-              </a:defRPr>
-            </a:lvl3pPr>
-            <a:lvl4pPr marL="1600200" indent="-228600">
-              <a:defRPr>
-                <a:solidFill>
-                  <a:schemeClr val="tx1"/>
-                </a:solidFill>
-                <a:latin typeface="Calibri" panose="020F0502020204030204" pitchFamily="34" charset="0"/>
-              </a:defRPr>
-            </a:lvl4pPr>
-            <a:lvl5pPr marL="2057400" indent="-228600">
-              <a:defRPr>
-                <a:solidFill>
-                  <a:schemeClr val="tx1"/>
-                </a:solidFill>
-                <a:latin typeface="Calibri" panose="020F0502020204030204" pitchFamily="34" charset="0"/>
-              </a:defRPr>
-            </a:lvl5pPr>
-            <a:lvl6pPr marL="2514600" indent="-228600" eaLnBrk="0" fontAlgn="base" hangingPunct="0">
-              <a:spcBef>
-                <a:spcPct val="0"/>
-              </a:spcBef>
-              <a:spcAft>
-                <a:spcPct val="0"/>
-              </a:spcAft>
-              <a:defRPr>
-                <a:solidFill>
-                  <a:schemeClr val="tx1"/>
-                </a:solidFill>
-                <a:latin typeface="Calibri" panose="020F0502020204030204" pitchFamily="34" charset="0"/>
-              </a:defRPr>
-            </a:lvl6pPr>
-            <a:lvl7pPr marL="2971800" indent="-228600" eaLnBrk="0" fontAlgn="base" hangingPunct="0">
-              <a:spcBef>
-                <a:spcPct val="0"/>
-              </a:spcBef>
-              <a:spcAft>
-                <a:spcPct val="0"/>
-              </a:spcAft>
-              <a:defRPr>
-                <a:solidFill>
-                  <a:schemeClr val="tx1"/>
-                </a:solidFill>
-                <a:latin typeface="Calibri" panose="020F0502020204030204" pitchFamily="34" charset="0"/>
-              </a:defRPr>
-            </a:lvl7pPr>
-            <a:lvl8pPr marL="3429000" indent="-228600" eaLnBrk="0" fontAlgn="base" hangingPunct="0">
-              <a:spcBef>
-                <a:spcPct val="0"/>
-              </a:spcBef>
-              <a:spcAft>
-                <a:spcPct val="0"/>
-              </a:spcAft>
-              <a:defRPr>
-                <a:solidFill>
-                  <a:schemeClr val="tx1"/>
-                </a:solidFill>
-                <a:latin typeface="Calibri" panose="020F0502020204030204" pitchFamily="34" charset="0"/>
-              </a:defRPr>
-            </a:lvl8pPr>
-            <a:lvl9pPr marL="3886200" indent="-228600" eaLnBrk="0" fontAlgn="base" hangingPunct="0">
-              <a:spcBef>
-                <a:spcPct val="0"/>
-              </a:spcBef>
-              <a:spcAft>
-                <a:spcPct val="0"/>
-              </a:spcAft>
-              <a:defRPr>
-                <a:solidFill>
-                  <a:schemeClr val="tx1"/>
-                </a:solidFill>
-                <a:latin typeface="Calibri" panose="020F0502020204030204" pitchFamily="34" charset="0"/>
-              </a:defRPr>
-            </a:lvl9pPr>
-          </a:lstStyle>
-          <a:p>
-            <a:pPr eaLnBrk="1" hangingPunct="1"/>
-            <a:r>
-              <a:rPr lang="en-US" altLang="en-US" sz="1200" i="1" dirty="0">
-                <a:latin typeface="Arial" panose="020B0604020202020204" pitchFamily="34" charset="0"/>
-                <a:cs typeface="Arial" panose="020B0604020202020204" pitchFamily="34" charset="0"/>
-              </a:rPr>
-              <a:t>API Gateway </a:t>
-            </a:r>
-            <a:r>
-              <a:rPr lang="en-US" altLang="en-US" sz="1200" i="1" dirty="0" smtClean="0">
-                <a:latin typeface="Arial" panose="020B0604020202020204" pitchFamily="34" charset="0"/>
-                <a:cs typeface="Arial" panose="020B0604020202020204" pitchFamily="34" charset="0"/>
-              </a:rPr>
-              <a:t>endpoint</a:t>
-            </a:r>
-            <a:endParaRPr lang="en-US" altLang="en-US" sz="1200" i="1" dirty="0">
-              <a:latin typeface="Arial" panose="020B0604020202020204" pitchFamily="34" charset="0"/>
-              <a:cs typeface="Arial" panose="020B0604020202020204" pitchFamily="34" charset="0"/>
-            </a:endParaRPr>
-          </a:p>
-        </p:txBody>
-      </p:sp>
-      <p:sp>
-        <p:nvSpPr>
           <p:cNvPr id="66" name="TextBox 27">
             <a:extLst>
               <a:ext uri="{FF2B5EF4-FFF2-40B4-BE49-F238E27FC236}">
@@ -4706,16 +4524,12 @@
           <a:p>
             <a:pPr eaLnBrk="1" hangingPunct="1"/>
             <a:r>
-              <a:rPr lang="en-US" altLang="en-US" sz="1200" i="1" dirty="0" smtClean="0">
+              <a:rPr lang="en-US" altLang="en-US" sz="1200" i="1" dirty="0">
                 <a:latin typeface="Arial" panose="020B0604020202020204" pitchFamily="34" charset="0"/>
                 <a:cs typeface="Arial" panose="020B0604020202020204" pitchFamily="34" charset="0"/>
               </a:rPr>
               <a:t>Self-provisioning</a:t>
             </a:r>
-            <a:endParaRPr lang="en-US" altLang="en-US" sz="1200" i="1" dirty="0">
-              <a:latin typeface="Arial" panose="020B0604020202020204" pitchFamily="34" charset="0"/>
-              <a:cs typeface="Arial" panose="020B0604020202020204" pitchFamily="34" charset="0"/>
-            </a:endParaRPr>
           </a:p>
         </p:txBody>
       </p:sp>
@@ -5603,8 +5417,8 @@
         </p:nvSpPr>
         <p:spPr>
           <a:xfrm flipH="1" flipV="1">
-            <a:off x="2515748" y="2899710"/>
-            <a:ext cx="3056645" cy="3246034"/>
+            <a:off x="2515746" y="3003747"/>
+            <a:ext cx="3056645" cy="3141995"/>
           </a:xfrm>
           <a:custGeom>
             <a:avLst/>
@@ -5703,7 +5517,7 @@
           <a:blip r:embed="rId8">
             <a:extLst>
               <a:ext uri="{96DAC541-7B7A-43D3-8B79-37D633B846F1}">
-                <asvg:svgBlip xmlns="" xmlns:asvg="http://schemas.microsoft.com/office/drawing/2016/SVG/main" r:embed="rId11"/>
+                <asvg:svgBlip xmlns:asvg="http://schemas.microsoft.com/office/drawing/2016/SVG/main" xmlns="" r:embed="rId9"/>
               </a:ext>
             </a:extLst>
           </a:blip>
@@ -5933,8 +5747,8 @@
             <a:solidFill>
               <a:schemeClr val="tx2"/>
             </a:solidFill>
-            <a:headEnd type="arrow" w="med" len="sm"/>
-            <a:tailEnd type="none" w="med" len="sm"/>
+            <a:headEnd type="none" w="med" len="sm"/>
+            <a:tailEnd type="arrow" w="med" len="sm"/>
           </a:ln>
         </p:spPr>
         <p:style>
@@ -6121,8 +5935,8 @@
             <a:solidFill>
               <a:schemeClr val="tx2"/>
             </a:solidFill>
-            <a:headEnd type="arrow" w="med" len="sm"/>
-            <a:tailEnd type="none" w="med" len="sm"/>
+            <a:headEnd type="none" w="med" len="sm"/>
+            <a:tailEnd type="arrow" w="med" len="sm"/>
           </a:ln>
         </p:spPr>
         <p:style>
@@ -6293,8 +6107,8 @@
         </p:nvSpPr>
         <p:spPr>
           <a:xfrm flipH="1" flipV="1">
-            <a:off x="2835228" y="2897619"/>
-            <a:ext cx="2527059" cy="2948606"/>
+            <a:off x="2835226" y="3010364"/>
+            <a:ext cx="2527059" cy="2835859"/>
           </a:xfrm>
           <a:custGeom>
             <a:avLst/>
@@ -6338,7 +6152,7 @@
             <a:solidFill>
               <a:schemeClr val="tx2"/>
             </a:solidFill>
-            <a:headEnd type="arrow" w="med" len="sm"/>
+            <a:headEnd type="none" w="med" len="sm"/>
             <a:tailEnd type="none" w="med" len="sm"/>
           </a:ln>
         </p:spPr>
@@ -6392,8 +6206,8 @@
         </p:nvCxnSpPr>
         <p:spPr>
           <a:xfrm flipV="1">
-            <a:off x="5362287" y="5455372"/>
-            <a:ext cx="537" cy="390853"/>
+            <a:off x="5362285" y="5455372"/>
+            <a:ext cx="539" cy="390851"/>
           </a:xfrm>
           <a:prstGeom prst="straightConnector1">
             <a:avLst/>
@@ -6403,7 +6217,7 @@
               <a:schemeClr val="tx2"/>
             </a:solidFill>
             <a:headEnd type="none" w="med" len="sm"/>
-            <a:tailEnd type="none" w="med" len="sm"/>
+            <a:tailEnd type="arrow" w="med" len="sm"/>
           </a:ln>
         </p:spPr>
         <p:style>
@@ -6597,7 +6411,7 @@
           <p:nvPr/>
         </p:nvPicPr>
         <p:blipFill>
-          <a:blip r:embed="rId12"/>
+          <a:blip r:embed="rId10"/>
           <a:srcRect/>
           <a:stretch/>
         </p:blipFill>
@@ -6649,7 +6463,7 @@
           <p:nvPr/>
         </p:nvPicPr>
         <p:blipFill>
-          <a:blip r:embed="rId13" cstate="hqprint">
+          <a:blip r:embed="rId11" cstate="hqprint">
             <a:extLst>
               <a:ext uri="{28A0092B-C50C-407E-A947-70E740481C1C}">
                 <a14:useLocalDpi xmlns:a14="http://schemas.microsoft.com/office/drawing/2010/main" val="0"/>
@@ -6711,7 +6525,7 @@
         <p:spPr bwMode="auto">
           <a:xfrm>
             <a:off x="1943392" y="2357417"/>
-            <a:ext cx="1549009" cy="461665"/>
+            <a:ext cx="1549009" cy="646331"/>
           </a:xfrm>
           <a:prstGeom prst="rect">
             <a:avLst/>
@@ -6850,13 +6664,27 @@
                 <a:ea typeface="Amazon Ember" panose="020B0603020204020204" pitchFamily="34" charset="0"/>
                 <a:cs typeface="Arial" panose="020B0604020202020204" pitchFamily="34" charset="0"/>
               </a:rPr>
-              <a:t>Smart Power Cord for AWS</a:t>
+              <a:t>ConnectSense</a:t>
             </a:r>
-            <a:endParaRPr lang="en-US" altLang="en-US" sz="1200" dirty="0">
-              <a:latin typeface="Arial" panose="020B0604020202020204" pitchFamily="34" charset="0"/>
-              <a:ea typeface="Amazon Ember" panose="020B0603020204020204" pitchFamily="34" charset="0"/>
-              <a:cs typeface="Arial" panose="020B0604020202020204" pitchFamily="34" charset="0"/>
-            </a:endParaRPr>
+          </a:p>
+          <a:p>
+            <a:pPr algn="ctr" eaLnBrk="1" hangingPunct="1"/>
+            <a:r>
+              <a:rPr lang="en-US" altLang="en-US" sz="1200" dirty="0" smtClean="0">
+                <a:latin typeface="Arial" panose="020B0604020202020204" pitchFamily="34" charset="0"/>
+                <a:ea typeface="Amazon Ember" panose="020B0603020204020204" pitchFamily="34" charset="0"/>
+                <a:cs typeface="Arial" panose="020B0604020202020204" pitchFamily="34" charset="0"/>
+              </a:rPr>
+              <a:t>Smart </a:t>
+            </a:r>
+            <a:r>
+              <a:rPr lang="en-US" altLang="en-US" sz="1200" dirty="0">
+                <a:latin typeface="Arial" panose="020B0604020202020204" pitchFamily="34" charset="0"/>
+                <a:ea typeface="Amazon Ember" panose="020B0603020204020204" pitchFamily="34" charset="0"/>
+                <a:cs typeface="Arial" panose="020B0604020202020204" pitchFamily="34" charset="0"/>
+              </a:rPr>
+              <a:t>Power Cord for AWS</a:t>
+            </a:r>
           </a:p>
         </p:txBody>
       </p:sp>
@@ -8123,18 +7951,13 @@
           <a:p>
             <a:pPr algn="ctr"/>
             <a:r>
-              <a:rPr lang="en-US" altLang="en-US" sz="3600" dirty="0" smtClean="0">
+              <a:rPr lang="en-US" altLang="en-US" sz="3600" dirty="0">
                 <a:solidFill>
                   <a:srgbClr val="FF0000"/>
                 </a:solidFill>
               </a:rPr>
               <a:t>Previous version (for reference only)</a:t>
             </a:r>
-            <a:endParaRPr lang="en-US" altLang="en-US" sz="3600" dirty="0">
-              <a:solidFill>
-                <a:srgbClr val="FF0000"/>
-              </a:solidFill>
-            </a:endParaRPr>
           </a:p>
         </p:txBody>
       </p:sp>
@@ -9534,7 +9357,7 @@
               </a:spcAft>
               <a:defRPr/>
             </a:pPr>
-            <a:endParaRPr lang="en-US"/>
+            <a:endParaRPr lang="en-US" dirty="0"/>
           </a:p>
         </p:txBody>
       </p:sp>
@@ -9676,7 +9499,7 @@
               </a:spcAft>
               <a:defRPr/>
             </a:pPr>
-            <a:endParaRPr lang="en-US"/>
+            <a:endParaRPr lang="en-US" dirty="0"/>
           </a:p>
         </p:txBody>
       </p:sp>
@@ -9817,7 +9640,7 @@
               </a:spcAft>
               <a:defRPr/>
             </a:pPr>
-            <a:endParaRPr lang="en-US"/>
+            <a:endParaRPr lang="en-US" dirty="0"/>
           </a:p>
         </p:txBody>
       </p:sp>

</xml_diff>